<commit_message>
Atualizando artefato 15 e 16
</commit_message>
<xml_diff>
--- a/15. Arquitetura de negócio.pptx
+++ b/15. Arquitetura de negócio.pptx
@@ -1416,7 +1416,7 @@
   <p:cSld>
     <p:spTree>
       <p:nvGrpSpPr>
-        <p:cNvPr id="131" name="Shape 131"/>
+        <p:cNvPr id="134" name="Shape 134"/>
         <p:cNvGrpSpPr/>
         <p:nvPr/>
       </p:nvGrpSpPr>
@@ -1430,7 +1430,7 @@
       </p:grpSpPr>
       <p:sp>
         <p:nvSpPr>
-          <p:cNvPr id="132" name="Google Shape;132;g75337751b0_0_0:notes"/>
+          <p:cNvPr id="135" name="Google Shape;135;g75337751b0_0_0:notes"/>
           <p:cNvSpPr/>
           <p:nvPr>
             <p:ph idx="2" type="sldImg"/>
@@ -1475,7 +1475,7 @@
       </p:sp>
       <p:sp>
         <p:nvSpPr>
-          <p:cNvPr id="133" name="Google Shape;133;g75337751b0_0_0:notes"/>
+          <p:cNvPr id="136" name="Google Shape;136;g75337751b0_0_0:notes"/>
           <p:cNvSpPr txBox="1"/>
           <p:nvPr>
             <p:ph idx="1" type="body"/>
@@ -9196,7 +9196,7 @@
         </p:nvSpPr>
         <p:spPr>
           <a:xfrm>
-            <a:off x="3433075" y="0"/>
+            <a:off x="3433075" y="76200"/>
             <a:ext cx="2054600" cy="1168500"/>
           </a:xfrm>
           <a:prstGeom prst="flowChartPunchedTape">
@@ -9261,7 +9261,7 @@
         </p:nvSpPr>
         <p:spPr>
           <a:xfrm>
-            <a:off x="3561263" y="274975"/>
+            <a:off x="3561263" y="351175"/>
             <a:ext cx="1798200" cy="345000"/>
           </a:xfrm>
           <a:prstGeom prst="rect">
@@ -9553,7 +9553,7 @@
             </a:pPr>
             <a:r>
               <a:rPr lang="pt-BR"/>
-              <a:t>Solicitar disponibilidade de produtos</a:t>
+              <a:t>Realizar compra</a:t>
             </a:r>
             <a:endParaRPr b="0" i="0" sz="1400" u="none" cap="none" strike="noStrike">
               <a:solidFill>
@@ -9589,7 +9589,7 @@
                   <a:schemeClr val="dk1"/>
                 </a:solidFill>
               </a:rPr>
-              <a:t>Realizar pedido de compra</a:t>
+              <a:t>Cancelar compra</a:t>
             </a:r>
             <a:endParaRPr b="0" i="0" sz="1400" u="none" cap="none" strike="noStrike">
               <a:solidFill>
@@ -9625,7 +9625,7 @@
                   <a:schemeClr val="dk1"/>
                 </a:solidFill>
               </a:rPr>
-              <a:t>Realizar pagamento</a:t>
+              <a:t>Pagar compra</a:t>
             </a:r>
             <a:endParaRPr b="0" i="0" sz="1400" u="none" cap="none" strike="noStrike">
               <a:solidFill>
@@ -9661,7 +9661,7 @@
                   <a:schemeClr val="dk1"/>
                 </a:solidFill>
               </a:rPr>
-              <a:t>Solicitar prazo de entrega</a:t>
+              <a:t>Receber produto</a:t>
             </a:r>
             <a:endParaRPr>
               <a:solidFill>
@@ -9692,7 +9692,7 @@
                   <a:schemeClr val="dk1"/>
                 </a:solidFill>
               </a:rPr>
-              <a:t>Entregar pedido de compra</a:t>
+              <a:t>Devolver compra</a:t>
             </a:r>
             <a:endParaRPr>
               <a:solidFill>
@@ -9888,7 +9888,7 @@
             </a:pPr>
             <a:r>
               <a:rPr lang="pt-BR"/>
-              <a:t>Loja Online</a:t>
+              <a:t>Loja </a:t>
             </a:r>
             <a:endParaRPr/>
           </a:p>
@@ -10243,7 +10243,7 @@
         <p:spPr>
           <a:xfrm>
             <a:off x="5211325" y="3291875"/>
-            <a:ext cx="80100" cy="1005600"/>
+            <a:ext cx="80100" cy="576600"/>
           </a:xfrm>
           <a:prstGeom prst="leftBracket">
             <a:avLst>
@@ -10307,8 +10307,8 @@
         </p:nvSpPr>
         <p:spPr>
           <a:xfrm>
-            <a:off x="8172300" y="3315225"/>
-            <a:ext cx="80100" cy="982200"/>
+            <a:off x="6343500" y="3315225"/>
+            <a:ext cx="80100" cy="529800"/>
           </a:xfrm>
           <a:prstGeom prst="rightBracket">
             <a:avLst>
@@ -10372,7 +10372,7 @@
         </p:nvSpPr>
         <p:spPr>
           <a:xfrm>
-            <a:off x="2853200" y="274813"/>
+            <a:off x="2853200" y="351013"/>
             <a:ext cx="2659200" cy="529800"/>
           </a:xfrm>
           <a:prstGeom prst="rect">
@@ -10404,7 +10404,7 @@
                   <a:schemeClr val="dk1"/>
                 </a:solidFill>
               </a:rPr>
-              <a:t>Solicitar disponibilidade de produtos</a:t>
+              <a:t>Realizar compra</a:t>
             </a:r>
             <a:endParaRPr>
               <a:solidFill>
@@ -10479,8 +10479,8 @@
         </p:nvCxnSpPr>
         <p:spPr>
           <a:xfrm flipH="1" rot="-5400000">
-            <a:off x="3347850" y="1931165"/>
-            <a:ext cx="2930700" cy="796500"/>
+            <a:off x="3455100" y="1823915"/>
+            <a:ext cx="2716200" cy="796500"/>
           </a:xfrm>
           <a:prstGeom prst="curvedConnector2">
             <a:avLst/>
@@ -10505,8 +10505,8 @@
         </p:nvSpPr>
         <p:spPr>
           <a:xfrm>
-            <a:off x="5050150" y="3291875"/>
-            <a:ext cx="3008400" cy="443100"/>
+            <a:off x="5050150" y="3368075"/>
+            <a:ext cx="1293300" cy="420300"/>
           </a:xfrm>
           <a:prstGeom prst="rect">
             <a:avLst/>
@@ -10534,24 +10534,7 @@
             </a:pPr>
             <a:r>
               <a:rPr lang="pt-BR"/>
-              <a:t>Verificar disponibilidade de produtos</a:t>
-            </a:r>
-            <a:endParaRPr/>
-          </a:p>
-          <a:p>
-            <a:pPr indent="-317500" lvl="0" marL="457200" rtl="0" algn="l">
-              <a:spcBef>
-                <a:spcPts val="0"/>
-              </a:spcBef>
-              <a:spcAft>
-                <a:spcPts val="0"/>
-              </a:spcAft>
-              <a:buSzPts val="1400"/>
-              <a:buChar char="●"/>
-            </a:pPr>
-            <a:r>
-              <a:rPr lang="pt-BR"/>
-              <a:t>Confirmar disponibilidade dos produtos</a:t>
+              <a:t>Vender</a:t>
             </a:r>
             <a:endParaRPr/>
           </a:p>
@@ -10601,7 +10584,7 @@
             </a:pPr>
             <a:r>
               <a:rPr lang="pt-BR"/>
-              <a:t>Loja Online</a:t>
+              <a:t>Loja </a:t>
             </a:r>
             <a:endParaRPr/>
           </a:p>
@@ -10640,7 +10623,7 @@
         </p:nvSpPr>
         <p:spPr>
           <a:xfrm>
-            <a:off x="3411525" y="144463"/>
+            <a:off x="3411525" y="68263"/>
             <a:ext cx="1852525" cy="800675"/>
           </a:xfrm>
           <a:prstGeom prst="flowChartPunchedTape">
@@ -10705,7 +10688,7 @@
         </p:nvSpPr>
         <p:spPr>
           <a:xfrm>
-            <a:off x="3333238" y="266725"/>
+            <a:off x="3333238" y="342925"/>
             <a:ext cx="2009100" cy="334800"/>
           </a:xfrm>
           <a:prstGeom prst="rect">
@@ -10741,31 +10724,7 @@
             </a:pPr>
             <a:r>
               <a:rPr lang="pt-BR"/>
-              <a:t>Realizar pedido de</a:t>
-            </a:r>
-            <a:endParaRPr/>
-          </a:p>
-          <a:p>
-            <a:pPr indent="0" lvl="0" marL="0" marR="0" rtl="0" algn="ctr">
-              <a:lnSpc>
-                <a:spcPct val="100000"/>
-              </a:lnSpc>
-              <a:spcBef>
-                <a:spcPts val="0"/>
-              </a:spcBef>
-              <a:spcAft>
-                <a:spcPts val="0"/>
-              </a:spcAft>
-              <a:buClr>
-                <a:srgbClr val="000000"/>
-              </a:buClr>
-              <a:buSzPts val="1400"/>
-              <a:buFont typeface="Arial"/>
-              <a:buNone/>
-            </a:pPr>
-            <a:r>
-              <a:rPr lang="pt-BR"/>
-              <a:t>compra</a:t>
+              <a:t>Cancelar compra</a:t>
             </a:r>
             <a:endParaRPr/>
           </a:p>
@@ -11030,7 +10989,7 @@
         <p:spPr>
           <a:xfrm>
             <a:off x="4754125" y="3139475"/>
-            <a:ext cx="80100" cy="1063800"/>
+            <a:ext cx="80100" cy="563100"/>
           </a:xfrm>
           <a:prstGeom prst="leftBracket">
             <a:avLst>
@@ -11094,8 +11053,8 @@
         </p:nvSpPr>
         <p:spPr>
           <a:xfrm>
-            <a:off x="7053175" y="3140950"/>
-            <a:ext cx="80100" cy="1062300"/>
+            <a:off x="6824575" y="3140950"/>
+            <a:ext cx="80100" cy="563100"/>
           </a:xfrm>
           <a:prstGeom prst="rightBracket">
             <a:avLst>
@@ -11160,7 +11119,7 @@
         <p:spPr>
           <a:xfrm>
             <a:off x="4761475" y="3213275"/>
-            <a:ext cx="2540700" cy="580500"/>
+            <a:ext cx="2540700" cy="420300"/>
           </a:xfrm>
           <a:prstGeom prst="rect">
             <a:avLst/>
@@ -11195,27 +11154,25 @@
             </a:pPr>
             <a:r>
               <a:rPr lang="pt-BR"/>
-              <a:t>Fazer pedido de compra</a:t>
+              <a:t>Cancelar compra</a:t>
             </a:r>
             <a:endParaRPr/>
           </a:p>
           <a:p>
-            <a:pPr indent="-317500" lvl="0" marL="457200" marR="0" rtl="0" algn="l">
-              <a:lnSpc>
-                <a:spcPct val="100000"/>
-              </a:lnSpc>
-              <a:spcBef>
-                <a:spcPts val="0"/>
-              </a:spcBef>
-              <a:spcAft>
-                <a:spcPts val="0"/>
-              </a:spcAft>
-              <a:buSzPts val="1400"/>
-              <a:buChar char="●"/>
+            <a:pPr indent="0" lvl="0" marL="457200" marR="0" rtl="0" algn="l">
+              <a:lnSpc>
+                <a:spcPct val="100000"/>
+              </a:lnSpc>
+              <a:spcBef>
+                <a:spcPts val="0"/>
+              </a:spcBef>
+              <a:spcAft>
+                <a:spcPts val="0"/>
+              </a:spcAft>
+              <a:buNone/>
             </a:pPr>
             <a:r>
-              <a:rPr lang="pt-BR"/>
-              <a:t>Confirmar pedido de compra</a:t>
+              <a:t/>
             </a:r>
             <a:endParaRPr/>
           </a:p>
@@ -11232,12 +11189,12 @@
         </p:nvCxnSpPr>
         <p:spPr>
           <a:xfrm rot="5400000">
-            <a:off x="3473038" y="563420"/>
-            <a:ext cx="563100" cy="1166400"/>
+            <a:off x="3434938" y="525321"/>
+            <a:ext cx="639300" cy="1166400"/>
           </a:xfrm>
           <a:prstGeom prst="curvedConnector3">
             <a:avLst>
-              <a:gd fmla="val 57117" name="adj1"/>
+              <a:gd fmla="val 56268" name="adj1"/>
             </a:avLst>
           </a:prstGeom>
           <a:noFill/>
@@ -11262,7 +11219,7 @@
         </p:nvCxnSpPr>
         <p:spPr>
           <a:xfrm flipH="1" rot="-5400000">
-            <a:off x="3241075" y="1983125"/>
+            <a:off x="3241075" y="1903025"/>
             <a:ext cx="2603700" cy="437100"/>
           </a:xfrm>
           <a:prstGeom prst="curvedConnector2">
@@ -11324,7 +11281,7 @@
             </a:pPr>
             <a:r>
               <a:rPr lang="pt-BR"/>
-              <a:t>Loja Online</a:t>
+              <a:t>Loja </a:t>
             </a:r>
             <a:endParaRPr/>
           </a:p>
@@ -11464,7 +11421,7 @@
             </a:pPr>
             <a:r>
               <a:rPr lang="pt-BR"/>
-              <a:t>Realizar pagamento</a:t>
+              <a:t>Pagar compra</a:t>
             </a:r>
             <a:endParaRPr b="0" i="0" sz="1400" u="none" cap="none" strike="noStrike">
               <a:solidFill>
@@ -11709,8 +11666,8 @@
         </p:nvSpPr>
         <p:spPr>
           <a:xfrm>
-            <a:off x="5099125" y="3085800"/>
-            <a:ext cx="88200" cy="929700"/>
+            <a:off x="5022925" y="3085800"/>
+            <a:ext cx="88200" cy="639300"/>
           </a:xfrm>
           <a:prstGeom prst="leftBracket">
             <a:avLst>
@@ -11775,7 +11732,7 @@
         <p:spPr>
           <a:xfrm>
             <a:off x="7664475" y="3085800"/>
-            <a:ext cx="88200" cy="996900"/>
+            <a:ext cx="88200" cy="639300"/>
           </a:xfrm>
           <a:prstGeom prst="rightBracket">
             <a:avLst>
@@ -11839,7 +11796,7 @@
         </p:nvSpPr>
         <p:spPr>
           <a:xfrm>
-            <a:off x="5099125" y="3154800"/>
+            <a:off x="5022925" y="3154800"/>
             <a:ext cx="2653500" cy="443100"/>
           </a:xfrm>
           <a:prstGeom prst="rect">
@@ -11866,36 +11823,12 @@
               <a:spcAft>
                 <a:spcPts val="0"/>
               </a:spcAft>
-              <a:buClr>
-                <a:srgbClr val="000000"/>
-              </a:buClr>
-              <a:buSzPts val="1400"/>
-              <a:buFont typeface="Arial"/>
-              <a:buChar char="●"/>
-            </a:pPr>
-            <a:r>
-              <a:rPr lang="pt-BR"/>
-              <a:t>Solicitação do orçamento</a:t>
-            </a:r>
-            <a:endParaRPr/>
-          </a:p>
-          <a:p>
-            <a:pPr indent="-317500" lvl="0" marL="457200" marR="0" rtl="0" algn="l">
-              <a:lnSpc>
-                <a:spcPct val="100000"/>
-              </a:lnSpc>
-              <a:spcBef>
-                <a:spcPts val="0"/>
-              </a:spcBef>
-              <a:spcAft>
-                <a:spcPts val="0"/>
-              </a:spcAft>
               <a:buSzPts val="1400"/>
               <a:buChar char="●"/>
             </a:pPr>
             <a:r>
               <a:rPr lang="pt-BR"/>
-              <a:t>Encaminhar orçamento para pagamento</a:t>
+              <a:t>Disponibilizar pagamento</a:t>
             </a:r>
             <a:endParaRPr/>
           </a:p>
@@ -12032,8 +11965,8 @@
         </p:nvCxnSpPr>
         <p:spPr>
           <a:xfrm flipH="1" rot="-5400000">
-            <a:off x="3424738" y="1701932"/>
-            <a:ext cx="2587500" cy="761400"/>
+            <a:off x="3386638" y="1740032"/>
+            <a:ext cx="2587500" cy="685200"/>
           </a:xfrm>
           <a:prstGeom prst="curvedConnector2">
             <a:avLst/>
@@ -12094,7 +12027,7 @@
             </a:pPr>
             <a:r>
               <a:rPr lang="pt-BR"/>
-              <a:t>Loja Online</a:t>
+              <a:t>Loja </a:t>
             </a:r>
             <a:endParaRPr/>
           </a:p>
@@ -12461,7 +12394,7 @@
         </p:nvSpPr>
         <p:spPr>
           <a:xfrm>
-            <a:off x="3225988" y="191300"/>
+            <a:off x="3225988" y="267500"/>
             <a:ext cx="2223600" cy="420300"/>
           </a:xfrm>
           <a:prstGeom prst="rect">
@@ -12497,31 +12430,7 @@
             </a:pPr>
             <a:r>
               <a:rPr lang="pt-BR"/>
-              <a:t>Solicitar prazo de </a:t>
-            </a:r>
-            <a:endParaRPr/>
-          </a:p>
-          <a:p>
-            <a:pPr indent="0" lvl="0" marL="0" marR="0" rtl="0" algn="ctr">
-              <a:lnSpc>
-                <a:spcPct val="100000"/>
-              </a:lnSpc>
-              <a:spcBef>
-                <a:spcPts val="0"/>
-              </a:spcBef>
-              <a:spcAft>
-                <a:spcPts val="0"/>
-              </a:spcAft>
-              <a:buClr>
-                <a:srgbClr val="000000"/>
-              </a:buClr>
-              <a:buSzPts val="1400"/>
-              <a:buFont typeface="Arial"/>
-              <a:buNone/>
-            </a:pPr>
-            <a:r>
-              <a:rPr lang="pt-BR"/>
-              <a:t>entrega</a:t>
+              <a:t>Receber produto</a:t>
             </a:r>
             <a:endParaRPr/>
           </a:p>
@@ -12562,7 +12471,7 @@
         </p:nvSpPr>
         <p:spPr>
           <a:xfrm>
-            <a:off x="5133275" y="3230050"/>
+            <a:off x="4837825" y="3291875"/>
             <a:ext cx="2377200" cy="546900"/>
           </a:xfrm>
           <a:prstGeom prst="rect">
@@ -12589,36 +12498,12 @@
               <a:spcAft>
                 <a:spcPts val="0"/>
               </a:spcAft>
-              <a:buClr>
-                <a:srgbClr val="000000"/>
-              </a:buClr>
-              <a:buSzPts val="1400"/>
-              <a:buFont typeface="Arial"/>
-              <a:buChar char="●"/>
-            </a:pPr>
-            <a:r>
-              <a:rPr lang="pt-BR"/>
-              <a:t>Solicitar prazo de entrega do pedido</a:t>
-            </a:r>
-            <a:endParaRPr/>
-          </a:p>
-          <a:p>
-            <a:pPr indent="-317500" lvl="0" marL="457200" marR="0" rtl="0" algn="l">
-              <a:lnSpc>
-                <a:spcPct val="100000"/>
-              </a:lnSpc>
-              <a:spcBef>
-                <a:spcPts val="0"/>
-              </a:spcBef>
-              <a:spcAft>
-                <a:spcPts val="0"/>
-              </a:spcAft>
               <a:buSzPts val="1400"/>
               <a:buChar char="●"/>
             </a:pPr>
             <a:r>
               <a:rPr lang="pt-BR"/>
-              <a:t>Confirmação do prazo</a:t>
+              <a:t>Entrega de pedido(s)</a:t>
             </a:r>
             <a:endParaRPr/>
           </a:p>
@@ -12664,7 +12549,7 @@
         <p:spPr>
           <a:xfrm>
             <a:off x="4982725" y="3291875"/>
-            <a:ext cx="80100" cy="911700"/>
+            <a:ext cx="80100" cy="639300"/>
           </a:xfrm>
           <a:prstGeom prst="leftBracket">
             <a:avLst>
@@ -12728,8 +12613,8 @@
         </p:nvSpPr>
         <p:spPr>
           <a:xfrm>
-            <a:off x="7358075" y="3293350"/>
-            <a:ext cx="80100" cy="911700"/>
+            <a:off x="7129475" y="3293350"/>
+            <a:ext cx="80100" cy="639300"/>
           </a:xfrm>
           <a:prstGeom prst="rightBracket">
             <a:avLst>
@@ -12827,8 +12712,8 @@
         </p:nvCxnSpPr>
         <p:spPr>
           <a:xfrm flipH="1" rot="-5400000">
-            <a:off x="3180838" y="1945832"/>
-            <a:ext cx="2958900" cy="645000"/>
+            <a:off x="3248938" y="1877732"/>
+            <a:ext cx="2822700" cy="645000"/>
           </a:xfrm>
           <a:prstGeom prst="curvedConnector2">
             <a:avLst/>
@@ -12848,6 +12733,874 @@
       <p:sp>
         <p:nvSpPr>
           <p:cNvPr id="130" name="Google Shape;130;p17"/>
+          <p:cNvSpPr/>
+          <p:nvPr/>
+        </p:nvSpPr>
+        <p:spPr>
+          <a:xfrm>
+            <a:off x="3999600" y="2014725"/>
+            <a:ext cx="1063200" cy="546900"/>
+          </a:xfrm>
+          <a:prstGeom prst="rect">
+            <a:avLst/>
+          </a:prstGeom>
+          <a:solidFill>
+            <a:srgbClr val="C9DAF8"/>
+          </a:solidFill>
+          <a:ln cap="flat" cmpd="sng" w="9525">
+            <a:solidFill>
+              <a:srgbClr val="000000"/>
+            </a:solidFill>
+            <a:prstDash val="solid"/>
+            <a:round/>
+            <a:headEnd len="sm" w="sm" type="none"/>
+            <a:tailEnd len="sm" w="sm" type="none"/>
+          </a:ln>
+        </p:spPr>
+        <p:txBody>
+          <a:bodyPr anchorCtr="0" anchor="ctr" bIns="91425" lIns="91425" spcFirstLastPara="1" rIns="91425" wrap="square" tIns="91425">
+            <a:noAutofit/>
+          </a:bodyPr>
+          <a:lstStyle/>
+          <a:p>
+            <a:pPr indent="0" lvl="0" marL="0" rtl="0" algn="ctr">
+              <a:spcBef>
+                <a:spcPts val="0"/>
+              </a:spcBef>
+              <a:spcAft>
+                <a:spcPts val="0"/>
+              </a:spcAft>
+              <a:buNone/>
+            </a:pPr>
+            <a:r>
+              <a:rPr lang="pt-BR"/>
+              <a:t>Setor de</a:t>
+            </a:r>
+            <a:endParaRPr/>
+          </a:p>
+          <a:p>
+            <a:pPr indent="0" lvl="0" marL="0" rtl="0" algn="ctr">
+              <a:spcBef>
+                <a:spcPts val="0"/>
+              </a:spcBef>
+              <a:spcAft>
+                <a:spcPts val="0"/>
+              </a:spcAft>
+              <a:buNone/>
+            </a:pPr>
+            <a:r>
+              <a:rPr lang="pt-BR"/>
+              <a:t>entrega</a:t>
+            </a:r>
+            <a:endParaRPr/>
+          </a:p>
+        </p:txBody>
+      </p:sp>
+      <p:pic>
+        <p:nvPicPr>
+          <p:cNvPr id="131" name="Google Shape;131;p17"/>
+          <p:cNvPicPr preferRelativeResize="0"/>
+          <p:nvPr/>
+        </p:nvPicPr>
+        <p:blipFill rotWithShape="1">
+          <a:blip r:embed="rId4">
+            <a:alphaModFix/>
+          </a:blip>
+          <a:srcRect b="7629" l="0" r="0" t="0"/>
+          <a:stretch/>
+        </p:blipFill>
+        <p:spPr>
+          <a:xfrm>
+            <a:off x="5579900" y="1364550"/>
+            <a:ext cx="893050" cy="1204850"/>
+          </a:xfrm>
+          <a:prstGeom prst="rect">
+            <a:avLst/>
+          </a:prstGeom>
+          <a:noFill/>
+          <a:ln>
+            <a:noFill/>
+          </a:ln>
+        </p:spPr>
+      </p:pic>
+      <p:sp>
+        <p:nvSpPr>
+          <p:cNvPr id="132" name="Google Shape;132;p17"/>
+          <p:cNvSpPr txBox="1"/>
+          <p:nvPr/>
+        </p:nvSpPr>
+        <p:spPr>
+          <a:xfrm>
+            <a:off x="5595275" y="2404425"/>
+            <a:ext cx="852300" cy="157200"/>
+          </a:xfrm>
+          <a:prstGeom prst="rect">
+            <a:avLst/>
+          </a:prstGeom>
+          <a:noFill/>
+          <a:ln>
+            <a:noFill/>
+          </a:ln>
+        </p:spPr>
+        <p:txBody>
+          <a:bodyPr anchorCtr="0" anchor="t" bIns="91425" lIns="91425" spcFirstLastPara="1" rIns="91425" wrap="square" tIns="91425">
+            <a:noAutofit/>
+          </a:bodyPr>
+          <a:lstStyle/>
+          <a:p>
+            <a:pPr indent="0" lvl="0" marL="0" rtl="0" algn="l">
+              <a:spcBef>
+                <a:spcPts val="0"/>
+              </a:spcBef>
+              <a:spcAft>
+                <a:spcPts val="0"/>
+              </a:spcAft>
+              <a:buNone/>
+            </a:pPr>
+            <a:r>
+              <a:rPr lang="pt-BR" sz="1000"/>
+              <a:t>Entregador</a:t>
+            </a:r>
+            <a:endParaRPr sz="1000"/>
+          </a:p>
+        </p:txBody>
+      </p:sp>
+      <p:cxnSp>
+        <p:nvCxnSpPr>
+          <p:cNvPr id="133" name="Google Shape;133;p17"/>
+          <p:cNvCxnSpPr>
+            <a:stCxn id="119" idx="2"/>
+          </p:cNvCxnSpPr>
+          <p:nvPr/>
+        </p:nvCxnSpPr>
+        <p:spPr>
+          <a:xfrm flipH="1" rot="-5400000">
+            <a:off x="4685338" y="441332"/>
+            <a:ext cx="876300" cy="1571400"/>
+          </a:xfrm>
+          <a:prstGeom prst="curvedConnector2">
+            <a:avLst/>
+          </a:prstGeom>
+          <a:noFill/>
+          <a:ln cap="flat" cmpd="sng" w="19050">
+            <a:solidFill>
+              <a:srgbClr val="000000"/>
+            </a:solidFill>
+            <a:prstDash val="solid"/>
+            <a:round/>
+            <a:headEnd len="med" w="med" type="none"/>
+            <a:tailEnd len="med" w="med" type="none"/>
+          </a:ln>
+        </p:spPr>
+      </p:cxnSp>
+    </p:spTree>
+  </p:cSld>
+  <p:clrMapOvr>
+    <a:masterClrMapping/>
+  </p:clrMapOvr>
+</p:sld>
+</file>
+
+<file path=ppt/slides/slide6.xml><?xml version="1.0" encoding="utf-8"?>
+<p:sld xmlns:a="http://schemas.openxmlformats.org/drawingml/2006/main" xmlns:r="http://schemas.openxmlformats.org/officeDocument/2006/relationships" xmlns:mc="http://schemas.openxmlformats.org/markup-compatibility/2006" xmlns:mv="urn:schemas-microsoft-com:mac:vml" xmlns:p="http://schemas.openxmlformats.org/presentationml/2006/main" xmlns:c="http://schemas.openxmlformats.org/drawingml/2006/chart" xmlns:dgm="http://schemas.openxmlformats.org/drawingml/2006/diagram" xmlns:o="urn:schemas-microsoft-com:office:office" xmlns:v="urn:schemas-microsoft-com:vml" xmlns:pvml="urn:schemas-microsoft-com:office:powerpoint" xmlns:com="http://schemas.openxmlformats.org/drawingml/2006/compatibility" xmlns:p14="http://schemas.microsoft.com/office/powerpoint/2010/main" xmlns:p15="http://schemas.microsoft.com/office/powerpoint/2012/main">
+  <p:cSld>
+    <p:spTree>
+      <p:nvGrpSpPr>
+        <p:cNvPr id="137" name="Shape 137"/>
+        <p:cNvGrpSpPr/>
+        <p:nvPr/>
+      </p:nvGrpSpPr>
+      <p:grpSpPr>
+        <a:xfrm>
+          <a:off x="0" y="0"/>
+          <a:ext cx="0" cy="0"/>
+          <a:chOff x="0" y="0"/>
+          <a:chExt cx="0" cy="0"/>
+        </a:xfrm>
+      </p:grpSpPr>
+      <p:sp>
+        <p:nvSpPr>
+          <p:cNvPr id="138" name="Google Shape;138;p18"/>
+          <p:cNvSpPr/>
+          <p:nvPr/>
+        </p:nvSpPr>
+        <p:spPr>
+          <a:xfrm>
+            <a:off x="241100" y="1360375"/>
+            <a:ext cx="8733300" cy="3589800"/>
+          </a:xfrm>
+          <a:prstGeom prst="rect">
+            <a:avLst/>
+          </a:prstGeom>
+          <a:solidFill>
+            <a:srgbClr val="FFFFFF"/>
+          </a:solidFill>
+          <a:ln cap="flat" cmpd="sng" w="19050">
+            <a:solidFill>
+              <a:srgbClr val="000000"/>
+            </a:solidFill>
+            <a:prstDash val="solid"/>
+            <a:round/>
+            <a:headEnd len="sm" w="sm" type="none"/>
+            <a:tailEnd len="sm" w="sm" type="none"/>
+          </a:ln>
+        </p:spPr>
+        <p:txBody>
+          <a:bodyPr anchorCtr="0" anchor="ctr" bIns="91425" lIns="91425" spcFirstLastPara="1" rIns="91425" wrap="square" tIns="91425">
+            <a:noAutofit/>
+          </a:bodyPr>
+          <a:lstStyle/>
+          <a:p>
+            <a:pPr indent="0" lvl="0" marL="0" marR="0" rtl="0" algn="l">
+              <a:lnSpc>
+                <a:spcPct val="100000"/>
+              </a:lnSpc>
+              <a:spcBef>
+                <a:spcPts val="0"/>
+              </a:spcBef>
+              <a:spcAft>
+                <a:spcPts val="0"/>
+              </a:spcAft>
+              <a:buClr>
+                <a:srgbClr val="000000"/>
+              </a:buClr>
+              <a:buSzPts val="1400"/>
+              <a:buFont typeface="Arial"/>
+              <a:buNone/>
+            </a:pPr>
+            <a:r>
+              <a:t/>
+            </a:r>
+            <a:endParaRPr b="0" i="0" sz="1400" u="none" cap="none" strike="noStrike">
+              <a:solidFill>
+                <a:srgbClr val="000000"/>
+              </a:solidFill>
+              <a:latin typeface="Arial"/>
+              <a:ea typeface="Arial"/>
+              <a:cs typeface="Arial"/>
+              <a:sym typeface="Arial"/>
+            </a:endParaRPr>
+          </a:p>
+        </p:txBody>
+      </p:sp>
+      <p:sp>
+        <p:nvSpPr>
+          <p:cNvPr id="139" name="Google Shape;139;p18"/>
+          <p:cNvSpPr/>
+          <p:nvPr/>
+        </p:nvSpPr>
+        <p:spPr>
+          <a:xfrm>
+            <a:off x="3411525" y="68275"/>
+            <a:ext cx="1852525" cy="800675"/>
+          </a:xfrm>
+          <a:prstGeom prst="flowChartPunchedTape">
+            <a:avLst/>
+          </a:prstGeom>
+          <a:solidFill>
+            <a:srgbClr val="EAD1DC"/>
+          </a:solidFill>
+          <a:ln cap="flat" cmpd="sng" w="9525">
+            <a:solidFill>
+              <a:srgbClr val="000000"/>
+            </a:solidFill>
+            <a:prstDash val="solid"/>
+            <a:round/>
+            <a:headEnd len="sm" w="sm" type="none"/>
+            <a:tailEnd len="sm" w="sm" type="none"/>
+          </a:ln>
+        </p:spPr>
+        <p:txBody>
+          <a:bodyPr anchorCtr="0" anchor="ctr" bIns="91425" lIns="91425" spcFirstLastPara="1" rIns="91425" wrap="square" tIns="91425">
+            <a:noAutofit/>
+          </a:bodyPr>
+          <a:lstStyle/>
+          <a:p>
+            <a:pPr indent="0" lvl="0" marL="0" marR="0" rtl="0" algn="l">
+              <a:lnSpc>
+                <a:spcPct val="100000"/>
+              </a:lnSpc>
+              <a:spcBef>
+                <a:spcPts val="0"/>
+              </a:spcBef>
+              <a:spcAft>
+                <a:spcPts val="0"/>
+              </a:spcAft>
+              <a:buClr>
+                <a:srgbClr val="000000"/>
+              </a:buClr>
+              <a:buSzPts val="1400"/>
+              <a:buFont typeface="Arial"/>
+              <a:buNone/>
+            </a:pPr>
+            <a:r>
+              <a:t/>
+            </a:r>
+            <a:endParaRPr b="0" i="0" sz="1400" u="none" cap="none" strike="noStrike">
+              <a:solidFill>
+                <a:srgbClr val="000000"/>
+              </a:solidFill>
+              <a:latin typeface="Arial"/>
+              <a:ea typeface="Arial"/>
+              <a:cs typeface="Arial"/>
+              <a:sym typeface="Arial"/>
+            </a:endParaRPr>
+          </a:p>
+        </p:txBody>
+      </p:sp>
+      <p:sp>
+        <p:nvSpPr>
+          <p:cNvPr id="140" name="Google Shape;140;p18"/>
+          <p:cNvSpPr txBox="1"/>
+          <p:nvPr/>
+        </p:nvSpPr>
+        <p:spPr>
+          <a:xfrm>
+            <a:off x="231875" y="1324375"/>
+            <a:ext cx="1852500" cy="334800"/>
+          </a:xfrm>
+          <a:prstGeom prst="rect">
+            <a:avLst/>
+          </a:prstGeom>
+          <a:noFill/>
+          <a:ln>
+            <a:noFill/>
+          </a:ln>
+        </p:spPr>
+        <p:txBody>
+          <a:bodyPr anchorCtr="0" anchor="t" bIns="91425" lIns="91425" spcFirstLastPara="1" rIns="91425" wrap="square" tIns="91425">
+            <a:noAutofit/>
+          </a:bodyPr>
+          <a:lstStyle/>
+          <a:p>
+            <a:pPr indent="0" lvl="0" marL="0" marR="0" rtl="0" algn="l">
+              <a:lnSpc>
+                <a:spcPct val="100000"/>
+              </a:lnSpc>
+              <a:spcBef>
+                <a:spcPts val="0"/>
+              </a:spcBef>
+              <a:spcAft>
+                <a:spcPts val="0"/>
+              </a:spcAft>
+              <a:buClr>
+                <a:srgbClr val="000000"/>
+              </a:buClr>
+              <a:buSzPts val="1400"/>
+              <a:buFont typeface="Arial"/>
+              <a:buNone/>
+            </a:pPr>
+            <a:r>
+              <a:rPr b="1" i="0" lang="pt-BR" sz="1400" u="none" cap="none" strike="noStrike">
+                <a:solidFill>
+                  <a:srgbClr val="000000"/>
+                </a:solidFill>
+                <a:latin typeface="Arial"/>
+                <a:ea typeface="Arial"/>
+                <a:cs typeface="Arial"/>
+                <a:sym typeface="Arial"/>
+              </a:rPr>
+              <a:t>Nós Operacionais</a:t>
+            </a:r>
+            <a:endParaRPr b="1" i="0" sz="1400" u="none" cap="none" strike="noStrike">
+              <a:solidFill>
+                <a:srgbClr val="000000"/>
+              </a:solidFill>
+              <a:latin typeface="Arial"/>
+              <a:ea typeface="Arial"/>
+              <a:cs typeface="Arial"/>
+              <a:sym typeface="Arial"/>
+            </a:endParaRPr>
+          </a:p>
+        </p:txBody>
+      </p:sp>
+      <p:cxnSp>
+        <p:nvCxnSpPr>
+          <p:cNvPr id="141" name="Google Shape;141;p18"/>
+          <p:cNvCxnSpPr/>
+          <p:nvPr/>
+        </p:nvCxnSpPr>
+        <p:spPr>
+          <a:xfrm>
+            <a:off x="254500" y="2745075"/>
+            <a:ext cx="8733300" cy="0"/>
+          </a:xfrm>
+          <a:prstGeom prst="straightConnector1">
+            <a:avLst/>
+          </a:prstGeom>
+          <a:noFill/>
+          <a:ln cap="flat" cmpd="sng" w="19050">
+            <a:solidFill>
+              <a:srgbClr val="000000"/>
+            </a:solidFill>
+            <a:prstDash val="solid"/>
+            <a:round/>
+            <a:headEnd len="sm" w="sm" type="none"/>
+            <a:tailEnd len="sm" w="sm" type="none"/>
+          </a:ln>
+        </p:spPr>
+      </p:cxnSp>
+      <p:sp>
+        <p:nvSpPr>
+          <p:cNvPr id="142" name="Google Shape;142;p18"/>
+          <p:cNvSpPr txBox="1"/>
+          <p:nvPr/>
+        </p:nvSpPr>
+        <p:spPr>
+          <a:xfrm>
+            <a:off x="218475" y="2757575"/>
+            <a:ext cx="2540700" cy="420300"/>
+          </a:xfrm>
+          <a:prstGeom prst="rect">
+            <a:avLst/>
+          </a:prstGeom>
+          <a:noFill/>
+          <a:ln>
+            <a:noFill/>
+          </a:ln>
+        </p:spPr>
+        <p:txBody>
+          <a:bodyPr anchorCtr="0" anchor="t" bIns="91425" lIns="91425" spcFirstLastPara="1" rIns="91425" wrap="square" tIns="91425">
+            <a:noAutofit/>
+          </a:bodyPr>
+          <a:lstStyle/>
+          <a:p>
+            <a:pPr indent="0" lvl="0" marL="0" marR="0" rtl="0" algn="l">
+              <a:lnSpc>
+                <a:spcPct val="100000"/>
+              </a:lnSpc>
+              <a:spcBef>
+                <a:spcPts val="0"/>
+              </a:spcBef>
+              <a:spcAft>
+                <a:spcPts val="0"/>
+              </a:spcAft>
+              <a:buClr>
+                <a:srgbClr val="000000"/>
+              </a:buClr>
+              <a:buSzPts val="1400"/>
+              <a:buFont typeface="Arial"/>
+              <a:buNone/>
+            </a:pPr>
+            <a:r>
+              <a:rPr b="1" i="0" lang="pt-BR" sz="1400" u="none" cap="none" strike="noStrike">
+                <a:solidFill>
+                  <a:srgbClr val="000000"/>
+                </a:solidFill>
+                <a:latin typeface="Arial"/>
+                <a:ea typeface="Arial"/>
+                <a:cs typeface="Arial"/>
+                <a:sym typeface="Arial"/>
+              </a:rPr>
+              <a:t>Capacidades</a:t>
+            </a:r>
+            <a:endParaRPr b="1" i="0" sz="1400" u="none" cap="none" strike="noStrike">
+              <a:solidFill>
+                <a:srgbClr val="000000"/>
+              </a:solidFill>
+              <a:latin typeface="Arial"/>
+              <a:ea typeface="Arial"/>
+              <a:cs typeface="Arial"/>
+              <a:sym typeface="Arial"/>
+            </a:endParaRPr>
+          </a:p>
+          <a:p>
+            <a:pPr indent="0" lvl="0" marL="0" marR="0" rtl="0" algn="l">
+              <a:lnSpc>
+                <a:spcPct val="100000"/>
+              </a:lnSpc>
+              <a:spcBef>
+                <a:spcPts val="0"/>
+              </a:spcBef>
+              <a:spcAft>
+                <a:spcPts val="0"/>
+              </a:spcAft>
+              <a:buClr>
+                <a:srgbClr val="000000"/>
+              </a:buClr>
+              <a:buSzPts val="1400"/>
+              <a:buFont typeface="Arial"/>
+              <a:buNone/>
+            </a:pPr>
+            <a:r>
+              <a:rPr b="1" i="0" lang="pt-BR" sz="1400" u="none" cap="none" strike="noStrike">
+                <a:solidFill>
+                  <a:srgbClr val="000000"/>
+                </a:solidFill>
+                <a:latin typeface="Arial"/>
+                <a:ea typeface="Arial"/>
+                <a:cs typeface="Arial"/>
+                <a:sym typeface="Arial"/>
+              </a:rPr>
+              <a:t>Operacionais</a:t>
+            </a:r>
+            <a:endParaRPr b="1" i="0" sz="1400" u="none" cap="none" strike="noStrike">
+              <a:solidFill>
+                <a:srgbClr val="000000"/>
+              </a:solidFill>
+              <a:latin typeface="Arial"/>
+              <a:ea typeface="Arial"/>
+              <a:cs typeface="Arial"/>
+              <a:sym typeface="Arial"/>
+            </a:endParaRPr>
+          </a:p>
+        </p:txBody>
+      </p:sp>
+      <p:sp>
+        <p:nvSpPr>
+          <p:cNvPr id="143" name="Google Shape;143;p18"/>
+          <p:cNvSpPr txBox="1"/>
+          <p:nvPr/>
+        </p:nvSpPr>
+        <p:spPr>
+          <a:xfrm>
+            <a:off x="3225988" y="267500"/>
+            <a:ext cx="2223600" cy="420300"/>
+          </a:xfrm>
+          <a:prstGeom prst="rect">
+            <a:avLst/>
+          </a:prstGeom>
+          <a:noFill/>
+          <a:ln>
+            <a:noFill/>
+          </a:ln>
+        </p:spPr>
+        <p:txBody>
+          <a:bodyPr anchorCtr="0" anchor="t" bIns="91425" lIns="91425" spcFirstLastPara="1" rIns="91425" wrap="square" tIns="91425">
+            <a:noAutofit/>
+          </a:bodyPr>
+          <a:lstStyle/>
+          <a:p>
+            <a:pPr indent="0" lvl="0" marL="0" marR="0" rtl="0" algn="ctr">
+              <a:lnSpc>
+                <a:spcPct val="100000"/>
+              </a:lnSpc>
+              <a:spcBef>
+                <a:spcPts val="0"/>
+              </a:spcBef>
+              <a:spcAft>
+                <a:spcPts val="0"/>
+              </a:spcAft>
+              <a:buClr>
+                <a:srgbClr val="000000"/>
+              </a:buClr>
+              <a:buSzPts val="1400"/>
+              <a:buFont typeface="Arial"/>
+              <a:buNone/>
+            </a:pPr>
+            <a:r>
+              <a:rPr lang="pt-BR"/>
+              <a:t>Devolver compra</a:t>
+            </a:r>
+            <a:endParaRPr/>
+          </a:p>
+        </p:txBody>
+      </p:sp>
+      <p:pic>
+        <p:nvPicPr>
+          <p:cNvPr id="144" name="Google Shape;144;p18"/>
+          <p:cNvPicPr preferRelativeResize="0"/>
+          <p:nvPr/>
+        </p:nvPicPr>
+        <p:blipFill rotWithShape="1">
+          <a:blip r:embed="rId3">
+            <a:alphaModFix/>
+          </a:blip>
+          <a:srcRect b="12376" l="0" r="9624" t="12384"/>
+          <a:stretch/>
+        </p:blipFill>
+        <p:spPr>
+          <a:xfrm>
+            <a:off x="2538725" y="1428250"/>
+            <a:ext cx="852200" cy="1304325"/>
+          </a:xfrm>
+          <a:prstGeom prst="rect">
+            <a:avLst/>
+          </a:prstGeom>
+          <a:noFill/>
+          <a:ln>
+            <a:noFill/>
+          </a:ln>
+        </p:spPr>
+      </p:pic>
+      <p:sp>
+        <p:nvSpPr>
+          <p:cNvPr id="145" name="Google Shape;145;p18"/>
+          <p:cNvSpPr txBox="1"/>
+          <p:nvPr/>
+        </p:nvSpPr>
+        <p:spPr>
+          <a:xfrm>
+            <a:off x="4918400" y="3291875"/>
+            <a:ext cx="2377200" cy="546900"/>
+          </a:xfrm>
+          <a:prstGeom prst="rect">
+            <a:avLst/>
+          </a:prstGeom>
+          <a:noFill/>
+          <a:ln>
+            <a:noFill/>
+          </a:ln>
+        </p:spPr>
+        <p:txBody>
+          <a:bodyPr anchorCtr="0" anchor="t" bIns="91425" lIns="91425" spcFirstLastPara="1" rIns="91425" wrap="square" tIns="91425">
+            <a:noAutofit/>
+          </a:bodyPr>
+          <a:lstStyle/>
+          <a:p>
+            <a:pPr indent="-317500" lvl="0" marL="457200" marR="0" rtl="0" algn="l">
+              <a:lnSpc>
+                <a:spcPct val="100000"/>
+              </a:lnSpc>
+              <a:spcBef>
+                <a:spcPts val="0"/>
+              </a:spcBef>
+              <a:spcAft>
+                <a:spcPts val="0"/>
+              </a:spcAft>
+              <a:buClr>
+                <a:srgbClr val="000000"/>
+              </a:buClr>
+              <a:buSzPts val="1400"/>
+              <a:buFont typeface="Arial"/>
+              <a:buChar char="●"/>
+            </a:pPr>
+            <a:r>
+              <a:rPr lang="pt-BR"/>
+              <a:t>Receber </a:t>
+            </a:r>
+            <a:r>
+              <a:rPr lang="pt-BR"/>
+              <a:t>devolução</a:t>
+            </a:r>
+            <a:endParaRPr/>
+          </a:p>
+          <a:p>
+            <a:pPr indent="0" lvl="0" marL="457200" marR="0" rtl="0" algn="l">
+              <a:lnSpc>
+                <a:spcPct val="100000"/>
+              </a:lnSpc>
+              <a:spcBef>
+                <a:spcPts val="0"/>
+              </a:spcBef>
+              <a:spcAft>
+                <a:spcPts val="0"/>
+              </a:spcAft>
+              <a:buClr>
+                <a:srgbClr val="000000"/>
+              </a:buClr>
+              <a:buSzPts val="1400"/>
+              <a:buFont typeface="Arial"/>
+              <a:buNone/>
+            </a:pPr>
+            <a:r>
+              <a:t/>
+            </a:r>
+            <a:endParaRPr b="0" i="0" sz="1400" u="none" cap="none" strike="noStrike">
+              <a:solidFill>
+                <a:srgbClr val="000000"/>
+              </a:solidFill>
+              <a:latin typeface="Arial"/>
+              <a:ea typeface="Arial"/>
+              <a:cs typeface="Arial"/>
+              <a:sym typeface="Arial"/>
+            </a:endParaRPr>
+          </a:p>
+        </p:txBody>
+      </p:sp>
+      <p:sp>
+        <p:nvSpPr>
+          <p:cNvPr id="146" name="Google Shape;146;p18"/>
+          <p:cNvSpPr/>
+          <p:nvPr/>
+        </p:nvSpPr>
+        <p:spPr>
+          <a:xfrm>
+            <a:off x="4982725" y="3139475"/>
+            <a:ext cx="80100" cy="728100"/>
+          </a:xfrm>
+          <a:prstGeom prst="leftBracket">
+            <a:avLst>
+              <a:gd fmla="val 8333" name="adj"/>
+            </a:avLst>
+          </a:prstGeom>
+          <a:noFill/>
+          <a:ln cap="flat" cmpd="sng" w="19050">
+            <a:solidFill>
+              <a:srgbClr val="000000"/>
+            </a:solidFill>
+            <a:prstDash val="solid"/>
+            <a:round/>
+            <a:headEnd len="sm" w="sm" type="none"/>
+            <a:tailEnd len="sm" w="sm" type="none"/>
+          </a:ln>
+        </p:spPr>
+        <p:txBody>
+          <a:bodyPr anchorCtr="0" anchor="ctr" bIns="91425" lIns="91425" spcFirstLastPara="1" rIns="91425" wrap="square" tIns="91425">
+            <a:noAutofit/>
+          </a:bodyPr>
+          <a:lstStyle/>
+          <a:p>
+            <a:pPr indent="0" lvl="0" marL="0" marR="0" rtl="0" algn="l">
+              <a:lnSpc>
+                <a:spcPct val="100000"/>
+              </a:lnSpc>
+              <a:spcBef>
+                <a:spcPts val="0"/>
+              </a:spcBef>
+              <a:spcAft>
+                <a:spcPts val="0"/>
+              </a:spcAft>
+              <a:buClr>
+                <a:srgbClr val="000000"/>
+              </a:buClr>
+              <a:buSzPts val="1400"/>
+              <a:buFont typeface="Arial"/>
+              <a:buNone/>
+            </a:pPr>
+            <a:r>
+              <a:t/>
+            </a:r>
+            <a:endParaRPr b="1" i="0" sz="1400" u="none" cap="none" strike="noStrike">
+              <a:solidFill>
+                <a:srgbClr val="000000"/>
+              </a:solidFill>
+              <a:latin typeface="Arial"/>
+              <a:ea typeface="Arial"/>
+              <a:cs typeface="Arial"/>
+              <a:sym typeface="Arial"/>
+            </a:endParaRPr>
+          </a:p>
+        </p:txBody>
+      </p:sp>
+      <p:sp>
+        <p:nvSpPr>
+          <p:cNvPr id="147" name="Google Shape;147;p18"/>
+          <p:cNvSpPr/>
+          <p:nvPr/>
+        </p:nvSpPr>
+        <p:spPr>
+          <a:xfrm>
+            <a:off x="7205675" y="3140950"/>
+            <a:ext cx="80100" cy="728100"/>
+          </a:xfrm>
+          <a:prstGeom prst="rightBracket">
+            <a:avLst>
+              <a:gd fmla="val 8333" name="adj"/>
+            </a:avLst>
+          </a:prstGeom>
+          <a:noFill/>
+          <a:ln cap="flat" cmpd="sng" w="19050">
+            <a:solidFill>
+              <a:srgbClr val="000000"/>
+            </a:solidFill>
+            <a:prstDash val="solid"/>
+            <a:round/>
+            <a:headEnd len="sm" w="sm" type="none"/>
+            <a:tailEnd len="sm" w="sm" type="none"/>
+          </a:ln>
+        </p:spPr>
+        <p:txBody>
+          <a:bodyPr anchorCtr="0" anchor="ctr" bIns="91425" lIns="91425" spcFirstLastPara="1" rIns="91425" wrap="square" tIns="91425">
+            <a:noAutofit/>
+          </a:bodyPr>
+          <a:lstStyle/>
+          <a:p>
+            <a:pPr indent="0" lvl="0" marL="0" marR="0" rtl="0" algn="l">
+              <a:lnSpc>
+                <a:spcPct val="100000"/>
+              </a:lnSpc>
+              <a:spcBef>
+                <a:spcPts val="0"/>
+              </a:spcBef>
+              <a:spcAft>
+                <a:spcPts val="0"/>
+              </a:spcAft>
+              <a:buClr>
+                <a:srgbClr val="000000"/>
+              </a:buClr>
+              <a:buSzPts val="1400"/>
+              <a:buFont typeface="Arial"/>
+              <a:buNone/>
+            </a:pPr>
+            <a:r>
+              <a:t/>
+            </a:r>
+            <a:endParaRPr b="1" i="0" sz="1400" u="none" cap="none" strike="noStrike">
+              <a:solidFill>
+                <a:srgbClr val="000000"/>
+              </a:solidFill>
+              <a:latin typeface="Arial"/>
+              <a:ea typeface="Arial"/>
+              <a:cs typeface="Arial"/>
+              <a:sym typeface="Arial"/>
+            </a:endParaRPr>
+          </a:p>
+        </p:txBody>
+      </p:sp>
+      <p:cxnSp>
+        <p:nvCxnSpPr>
+          <p:cNvPr id="148" name="Google Shape;148;p18"/>
+          <p:cNvCxnSpPr>
+            <a:stCxn id="139" idx="2"/>
+            <a:endCxn id="144" idx="0"/>
+          </p:cNvCxnSpPr>
+          <p:nvPr/>
+        </p:nvCxnSpPr>
+        <p:spPr>
+          <a:xfrm rot="5400000">
+            <a:off x="3331588" y="421983"/>
+            <a:ext cx="639300" cy="1373100"/>
+          </a:xfrm>
+          <a:prstGeom prst="curvedConnector3">
+            <a:avLst>
+              <a:gd fmla="val 56267" name="adj1"/>
+            </a:avLst>
+          </a:prstGeom>
+          <a:noFill/>
+          <a:ln cap="flat" cmpd="sng" w="19050">
+            <a:solidFill>
+              <a:srgbClr val="000000"/>
+            </a:solidFill>
+            <a:prstDash val="solid"/>
+            <a:round/>
+            <a:headEnd len="med" w="med" type="none"/>
+            <a:tailEnd len="med" w="med" type="none"/>
+          </a:ln>
+        </p:spPr>
+      </p:cxnSp>
+      <p:cxnSp>
+        <p:nvCxnSpPr>
+          <p:cNvPr id="149" name="Google Shape;149;p18"/>
+          <p:cNvCxnSpPr>
+            <a:stCxn id="139" idx="2"/>
+            <a:endCxn id="146" idx="1"/>
+          </p:cNvCxnSpPr>
+          <p:nvPr/>
+        </p:nvCxnSpPr>
+        <p:spPr>
+          <a:xfrm flipH="1" rot="-5400000">
+            <a:off x="3302938" y="1823733"/>
+            <a:ext cx="2714700" cy="645000"/>
+          </a:xfrm>
+          <a:prstGeom prst="curvedConnector2">
+            <a:avLst/>
+          </a:prstGeom>
+          <a:noFill/>
+          <a:ln cap="flat" cmpd="sng" w="19050">
+            <a:solidFill>
+              <a:srgbClr val="000000"/>
+            </a:solidFill>
+            <a:prstDash val="solid"/>
+            <a:round/>
+            <a:headEnd len="med" w="med" type="none"/>
+            <a:tailEnd len="med" w="med" type="none"/>
+          </a:ln>
+        </p:spPr>
+      </p:cxnSp>
+      <p:sp>
+        <p:nvSpPr>
+          <p:cNvPr id="150" name="Google Shape;150;p18"/>
           <p:cNvSpPr/>
           <p:nvPr/>
         </p:nvSpPr>
@@ -12889,802 +13642,7 @@
             </a:pPr>
             <a:r>
               <a:rPr lang="pt-BR"/>
-              <a:t>Loja Online</a:t>
-            </a:r>
-            <a:endParaRPr/>
-          </a:p>
-        </p:txBody>
-      </p:sp>
-    </p:spTree>
-  </p:cSld>
-  <p:clrMapOvr>
-    <a:masterClrMapping/>
-  </p:clrMapOvr>
-</p:sld>
-</file>
-
-<file path=ppt/slides/slide6.xml><?xml version="1.0" encoding="utf-8"?>
-<p:sld xmlns:a="http://schemas.openxmlformats.org/drawingml/2006/main" xmlns:r="http://schemas.openxmlformats.org/officeDocument/2006/relationships" xmlns:mc="http://schemas.openxmlformats.org/markup-compatibility/2006" xmlns:mv="urn:schemas-microsoft-com:mac:vml" xmlns:p="http://schemas.openxmlformats.org/presentationml/2006/main" xmlns:c="http://schemas.openxmlformats.org/drawingml/2006/chart" xmlns:dgm="http://schemas.openxmlformats.org/drawingml/2006/diagram" xmlns:o="urn:schemas-microsoft-com:office:office" xmlns:v="urn:schemas-microsoft-com:vml" xmlns:pvml="urn:schemas-microsoft-com:office:powerpoint" xmlns:com="http://schemas.openxmlformats.org/drawingml/2006/compatibility" xmlns:p14="http://schemas.microsoft.com/office/powerpoint/2010/main" xmlns:p15="http://schemas.microsoft.com/office/powerpoint/2012/main">
-  <p:cSld>
-    <p:spTree>
-      <p:nvGrpSpPr>
-        <p:cNvPr id="134" name="Shape 134"/>
-        <p:cNvGrpSpPr/>
-        <p:nvPr/>
-      </p:nvGrpSpPr>
-      <p:grpSpPr>
-        <a:xfrm>
-          <a:off x="0" y="0"/>
-          <a:ext cx="0" cy="0"/>
-          <a:chOff x="0" y="0"/>
-          <a:chExt cx="0" cy="0"/>
-        </a:xfrm>
-      </p:grpSpPr>
-      <p:sp>
-        <p:nvSpPr>
-          <p:cNvPr id="135" name="Google Shape;135;p18"/>
-          <p:cNvSpPr/>
-          <p:nvPr/>
-        </p:nvSpPr>
-        <p:spPr>
-          <a:xfrm>
-            <a:off x="241100" y="1360375"/>
-            <a:ext cx="8733300" cy="3589800"/>
-          </a:xfrm>
-          <a:prstGeom prst="rect">
-            <a:avLst/>
-          </a:prstGeom>
-          <a:solidFill>
-            <a:srgbClr val="FFFFFF"/>
-          </a:solidFill>
-          <a:ln cap="flat" cmpd="sng" w="19050">
-            <a:solidFill>
-              <a:srgbClr val="000000"/>
-            </a:solidFill>
-            <a:prstDash val="solid"/>
-            <a:round/>
-            <a:headEnd len="sm" w="sm" type="none"/>
-            <a:tailEnd len="sm" w="sm" type="none"/>
-          </a:ln>
-        </p:spPr>
-        <p:txBody>
-          <a:bodyPr anchorCtr="0" anchor="ctr" bIns="91425" lIns="91425" spcFirstLastPara="1" rIns="91425" wrap="square" tIns="91425">
-            <a:noAutofit/>
-          </a:bodyPr>
-          <a:lstStyle/>
-          <a:p>
-            <a:pPr indent="0" lvl="0" marL="0" marR="0" rtl="0" algn="l">
-              <a:lnSpc>
-                <a:spcPct val="100000"/>
-              </a:lnSpc>
-              <a:spcBef>
-                <a:spcPts val="0"/>
-              </a:spcBef>
-              <a:spcAft>
-                <a:spcPts val="0"/>
-              </a:spcAft>
-              <a:buClr>
-                <a:srgbClr val="000000"/>
-              </a:buClr>
-              <a:buSzPts val="1400"/>
-              <a:buFont typeface="Arial"/>
-              <a:buNone/>
-            </a:pPr>
-            <a:r>
-              <a:t/>
-            </a:r>
-            <a:endParaRPr b="0" i="0" sz="1400" u="none" cap="none" strike="noStrike">
-              <a:solidFill>
-                <a:srgbClr val="000000"/>
-              </a:solidFill>
-              <a:latin typeface="Arial"/>
-              <a:ea typeface="Arial"/>
-              <a:cs typeface="Arial"/>
-              <a:sym typeface="Arial"/>
-            </a:endParaRPr>
-          </a:p>
-        </p:txBody>
-      </p:sp>
-      <p:sp>
-        <p:nvSpPr>
-          <p:cNvPr id="136" name="Google Shape;136;p18"/>
-          <p:cNvSpPr/>
-          <p:nvPr/>
-        </p:nvSpPr>
-        <p:spPr>
-          <a:xfrm>
-            <a:off x="3411525" y="68275"/>
-            <a:ext cx="1852525" cy="800675"/>
-          </a:xfrm>
-          <a:prstGeom prst="flowChartPunchedTape">
-            <a:avLst/>
-          </a:prstGeom>
-          <a:solidFill>
-            <a:srgbClr val="EAD1DC"/>
-          </a:solidFill>
-          <a:ln cap="flat" cmpd="sng" w="9525">
-            <a:solidFill>
-              <a:srgbClr val="000000"/>
-            </a:solidFill>
-            <a:prstDash val="solid"/>
-            <a:round/>
-            <a:headEnd len="sm" w="sm" type="none"/>
-            <a:tailEnd len="sm" w="sm" type="none"/>
-          </a:ln>
-        </p:spPr>
-        <p:txBody>
-          <a:bodyPr anchorCtr="0" anchor="ctr" bIns="91425" lIns="91425" spcFirstLastPara="1" rIns="91425" wrap="square" tIns="91425">
-            <a:noAutofit/>
-          </a:bodyPr>
-          <a:lstStyle/>
-          <a:p>
-            <a:pPr indent="0" lvl="0" marL="0" marR="0" rtl="0" algn="l">
-              <a:lnSpc>
-                <a:spcPct val="100000"/>
-              </a:lnSpc>
-              <a:spcBef>
-                <a:spcPts val="0"/>
-              </a:spcBef>
-              <a:spcAft>
-                <a:spcPts val="0"/>
-              </a:spcAft>
-              <a:buClr>
-                <a:srgbClr val="000000"/>
-              </a:buClr>
-              <a:buSzPts val="1400"/>
-              <a:buFont typeface="Arial"/>
-              <a:buNone/>
-            </a:pPr>
-            <a:r>
-              <a:t/>
-            </a:r>
-            <a:endParaRPr b="0" i="0" sz="1400" u="none" cap="none" strike="noStrike">
-              <a:solidFill>
-                <a:srgbClr val="000000"/>
-              </a:solidFill>
-              <a:latin typeface="Arial"/>
-              <a:ea typeface="Arial"/>
-              <a:cs typeface="Arial"/>
-              <a:sym typeface="Arial"/>
-            </a:endParaRPr>
-          </a:p>
-        </p:txBody>
-      </p:sp>
-      <p:sp>
-        <p:nvSpPr>
-          <p:cNvPr id="137" name="Google Shape;137;p18"/>
-          <p:cNvSpPr txBox="1"/>
-          <p:nvPr/>
-        </p:nvSpPr>
-        <p:spPr>
-          <a:xfrm>
-            <a:off x="231875" y="1324375"/>
-            <a:ext cx="1852500" cy="334800"/>
-          </a:xfrm>
-          <a:prstGeom prst="rect">
-            <a:avLst/>
-          </a:prstGeom>
-          <a:noFill/>
-          <a:ln>
-            <a:noFill/>
-          </a:ln>
-        </p:spPr>
-        <p:txBody>
-          <a:bodyPr anchorCtr="0" anchor="t" bIns="91425" lIns="91425" spcFirstLastPara="1" rIns="91425" wrap="square" tIns="91425">
-            <a:noAutofit/>
-          </a:bodyPr>
-          <a:lstStyle/>
-          <a:p>
-            <a:pPr indent="0" lvl="0" marL="0" marR="0" rtl="0" algn="l">
-              <a:lnSpc>
-                <a:spcPct val="100000"/>
-              </a:lnSpc>
-              <a:spcBef>
-                <a:spcPts val="0"/>
-              </a:spcBef>
-              <a:spcAft>
-                <a:spcPts val="0"/>
-              </a:spcAft>
-              <a:buClr>
-                <a:srgbClr val="000000"/>
-              </a:buClr>
-              <a:buSzPts val="1400"/>
-              <a:buFont typeface="Arial"/>
-              <a:buNone/>
-            </a:pPr>
-            <a:r>
-              <a:rPr b="1" i="0" lang="pt-BR" sz="1400" u="none" cap="none" strike="noStrike">
-                <a:solidFill>
-                  <a:srgbClr val="000000"/>
-                </a:solidFill>
-                <a:latin typeface="Arial"/>
-                <a:ea typeface="Arial"/>
-                <a:cs typeface="Arial"/>
-                <a:sym typeface="Arial"/>
-              </a:rPr>
-              <a:t>Nós Operacionais</a:t>
-            </a:r>
-            <a:endParaRPr b="1" i="0" sz="1400" u="none" cap="none" strike="noStrike">
-              <a:solidFill>
-                <a:srgbClr val="000000"/>
-              </a:solidFill>
-              <a:latin typeface="Arial"/>
-              <a:ea typeface="Arial"/>
-              <a:cs typeface="Arial"/>
-              <a:sym typeface="Arial"/>
-            </a:endParaRPr>
-          </a:p>
-        </p:txBody>
-      </p:sp>
-      <p:cxnSp>
-        <p:nvCxnSpPr>
-          <p:cNvPr id="138" name="Google Shape;138;p18"/>
-          <p:cNvCxnSpPr/>
-          <p:nvPr/>
-        </p:nvCxnSpPr>
-        <p:spPr>
-          <a:xfrm>
-            <a:off x="254500" y="2745075"/>
-            <a:ext cx="8733300" cy="0"/>
-          </a:xfrm>
-          <a:prstGeom prst="straightConnector1">
-            <a:avLst/>
-          </a:prstGeom>
-          <a:noFill/>
-          <a:ln cap="flat" cmpd="sng" w="19050">
-            <a:solidFill>
-              <a:srgbClr val="000000"/>
-            </a:solidFill>
-            <a:prstDash val="solid"/>
-            <a:round/>
-            <a:headEnd len="sm" w="sm" type="none"/>
-            <a:tailEnd len="sm" w="sm" type="none"/>
-          </a:ln>
-        </p:spPr>
-      </p:cxnSp>
-      <p:sp>
-        <p:nvSpPr>
-          <p:cNvPr id="139" name="Google Shape;139;p18"/>
-          <p:cNvSpPr txBox="1"/>
-          <p:nvPr/>
-        </p:nvSpPr>
-        <p:spPr>
-          <a:xfrm>
-            <a:off x="218475" y="2757575"/>
-            <a:ext cx="2540700" cy="420300"/>
-          </a:xfrm>
-          <a:prstGeom prst="rect">
-            <a:avLst/>
-          </a:prstGeom>
-          <a:noFill/>
-          <a:ln>
-            <a:noFill/>
-          </a:ln>
-        </p:spPr>
-        <p:txBody>
-          <a:bodyPr anchorCtr="0" anchor="t" bIns="91425" lIns="91425" spcFirstLastPara="1" rIns="91425" wrap="square" tIns="91425">
-            <a:noAutofit/>
-          </a:bodyPr>
-          <a:lstStyle/>
-          <a:p>
-            <a:pPr indent="0" lvl="0" marL="0" marR="0" rtl="0" algn="l">
-              <a:lnSpc>
-                <a:spcPct val="100000"/>
-              </a:lnSpc>
-              <a:spcBef>
-                <a:spcPts val="0"/>
-              </a:spcBef>
-              <a:spcAft>
-                <a:spcPts val="0"/>
-              </a:spcAft>
-              <a:buClr>
-                <a:srgbClr val="000000"/>
-              </a:buClr>
-              <a:buSzPts val="1400"/>
-              <a:buFont typeface="Arial"/>
-              <a:buNone/>
-            </a:pPr>
-            <a:r>
-              <a:rPr b="1" i="0" lang="pt-BR" sz="1400" u="none" cap="none" strike="noStrike">
-                <a:solidFill>
-                  <a:srgbClr val="000000"/>
-                </a:solidFill>
-                <a:latin typeface="Arial"/>
-                <a:ea typeface="Arial"/>
-                <a:cs typeface="Arial"/>
-                <a:sym typeface="Arial"/>
-              </a:rPr>
-              <a:t>Capacidades</a:t>
-            </a:r>
-            <a:endParaRPr b="1" i="0" sz="1400" u="none" cap="none" strike="noStrike">
-              <a:solidFill>
-                <a:srgbClr val="000000"/>
-              </a:solidFill>
-              <a:latin typeface="Arial"/>
-              <a:ea typeface="Arial"/>
-              <a:cs typeface="Arial"/>
-              <a:sym typeface="Arial"/>
-            </a:endParaRPr>
-          </a:p>
-          <a:p>
-            <a:pPr indent="0" lvl="0" marL="0" marR="0" rtl="0" algn="l">
-              <a:lnSpc>
-                <a:spcPct val="100000"/>
-              </a:lnSpc>
-              <a:spcBef>
-                <a:spcPts val="0"/>
-              </a:spcBef>
-              <a:spcAft>
-                <a:spcPts val="0"/>
-              </a:spcAft>
-              <a:buClr>
-                <a:srgbClr val="000000"/>
-              </a:buClr>
-              <a:buSzPts val="1400"/>
-              <a:buFont typeface="Arial"/>
-              <a:buNone/>
-            </a:pPr>
-            <a:r>
-              <a:rPr b="1" i="0" lang="pt-BR" sz="1400" u="none" cap="none" strike="noStrike">
-                <a:solidFill>
-                  <a:srgbClr val="000000"/>
-                </a:solidFill>
-                <a:latin typeface="Arial"/>
-                <a:ea typeface="Arial"/>
-                <a:cs typeface="Arial"/>
-                <a:sym typeface="Arial"/>
-              </a:rPr>
-              <a:t>Operacionais</a:t>
-            </a:r>
-            <a:endParaRPr b="1" i="0" sz="1400" u="none" cap="none" strike="noStrike">
-              <a:solidFill>
-                <a:srgbClr val="000000"/>
-              </a:solidFill>
-              <a:latin typeface="Arial"/>
-              <a:ea typeface="Arial"/>
-              <a:cs typeface="Arial"/>
-              <a:sym typeface="Arial"/>
-            </a:endParaRPr>
-          </a:p>
-        </p:txBody>
-      </p:sp>
-      <p:sp>
-        <p:nvSpPr>
-          <p:cNvPr id="140" name="Google Shape;140;p18"/>
-          <p:cNvSpPr txBox="1"/>
-          <p:nvPr/>
-        </p:nvSpPr>
-        <p:spPr>
-          <a:xfrm>
-            <a:off x="3225988" y="191300"/>
-            <a:ext cx="2223600" cy="420300"/>
-          </a:xfrm>
-          <a:prstGeom prst="rect">
-            <a:avLst/>
-          </a:prstGeom>
-          <a:noFill/>
-          <a:ln>
-            <a:noFill/>
-          </a:ln>
-        </p:spPr>
-        <p:txBody>
-          <a:bodyPr anchorCtr="0" anchor="t" bIns="91425" lIns="91425" spcFirstLastPara="1" rIns="91425" wrap="square" tIns="91425">
-            <a:noAutofit/>
-          </a:bodyPr>
-          <a:lstStyle/>
-          <a:p>
-            <a:pPr indent="0" lvl="0" marL="0" marR="0" rtl="0" algn="ctr">
-              <a:lnSpc>
-                <a:spcPct val="100000"/>
-              </a:lnSpc>
-              <a:spcBef>
-                <a:spcPts val="0"/>
-              </a:spcBef>
-              <a:spcAft>
-                <a:spcPts val="0"/>
-              </a:spcAft>
-              <a:buClr>
-                <a:srgbClr val="000000"/>
-              </a:buClr>
-              <a:buSzPts val="1400"/>
-              <a:buFont typeface="Arial"/>
-              <a:buNone/>
-            </a:pPr>
-            <a:r>
-              <a:rPr lang="pt-BR"/>
-              <a:t>Entregar pedido</a:t>
-            </a:r>
-            <a:endParaRPr/>
-          </a:p>
-          <a:p>
-            <a:pPr indent="0" lvl="0" marL="0" marR="0" rtl="0" algn="ctr">
-              <a:lnSpc>
-                <a:spcPct val="100000"/>
-              </a:lnSpc>
-              <a:spcBef>
-                <a:spcPts val="0"/>
-              </a:spcBef>
-              <a:spcAft>
-                <a:spcPts val="0"/>
-              </a:spcAft>
-              <a:buClr>
-                <a:srgbClr val="000000"/>
-              </a:buClr>
-              <a:buSzPts val="1400"/>
-              <a:buFont typeface="Arial"/>
-              <a:buNone/>
-            </a:pPr>
-            <a:r>
-              <a:rPr lang="pt-BR"/>
-              <a:t>de compra</a:t>
-            </a:r>
-            <a:endParaRPr/>
-          </a:p>
-        </p:txBody>
-      </p:sp>
-      <p:pic>
-        <p:nvPicPr>
-          <p:cNvPr id="141" name="Google Shape;141;p18"/>
-          <p:cNvPicPr preferRelativeResize="0"/>
-          <p:nvPr/>
-        </p:nvPicPr>
-        <p:blipFill rotWithShape="1">
-          <a:blip r:embed="rId3">
-            <a:alphaModFix/>
-          </a:blip>
-          <a:srcRect b="12376" l="0" r="9624" t="12384"/>
-          <a:stretch/>
-        </p:blipFill>
-        <p:spPr>
-          <a:xfrm>
-            <a:off x="2538725" y="1428250"/>
-            <a:ext cx="852200" cy="1304325"/>
-          </a:xfrm>
-          <a:prstGeom prst="rect">
-            <a:avLst/>
-          </a:prstGeom>
-          <a:noFill/>
-          <a:ln>
-            <a:noFill/>
-          </a:ln>
-        </p:spPr>
-      </p:pic>
-      <p:sp>
-        <p:nvSpPr>
-          <p:cNvPr id="142" name="Google Shape;142;p18"/>
-          <p:cNvSpPr txBox="1"/>
-          <p:nvPr/>
-        </p:nvSpPr>
-        <p:spPr>
-          <a:xfrm>
-            <a:off x="4918400" y="3215675"/>
-            <a:ext cx="2377200" cy="546900"/>
-          </a:xfrm>
-          <a:prstGeom prst="rect">
-            <a:avLst/>
-          </a:prstGeom>
-          <a:noFill/>
-          <a:ln>
-            <a:noFill/>
-          </a:ln>
-        </p:spPr>
-        <p:txBody>
-          <a:bodyPr anchorCtr="0" anchor="t" bIns="91425" lIns="91425" spcFirstLastPara="1" rIns="91425" wrap="square" tIns="91425">
-            <a:noAutofit/>
-          </a:bodyPr>
-          <a:lstStyle/>
-          <a:p>
-            <a:pPr indent="-317500" lvl="0" marL="457200" marR="0" rtl="0" algn="l">
-              <a:lnSpc>
-                <a:spcPct val="100000"/>
-              </a:lnSpc>
-              <a:spcBef>
-                <a:spcPts val="0"/>
-              </a:spcBef>
-              <a:spcAft>
-                <a:spcPts val="0"/>
-              </a:spcAft>
-              <a:buClr>
-                <a:srgbClr val="000000"/>
-              </a:buClr>
-              <a:buSzPts val="1400"/>
-              <a:buFont typeface="Arial"/>
-              <a:buChar char="●"/>
-            </a:pPr>
-            <a:r>
-              <a:rPr lang="pt-BR"/>
-              <a:t>Realizar entrega de produtos</a:t>
-            </a:r>
-            <a:endParaRPr/>
-          </a:p>
-          <a:p>
-            <a:pPr indent="-317500" lvl="0" marL="457200" marR="0" rtl="0" algn="l">
-              <a:lnSpc>
-                <a:spcPct val="100000"/>
-              </a:lnSpc>
-              <a:spcBef>
-                <a:spcPts val="0"/>
-              </a:spcBef>
-              <a:spcAft>
-                <a:spcPts val="0"/>
-              </a:spcAft>
-              <a:buSzPts val="1400"/>
-              <a:buChar char="●"/>
-            </a:pPr>
-            <a:r>
-              <a:rPr lang="pt-BR"/>
-              <a:t>Confirmação de entrega</a:t>
-            </a:r>
-            <a:endParaRPr/>
-          </a:p>
-          <a:p>
-            <a:pPr indent="0" lvl="0" marL="457200" marR="0" rtl="0" algn="l">
-              <a:lnSpc>
-                <a:spcPct val="100000"/>
-              </a:lnSpc>
-              <a:spcBef>
-                <a:spcPts val="0"/>
-              </a:spcBef>
-              <a:spcAft>
-                <a:spcPts val="0"/>
-              </a:spcAft>
-              <a:buClr>
-                <a:srgbClr val="000000"/>
-              </a:buClr>
-              <a:buSzPts val="1400"/>
-              <a:buFont typeface="Arial"/>
-              <a:buNone/>
-            </a:pPr>
-            <a:r>
-              <a:t/>
-            </a:r>
-            <a:endParaRPr b="0" i="0" sz="1400" u="none" cap="none" strike="noStrike">
-              <a:solidFill>
-                <a:srgbClr val="000000"/>
-              </a:solidFill>
-              <a:latin typeface="Arial"/>
-              <a:ea typeface="Arial"/>
-              <a:cs typeface="Arial"/>
-              <a:sym typeface="Arial"/>
-            </a:endParaRPr>
-          </a:p>
-        </p:txBody>
-      </p:sp>
-      <p:sp>
-        <p:nvSpPr>
-          <p:cNvPr id="143" name="Google Shape;143;p18"/>
-          <p:cNvSpPr/>
-          <p:nvPr/>
-        </p:nvSpPr>
-        <p:spPr>
-          <a:xfrm>
-            <a:off x="4982725" y="3291875"/>
-            <a:ext cx="80100" cy="884700"/>
-          </a:xfrm>
-          <a:prstGeom prst="leftBracket">
-            <a:avLst>
-              <a:gd fmla="val 8333" name="adj"/>
-            </a:avLst>
-          </a:prstGeom>
-          <a:noFill/>
-          <a:ln cap="flat" cmpd="sng" w="19050">
-            <a:solidFill>
-              <a:srgbClr val="000000"/>
-            </a:solidFill>
-            <a:prstDash val="solid"/>
-            <a:round/>
-            <a:headEnd len="sm" w="sm" type="none"/>
-            <a:tailEnd len="sm" w="sm" type="none"/>
-          </a:ln>
-        </p:spPr>
-        <p:txBody>
-          <a:bodyPr anchorCtr="0" anchor="ctr" bIns="91425" lIns="91425" spcFirstLastPara="1" rIns="91425" wrap="square" tIns="91425">
-            <a:noAutofit/>
-          </a:bodyPr>
-          <a:lstStyle/>
-          <a:p>
-            <a:pPr indent="0" lvl="0" marL="0" marR="0" rtl="0" algn="l">
-              <a:lnSpc>
-                <a:spcPct val="100000"/>
-              </a:lnSpc>
-              <a:spcBef>
-                <a:spcPts val="0"/>
-              </a:spcBef>
-              <a:spcAft>
-                <a:spcPts val="0"/>
-              </a:spcAft>
-              <a:buClr>
-                <a:srgbClr val="000000"/>
-              </a:buClr>
-              <a:buSzPts val="1400"/>
-              <a:buFont typeface="Arial"/>
-              <a:buNone/>
-            </a:pPr>
-            <a:r>
-              <a:t/>
-            </a:r>
-            <a:endParaRPr b="1" i="0" sz="1400" u="none" cap="none" strike="noStrike">
-              <a:solidFill>
-                <a:srgbClr val="000000"/>
-              </a:solidFill>
-              <a:latin typeface="Arial"/>
-              <a:ea typeface="Arial"/>
-              <a:cs typeface="Arial"/>
-              <a:sym typeface="Arial"/>
-            </a:endParaRPr>
-          </a:p>
-        </p:txBody>
-      </p:sp>
-      <p:sp>
-        <p:nvSpPr>
-          <p:cNvPr id="144" name="Google Shape;144;p18"/>
-          <p:cNvSpPr/>
-          <p:nvPr/>
-        </p:nvSpPr>
-        <p:spPr>
-          <a:xfrm>
-            <a:off x="7358075" y="3293350"/>
-            <a:ext cx="80100" cy="950400"/>
-          </a:xfrm>
-          <a:prstGeom prst="rightBracket">
-            <a:avLst>
-              <a:gd fmla="val 8333" name="adj"/>
-            </a:avLst>
-          </a:prstGeom>
-          <a:noFill/>
-          <a:ln cap="flat" cmpd="sng" w="19050">
-            <a:solidFill>
-              <a:srgbClr val="000000"/>
-            </a:solidFill>
-            <a:prstDash val="solid"/>
-            <a:round/>
-            <a:headEnd len="sm" w="sm" type="none"/>
-            <a:tailEnd len="sm" w="sm" type="none"/>
-          </a:ln>
-        </p:spPr>
-        <p:txBody>
-          <a:bodyPr anchorCtr="0" anchor="ctr" bIns="91425" lIns="91425" spcFirstLastPara="1" rIns="91425" wrap="square" tIns="91425">
-            <a:noAutofit/>
-          </a:bodyPr>
-          <a:lstStyle/>
-          <a:p>
-            <a:pPr indent="0" lvl="0" marL="0" marR="0" rtl="0" algn="l">
-              <a:lnSpc>
-                <a:spcPct val="100000"/>
-              </a:lnSpc>
-              <a:spcBef>
-                <a:spcPts val="0"/>
-              </a:spcBef>
-              <a:spcAft>
-                <a:spcPts val="0"/>
-              </a:spcAft>
-              <a:buClr>
-                <a:srgbClr val="000000"/>
-              </a:buClr>
-              <a:buSzPts val="1400"/>
-              <a:buFont typeface="Arial"/>
-              <a:buNone/>
-            </a:pPr>
-            <a:r>
-              <a:t/>
-            </a:r>
-            <a:endParaRPr b="1" i="0" sz="1400" u="none" cap="none" strike="noStrike">
-              <a:solidFill>
-                <a:srgbClr val="000000"/>
-              </a:solidFill>
-              <a:latin typeface="Arial"/>
-              <a:ea typeface="Arial"/>
-              <a:cs typeface="Arial"/>
-              <a:sym typeface="Arial"/>
-            </a:endParaRPr>
-          </a:p>
-        </p:txBody>
-      </p:sp>
-      <p:cxnSp>
-        <p:nvCxnSpPr>
-          <p:cNvPr id="145" name="Google Shape;145;p18"/>
-          <p:cNvCxnSpPr>
-            <a:stCxn id="136" idx="2"/>
-            <a:endCxn id="141" idx="0"/>
-          </p:cNvCxnSpPr>
-          <p:nvPr/>
-        </p:nvCxnSpPr>
-        <p:spPr>
-          <a:xfrm rot="5400000">
-            <a:off x="3331588" y="421983"/>
-            <a:ext cx="639300" cy="1373100"/>
-          </a:xfrm>
-          <a:prstGeom prst="curvedConnector3">
-            <a:avLst>
-              <a:gd fmla="val 56267" name="adj1"/>
-            </a:avLst>
-          </a:prstGeom>
-          <a:noFill/>
-          <a:ln cap="flat" cmpd="sng" w="19050">
-            <a:solidFill>
-              <a:srgbClr val="000000"/>
-            </a:solidFill>
-            <a:prstDash val="solid"/>
-            <a:round/>
-            <a:headEnd len="med" w="med" type="none"/>
-            <a:tailEnd len="med" w="med" type="none"/>
-          </a:ln>
-        </p:spPr>
-      </p:cxnSp>
-      <p:cxnSp>
-        <p:nvCxnSpPr>
-          <p:cNvPr id="146" name="Google Shape;146;p18"/>
-          <p:cNvCxnSpPr>
-            <a:stCxn id="136" idx="2"/>
-            <a:endCxn id="143" idx="1"/>
-          </p:cNvCxnSpPr>
-          <p:nvPr/>
-        </p:nvCxnSpPr>
-        <p:spPr>
-          <a:xfrm flipH="1" rot="-5400000">
-            <a:off x="3187588" y="1939083"/>
-            <a:ext cx="2945400" cy="645000"/>
-          </a:xfrm>
-          <a:prstGeom prst="curvedConnector2">
-            <a:avLst/>
-          </a:prstGeom>
-          <a:noFill/>
-          <a:ln cap="flat" cmpd="sng" w="19050">
-            <a:solidFill>
-              <a:srgbClr val="000000"/>
-            </a:solidFill>
-            <a:prstDash val="solid"/>
-            <a:round/>
-            <a:headEnd len="med" w="med" type="none"/>
-            <a:tailEnd len="med" w="med" type="none"/>
-          </a:ln>
-        </p:spPr>
-      </p:cxnSp>
-      <p:sp>
-        <p:nvSpPr>
-          <p:cNvPr id="147" name="Google Shape;147;p18"/>
-          <p:cNvSpPr/>
-          <p:nvPr/>
-        </p:nvSpPr>
-        <p:spPr>
-          <a:xfrm>
-            <a:off x="3999600" y="2014725"/>
-            <a:ext cx="1014300" cy="443100"/>
-          </a:xfrm>
-          <a:prstGeom prst="rect">
-            <a:avLst/>
-          </a:prstGeom>
-          <a:solidFill>
-            <a:srgbClr val="C9DAF8"/>
-          </a:solidFill>
-          <a:ln cap="flat" cmpd="sng" w="9525">
-            <a:solidFill>
-              <a:srgbClr val="000000"/>
-            </a:solidFill>
-            <a:prstDash val="solid"/>
-            <a:round/>
-            <a:headEnd len="sm" w="sm" type="none"/>
-            <a:tailEnd len="sm" w="sm" type="none"/>
-          </a:ln>
-        </p:spPr>
-        <p:txBody>
-          <a:bodyPr anchorCtr="0" anchor="ctr" bIns="91425" lIns="91425" spcFirstLastPara="1" rIns="91425" wrap="square" tIns="91425">
-            <a:noAutofit/>
-          </a:bodyPr>
-          <a:lstStyle/>
-          <a:p>
-            <a:pPr indent="0" lvl="0" marL="0" rtl="0" algn="ctr">
-              <a:spcBef>
-                <a:spcPts val="0"/>
-              </a:spcBef>
-              <a:spcAft>
-                <a:spcPts val="0"/>
-              </a:spcAft>
-              <a:buNone/>
-            </a:pPr>
-            <a:r>
-              <a:rPr lang="pt-BR"/>
-              <a:t>Setor Correio</a:t>
+              <a:t>Loja</a:t>
             </a:r>
             <a:endParaRPr/>
           </a:p>
@@ -13699,6 +13657,285 @@
 </file>
 
 <file path=ppt/theme/theme1.xml><?xml version="1.0" encoding="utf-8"?>
+<a:theme xmlns:a="http://schemas.openxmlformats.org/drawingml/2006/main" xmlns:r="http://schemas.openxmlformats.org/officeDocument/2006/relationships">
+  <a:themeElements>
+    <a:clrScheme name="Default">
+      <a:dk1>
+        <a:srgbClr val="000000"/>
+      </a:dk1>
+      <a:lt1>
+        <a:srgbClr val="FFFFFF"/>
+      </a:lt1>
+      <a:dk2>
+        <a:srgbClr val="158158"/>
+      </a:dk2>
+      <a:lt2>
+        <a:srgbClr val="F3F3F3"/>
+      </a:lt2>
+      <a:accent1>
+        <a:srgbClr val="058DC7"/>
+      </a:accent1>
+      <a:accent2>
+        <a:srgbClr val="50B432"/>
+      </a:accent2>
+      <a:accent3>
+        <a:srgbClr val="ED561B"/>
+      </a:accent3>
+      <a:accent4>
+        <a:srgbClr val="EDEF00"/>
+      </a:accent4>
+      <a:accent5>
+        <a:srgbClr val="24CBE5"/>
+      </a:accent5>
+      <a:accent6>
+        <a:srgbClr val="64E572"/>
+      </a:accent6>
+      <a:hlink>
+        <a:srgbClr val="2200CC"/>
+      </a:hlink>
+      <a:folHlink>
+        <a:srgbClr val="551A8B"/>
+      </a:folHlink>
+    </a:clrScheme>
+    <a:fontScheme name="Office">
+      <a:majorFont>
+        <a:latin typeface="Arial"/>
+        <a:ea typeface=""/>
+        <a:cs typeface=""/>
+        <a:font script="Jpan" typeface="ＭＳ Ｐゴシック"/>
+        <a:font script="Hang" typeface="맑은 고딕"/>
+        <a:font script="Hans" typeface="宋体"/>
+        <a:font script="Hant" typeface="新細明體"/>
+        <a:font script="Arab" typeface="Times New Roman"/>
+        <a:font script="Hebr" typeface="Times New Roman"/>
+        <a:font script="Thai" typeface="Angsana New"/>
+        <a:font script="Ethi" typeface="Nyala"/>
+        <a:font script="Beng" typeface="Vrinda"/>
+        <a:font script="Gujr" typeface="Shruti"/>
+        <a:font script="Khmr" typeface="MoolBoran"/>
+        <a:font script="Knda" typeface="Tunga"/>
+        <a:font script="Guru" typeface="Raavi"/>
+        <a:font script="Cans" typeface="Euphemia"/>
+        <a:font script="Cher" typeface="Plantagenet Cherokee"/>
+        <a:font script="Yiii" typeface="Microsoft Yi Baiti"/>
+        <a:font script="Tibt" typeface="Microsoft Himalaya"/>
+        <a:font script="Thaa" typeface="MV Boli"/>
+        <a:font script="Deva" typeface="Mangal"/>
+        <a:font script="Telu" typeface="Gautami"/>
+        <a:font script="Taml" typeface="Latha"/>
+        <a:font script="Syrc" typeface="Estrangelo Edessa"/>
+        <a:font script="Orya" typeface="Kalinga"/>
+        <a:font script="Mlym" typeface="Kartika"/>
+        <a:font script="Laoo" typeface="DokChampa"/>
+        <a:font script="Sinh" typeface="Iskoola Pota"/>
+        <a:font script="Mong" typeface="Mongolian Baiti"/>
+        <a:font script="Viet" typeface="Times New Roman"/>
+        <a:font script="Uigh" typeface="Microsoft Uighur"/>
+        <a:font script="Geor" typeface="Sylfaen"/>
+      </a:majorFont>
+      <a:minorFont>
+        <a:latin typeface="Arial"/>
+        <a:ea typeface=""/>
+        <a:cs typeface=""/>
+        <a:font script="Jpan" typeface="ＭＳ Ｐゴシック"/>
+        <a:font script="Hang" typeface="맑은 고딕"/>
+        <a:font script="Hans" typeface="宋体"/>
+        <a:font script="Hant" typeface="新細明體"/>
+        <a:font script="Arab" typeface="Arial"/>
+        <a:font script="Hebr" typeface="Arial"/>
+        <a:font script="Thai" typeface="Cordia New"/>
+        <a:font script="Ethi" typeface="Nyala"/>
+        <a:font script="Beng" typeface="Vrinda"/>
+        <a:font script="Gujr" typeface="Shruti"/>
+        <a:font script="Khmr" typeface="DaunPenh"/>
+        <a:font script="Knda" typeface="Tunga"/>
+        <a:font script="Guru" typeface="Raavi"/>
+        <a:font script="Cans" typeface="Euphemia"/>
+        <a:font script="Cher" typeface="Plantagenet Cherokee"/>
+        <a:font script="Yiii" typeface="Microsoft Yi Baiti"/>
+        <a:font script="Tibt" typeface="Microsoft Himalaya"/>
+        <a:font script="Thaa" typeface="MV Boli"/>
+        <a:font script="Deva" typeface="Mangal"/>
+        <a:font script="Telu" typeface="Gautami"/>
+        <a:font script="Taml" typeface="Latha"/>
+        <a:font script="Syrc" typeface="Estrangelo Edessa"/>
+        <a:font script="Orya" typeface="Kalinga"/>
+        <a:font script="Mlym" typeface="Kartika"/>
+        <a:font script="Laoo" typeface="DokChampa"/>
+        <a:font script="Sinh" typeface="Iskoola Pota"/>
+        <a:font script="Mong" typeface="Mongolian Baiti"/>
+        <a:font script="Viet" typeface="Arial"/>
+        <a:font script="Uigh" typeface="Microsoft Uighur"/>
+        <a:font script="Geor" typeface="Sylfaen"/>
+      </a:minorFont>
+    </a:fontScheme>
+    <a:fmtScheme name="Office">
+      <a:fillStyleLst>
+        <a:solidFill>
+          <a:schemeClr val="phClr"/>
+        </a:solidFill>
+        <a:gradFill rotWithShape="1">
+          <a:gsLst>
+            <a:gs pos="0">
+              <a:schemeClr val="phClr">
+                <a:tint val="50000"/>
+                <a:satMod val="300000"/>
+              </a:schemeClr>
+            </a:gs>
+            <a:gs pos="35000">
+              <a:schemeClr val="phClr">
+                <a:tint val="37000"/>
+                <a:satMod val="300000"/>
+              </a:schemeClr>
+            </a:gs>
+            <a:gs pos="100000">
+              <a:schemeClr val="phClr">
+                <a:tint val="15000"/>
+                <a:satMod val="350000"/>
+              </a:schemeClr>
+            </a:gs>
+          </a:gsLst>
+          <a:lin ang="16200000" scaled="1"/>
+        </a:gradFill>
+        <a:gradFill rotWithShape="1">
+          <a:gsLst>
+            <a:gs pos="0">
+              <a:schemeClr val="phClr">
+                <a:tint val="100000"/>
+                <a:shade val="100000"/>
+                <a:satMod val="130000"/>
+              </a:schemeClr>
+            </a:gs>
+            <a:gs pos="100000">
+              <a:schemeClr val="phClr">
+                <a:tint val="50000"/>
+                <a:shade val="100000"/>
+                <a:satMod val="350000"/>
+              </a:schemeClr>
+            </a:gs>
+          </a:gsLst>
+          <a:lin ang="16200000" scaled="0"/>
+        </a:gradFill>
+      </a:fillStyleLst>
+      <a:lnStyleLst>
+        <a:ln w="9525" cap="flat" cmpd="sng" algn="ctr">
+          <a:solidFill>
+            <a:schemeClr val="phClr">
+              <a:shade val="95000"/>
+              <a:satMod val="105000"/>
+            </a:schemeClr>
+          </a:solidFill>
+          <a:prstDash val="solid"/>
+        </a:ln>
+        <a:ln w="25400" cap="flat" cmpd="sng" algn="ctr">
+          <a:solidFill>
+            <a:schemeClr val="phClr"/>
+          </a:solidFill>
+          <a:prstDash val="solid"/>
+        </a:ln>
+        <a:ln w="38100" cap="flat" cmpd="sng" algn="ctr">
+          <a:solidFill>
+            <a:schemeClr val="phClr"/>
+          </a:solidFill>
+          <a:prstDash val="solid"/>
+        </a:ln>
+      </a:lnStyleLst>
+      <a:effectStyleLst>
+        <a:effectStyle>
+          <a:effectLst>
+            <a:outerShdw blurRad="40000" dist="20000" dir="5400000" rotWithShape="0">
+              <a:srgbClr val="000000">
+                <a:alpha val="38000"/>
+              </a:srgbClr>
+            </a:outerShdw>
+          </a:effectLst>
+        </a:effectStyle>
+        <a:effectStyle>
+          <a:effectLst>
+            <a:outerShdw blurRad="40000" dist="23000" dir="5400000" rotWithShape="0">
+              <a:srgbClr val="000000">
+                <a:alpha val="35000"/>
+              </a:srgbClr>
+            </a:outerShdw>
+          </a:effectLst>
+        </a:effectStyle>
+        <a:effectStyle>
+          <a:effectLst>
+            <a:outerShdw blurRad="40000" dist="23000" dir="5400000" rotWithShape="0">
+              <a:srgbClr val="000000">
+                <a:alpha val="35000"/>
+              </a:srgbClr>
+            </a:outerShdw>
+          </a:effectLst>
+          <a:scene3d>
+            <a:camera prst="orthographicFront">
+              <a:rot lat="0" lon="0" rev="0"/>
+            </a:camera>
+            <a:lightRig rig="threePt" dir="t">
+              <a:rot lat="0" lon="0" rev="1200000"/>
+            </a:lightRig>
+          </a:scene3d>
+          <a:sp3d>
+            <a:bevelT w="63500" h="25400"/>
+          </a:sp3d>
+        </a:effectStyle>
+      </a:effectStyleLst>
+      <a:bgFillStyleLst>
+        <a:solidFill>
+          <a:schemeClr val="phClr"/>
+        </a:solidFill>
+        <a:gradFill rotWithShape="1">
+          <a:gsLst>
+            <a:gs pos="0">
+              <a:schemeClr val="phClr">
+                <a:tint val="40000"/>
+                <a:satMod val="350000"/>
+              </a:schemeClr>
+            </a:gs>
+            <a:gs pos="40000">
+              <a:schemeClr val="phClr">
+                <a:tint val="45000"/>
+                <a:shade val="99000"/>
+                <a:satMod val="350000"/>
+              </a:schemeClr>
+            </a:gs>
+            <a:gs pos="100000">
+              <a:schemeClr val="phClr">
+                <a:shade val="20000"/>
+                <a:satMod val="255000"/>
+              </a:schemeClr>
+            </a:gs>
+          </a:gsLst>
+          <a:path path="circle">
+            <a:fillToRect l="50000" t="-80000" r="50000" b="180000"/>
+          </a:path>
+        </a:gradFill>
+        <a:gradFill rotWithShape="1">
+          <a:gsLst>
+            <a:gs pos="0">
+              <a:schemeClr val="phClr">
+                <a:tint val="80000"/>
+                <a:satMod val="300000"/>
+              </a:schemeClr>
+            </a:gs>
+            <a:gs pos="100000">
+              <a:schemeClr val="phClr">
+                <a:shade val="30000"/>
+                <a:satMod val="200000"/>
+              </a:schemeClr>
+            </a:gs>
+          </a:gsLst>
+          <a:path path="circle">
+            <a:fillToRect l="50000" t="50000" r="50000" b="50000"/>
+          </a:path>
+        </a:gradFill>
+      </a:bgFillStyleLst>
+    </a:fmtScheme>
+  </a:themeElements>
+</a:theme>
+</file>
+
+<file path=ppt/theme/theme2.xml><?xml version="1.0" encoding="utf-8"?>
 <a:theme xmlns:a="http://schemas.openxmlformats.org/drawingml/2006/main" xmlns:r="http://schemas.openxmlformats.org/officeDocument/2006/relationships" name="Simple Light">
   <a:themeElements>
     <a:clrScheme name="Simple Light">
@@ -13975,283 +14212,4 @@
     </a:fmtScheme>
   </a:themeElements>
 </a:theme>
-</file>
-
-<file path=ppt/theme/theme2.xml><?xml version="1.0" encoding="utf-8"?>
-<a:theme xmlns:a="http://schemas.openxmlformats.org/drawingml/2006/main" xmlns:r="http://schemas.openxmlformats.org/officeDocument/2006/relationships">
-  <a:themeElements>
-    <a:clrScheme name="Default">
-      <a:dk1>
-        <a:srgbClr val="000000"/>
-      </a:dk1>
-      <a:lt1>
-        <a:srgbClr val="FFFFFF"/>
-      </a:lt1>
-      <a:dk2>
-        <a:srgbClr val="158158"/>
-      </a:dk2>
-      <a:lt2>
-        <a:srgbClr val="F3F3F3"/>
-      </a:lt2>
-      <a:accent1>
-        <a:srgbClr val="058DC7"/>
-      </a:accent1>
-      <a:accent2>
-        <a:srgbClr val="50B432"/>
-      </a:accent2>
-      <a:accent3>
-        <a:srgbClr val="ED561B"/>
-      </a:accent3>
-      <a:accent4>
-        <a:srgbClr val="EDEF00"/>
-      </a:accent4>
-      <a:accent5>
-        <a:srgbClr val="24CBE5"/>
-      </a:accent5>
-      <a:accent6>
-        <a:srgbClr val="64E572"/>
-      </a:accent6>
-      <a:hlink>
-        <a:srgbClr val="2200CC"/>
-      </a:hlink>
-      <a:folHlink>
-        <a:srgbClr val="551A8B"/>
-      </a:folHlink>
-    </a:clrScheme>
-    <a:fontScheme name="Office">
-      <a:majorFont>
-        <a:latin typeface="Arial"/>
-        <a:ea typeface=""/>
-        <a:cs typeface=""/>
-        <a:font script="Jpan" typeface="ＭＳ Ｐゴシック"/>
-        <a:font script="Hang" typeface="맑은 고딕"/>
-        <a:font script="Hans" typeface="宋体"/>
-        <a:font script="Hant" typeface="新細明體"/>
-        <a:font script="Arab" typeface="Times New Roman"/>
-        <a:font script="Hebr" typeface="Times New Roman"/>
-        <a:font script="Thai" typeface="Angsana New"/>
-        <a:font script="Ethi" typeface="Nyala"/>
-        <a:font script="Beng" typeface="Vrinda"/>
-        <a:font script="Gujr" typeface="Shruti"/>
-        <a:font script="Khmr" typeface="MoolBoran"/>
-        <a:font script="Knda" typeface="Tunga"/>
-        <a:font script="Guru" typeface="Raavi"/>
-        <a:font script="Cans" typeface="Euphemia"/>
-        <a:font script="Cher" typeface="Plantagenet Cherokee"/>
-        <a:font script="Yiii" typeface="Microsoft Yi Baiti"/>
-        <a:font script="Tibt" typeface="Microsoft Himalaya"/>
-        <a:font script="Thaa" typeface="MV Boli"/>
-        <a:font script="Deva" typeface="Mangal"/>
-        <a:font script="Telu" typeface="Gautami"/>
-        <a:font script="Taml" typeface="Latha"/>
-        <a:font script="Syrc" typeface="Estrangelo Edessa"/>
-        <a:font script="Orya" typeface="Kalinga"/>
-        <a:font script="Mlym" typeface="Kartika"/>
-        <a:font script="Laoo" typeface="DokChampa"/>
-        <a:font script="Sinh" typeface="Iskoola Pota"/>
-        <a:font script="Mong" typeface="Mongolian Baiti"/>
-        <a:font script="Viet" typeface="Times New Roman"/>
-        <a:font script="Uigh" typeface="Microsoft Uighur"/>
-        <a:font script="Geor" typeface="Sylfaen"/>
-      </a:majorFont>
-      <a:minorFont>
-        <a:latin typeface="Arial"/>
-        <a:ea typeface=""/>
-        <a:cs typeface=""/>
-        <a:font script="Jpan" typeface="ＭＳ Ｐゴシック"/>
-        <a:font script="Hang" typeface="맑은 고딕"/>
-        <a:font script="Hans" typeface="宋体"/>
-        <a:font script="Hant" typeface="新細明體"/>
-        <a:font script="Arab" typeface="Arial"/>
-        <a:font script="Hebr" typeface="Arial"/>
-        <a:font script="Thai" typeface="Cordia New"/>
-        <a:font script="Ethi" typeface="Nyala"/>
-        <a:font script="Beng" typeface="Vrinda"/>
-        <a:font script="Gujr" typeface="Shruti"/>
-        <a:font script="Khmr" typeface="DaunPenh"/>
-        <a:font script="Knda" typeface="Tunga"/>
-        <a:font script="Guru" typeface="Raavi"/>
-        <a:font script="Cans" typeface="Euphemia"/>
-        <a:font script="Cher" typeface="Plantagenet Cherokee"/>
-        <a:font script="Yiii" typeface="Microsoft Yi Baiti"/>
-        <a:font script="Tibt" typeface="Microsoft Himalaya"/>
-        <a:font script="Thaa" typeface="MV Boli"/>
-        <a:font script="Deva" typeface="Mangal"/>
-        <a:font script="Telu" typeface="Gautami"/>
-        <a:font script="Taml" typeface="Latha"/>
-        <a:font script="Syrc" typeface="Estrangelo Edessa"/>
-        <a:font script="Orya" typeface="Kalinga"/>
-        <a:font script="Mlym" typeface="Kartika"/>
-        <a:font script="Laoo" typeface="DokChampa"/>
-        <a:font script="Sinh" typeface="Iskoola Pota"/>
-        <a:font script="Mong" typeface="Mongolian Baiti"/>
-        <a:font script="Viet" typeface="Arial"/>
-        <a:font script="Uigh" typeface="Microsoft Uighur"/>
-        <a:font script="Geor" typeface="Sylfaen"/>
-      </a:minorFont>
-    </a:fontScheme>
-    <a:fmtScheme name="Office">
-      <a:fillStyleLst>
-        <a:solidFill>
-          <a:schemeClr val="phClr"/>
-        </a:solidFill>
-        <a:gradFill rotWithShape="1">
-          <a:gsLst>
-            <a:gs pos="0">
-              <a:schemeClr val="phClr">
-                <a:tint val="50000"/>
-                <a:satMod val="300000"/>
-              </a:schemeClr>
-            </a:gs>
-            <a:gs pos="35000">
-              <a:schemeClr val="phClr">
-                <a:tint val="37000"/>
-                <a:satMod val="300000"/>
-              </a:schemeClr>
-            </a:gs>
-            <a:gs pos="100000">
-              <a:schemeClr val="phClr">
-                <a:tint val="15000"/>
-                <a:satMod val="350000"/>
-              </a:schemeClr>
-            </a:gs>
-          </a:gsLst>
-          <a:lin ang="16200000" scaled="1"/>
-        </a:gradFill>
-        <a:gradFill rotWithShape="1">
-          <a:gsLst>
-            <a:gs pos="0">
-              <a:schemeClr val="phClr">
-                <a:tint val="100000"/>
-                <a:shade val="100000"/>
-                <a:satMod val="130000"/>
-              </a:schemeClr>
-            </a:gs>
-            <a:gs pos="100000">
-              <a:schemeClr val="phClr">
-                <a:tint val="50000"/>
-                <a:shade val="100000"/>
-                <a:satMod val="350000"/>
-              </a:schemeClr>
-            </a:gs>
-          </a:gsLst>
-          <a:lin ang="16200000" scaled="0"/>
-        </a:gradFill>
-      </a:fillStyleLst>
-      <a:lnStyleLst>
-        <a:ln w="9525" cap="flat" cmpd="sng" algn="ctr">
-          <a:solidFill>
-            <a:schemeClr val="phClr">
-              <a:shade val="95000"/>
-              <a:satMod val="105000"/>
-            </a:schemeClr>
-          </a:solidFill>
-          <a:prstDash val="solid"/>
-        </a:ln>
-        <a:ln w="25400" cap="flat" cmpd="sng" algn="ctr">
-          <a:solidFill>
-            <a:schemeClr val="phClr"/>
-          </a:solidFill>
-          <a:prstDash val="solid"/>
-        </a:ln>
-        <a:ln w="38100" cap="flat" cmpd="sng" algn="ctr">
-          <a:solidFill>
-            <a:schemeClr val="phClr"/>
-          </a:solidFill>
-          <a:prstDash val="solid"/>
-        </a:ln>
-      </a:lnStyleLst>
-      <a:effectStyleLst>
-        <a:effectStyle>
-          <a:effectLst>
-            <a:outerShdw blurRad="40000" dist="20000" dir="5400000" rotWithShape="0">
-              <a:srgbClr val="000000">
-                <a:alpha val="38000"/>
-              </a:srgbClr>
-            </a:outerShdw>
-          </a:effectLst>
-        </a:effectStyle>
-        <a:effectStyle>
-          <a:effectLst>
-            <a:outerShdw blurRad="40000" dist="23000" dir="5400000" rotWithShape="0">
-              <a:srgbClr val="000000">
-                <a:alpha val="35000"/>
-              </a:srgbClr>
-            </a:outerShdw>
-          </a:effectLst>
-        </a:effectStyle>
-        <a:effectStyle>
-          <a:effectLst>
-            <a:outerShdw blurRad="40000" dist="23000" dir="5400000" rotWithShape="0">
-              <a:srgbClr val="000000">
-                <a:alpha val="35000"/>
-              </a:srgbClr>
-            </a:outerShdw>
-          </a:effectLst>
-          <a:scene3d>
-            <a:camera prst="orthographicFront">
-              <a:rot lat="0" lon="0" rev="0"/>
-            </a:camera>
-            <a:lightRig rig="threePt" dir="t">
-              <a:rot lat="0" lon="0" rev="1200000"/>
-            </a:lightRig>
-          </a:scene3d>
-          <a:sp3d>
-            <a:bevelT w="63500" h="25400"/>
-          </a:sp3d>
-        </a:effectStyle>
-      </a:effectStyleLst>
-      <a:bgFillStyleLst>
-        <a:solidFill>
-          <a:schemeClr val="phClr"/>
-        </a:solidFill>
-        <a:gradFill rotWithShape="1">
-          <a:gsLst>
-            <a:gs pos="0">
-              <a:schemeClr val="phClr">
-                <a:tint val="40000"/>
-                <a:satMod val="350000"/>
-              </a:schemeClr>
-            </a:gs>
-            <a:gs pos="40000">
-              <a:schemeClr val="phClr">
-                <a:tint val="45000"/>
-                <a:shade val="99000"/>
-                <a:satMod val="350000"/>
-              </a:schemeClr>
-            </a:gs>
-            <a:gs pos="100000">
-              <a:schemeClr val="phClr">
-                <a:shade val="20000"/>
-                <a:satMod val="255000"/>
-              </a:schemeClr>
-            </a:gs>
-          </a:gsLst>
-          <a:path path="circle">
-            <a:fillToRect l="50000" t="-80000" r="50000" b="180000"/>
-          </a:path>
-        </a:gradFill>
-        <a:gradFill rotWithShape="1">
-          <a:gsLst>
-            <a:gs pos="0">
-              <a:schemeClr val="phClr">
-                <a:tint val="80000"/>
-                <a:satMod val="300000"/>
-              </a:schemeClr>
-            </a:gs>
-            <a:gs pos="100000">
-              <a:schemeClr val="phClr">
-                <a:shade val="30000"/>
-                <a:satMod val="200000"/>
-              </a:schemeClr>
-            </a:gs>
-          </a:gsLst>
-          <a:path path="circle">
-            <a:fillToRect l="50000" t="50000" r="50000" b="50000"/>
-          </a:path>
-        </a:gradFill>
-      </a:bgFillStyleLst>
-    </a:fmtScheme>
-  </a:themeElements>
-</a:theme>
 </file>
</xml_diff>

<commit_message>
Correção de todos os artefatos
</commit_message>
<xml_diff>
--- a/15. Arquitetura de negócio.pptx
+++ b/15. Arquitetura de negócio.pptx
@@ -12503,7 +12503,7 @@
             </a:pPr>
             <a:r>
               <a:rPr lang="pt-BR"/>
-              <a:t>Entrega de pedido(s)</a:t>
+              <a:t>Entregar pedido</a:t>
             </a:r>
             <a:endParaRPr/>
           </a:p>
@@ -13657,6 +13657,285 @@
 </file>
 
 <file path=ppt/theme/theme1.xml><?xml version="1.0" encoding="utf-8"?>
+<a:theme xmlns:a="http://schemas.openxmlformats.org/drawingml/2006/main" xmlns:r="http://schemas.openxmlformats.org/officeDocument/2006/relationships" name="Simple Light">
+  <a:themeElements>
+    <a:clrScheme name="Simple Light">
+      <a:dk1>
+        <a:srgbClr val="000000"/>
+      </a:dk1>
+      <a:lt1>
+        <a:srgbClr val="FFFFFF"/>
+      </a:lt1>
+      <a:dk2>
+        <a:srgbClr val="595959"/>
+      </a:dk2>
+      <a:lt2>
+        <a:srgbClr val="EEEEEE"/>
+      </a:lt2>
+      <a:accent1>
+        <a:srgbClr val="FFAB40"/>
+      </a:accent1>
+      <a:accent2>
+        <a:srgbClr val="212121"/>
+      </a:accent2>
+      <a:accent3>
+        <a:srgbClr val="78909C"/>
+      </a:accent3>
+      <a:accent4>
+        <a:srgbClr val="FFAB40"/>
+      </a:accent4>
+      <a:accent5>
+        <a:srgbClr val="0097A7"/>
+      </a:accent5>
+      <a:accent6>
+        <a:srgbClr val="EEFF41"/>
+      </a:accent6>
+      <a:hlink>
+        <a:srgbClr val="0097A7"/>
+      </a:hlink>
+      <a:folHlink>
+        <a:srgbClr val="0097A7"/>
+      </a:folHlink>
+    </a:clrScheme>
+    <a:fontScheme name="Office">
+      <a:majorFont>
+        <a:latin typeface="Arial"/>
+        <a:ea typeface=""/>
+        <a:cs typeface=""/>
+        <a:font script="Jpan" typeface="ＭＳ Ｐゴシック"/>
+        <a:font script="Hang" typeface="맑은 고딕"/>
+        <a:font script="Hans" typeface="宋体"/>
+        <a:font script="Hant" typeface="新細明體"/>
+        <a:font script="Arab" typeface="Times New Roman"/>
+        <a:font script="Hebr" typeface="Times New Roman"/>
+        <a:font script="Thai" typeface="Angsana New"/>
+        <a:font script="Ethi" typeface="Nyala"/>
+        <a:font script="Beng" typeface="Vrinda"/>
+        <a:font script="Gujr" typeface="Shruti"/>
+        <a:font script="Khmr" typeface="MoolBoran"/>
+        <a:font script="Knda" typeface="Tunga"/>
+        <a:font script="Guru" typeface="Raavi"/>
+        <a:font script="Cans" typeface="Euphemia"/>
+        <a:font script="Cher" typeface="Plantagenet Cherokee"/>
+        <a:font script="Yiii" typeface="Microsoft Yi Baiti"/>
+        <a:font script="Tibt" typeface="Microsoft Himalaya"/>
+        <a:font script="Thaa" typeface="MV Boli"/>
+        <a:font script="Deva" typeface="Mangal"/>
+        <a:font script="Telu" typeface="Gautami"/>
+        <a:font script="Taml" typeface="Latha"/>
+        <a:font script="Syrc" typeface="Estrangelo Edessa"/>
+        <a:font script="Orya" typeface="Kalinga"/>
+        <a:font script="Mlym" typeface="Kartika"/>
+        <a:font script="Laoo" typeface="DokChampa"/>
+        <a:font script="Sinh" typeface="Iskoola Pota"/>
+        <a:font script="Mong" typeface="Mongolian Baiti"/>
+        <a:font script="Viet" typeface="Times New Roman"/>
+        <a:font script="Uigh" typeface="Microsoft Uighur"/>
+        <a:font script="Geor" typeface="Sylfaen"/>
+      </a:majorFont>
+      <a:minorFont>
+        <a:latin typeface="Arial"/>
+        <a:ea typeface=""/>
+        <a:cs typeface=""/>
+        <a:font script="Jpan" typeface="ＭＳ Ｐゴシック"/>
+        <a:font script="Hang" typeface="맑은 고딕"/>
+        <a:font script="Hans" typeface="宋体"/>
+        <a:font script="Hant" typeface="新細明體"/>
+        <a:font script="Arab" typeface="Arial"/>
+        <a:font script="Hebr" typeface="Arial"/>
+        <a:font script="Thai" typeface="Cordia New"/>
+        <a:font script="Ethi" typeface="Nyala"/>
+        <a:font script="Beng" typeface="Vrinda"/>
+        <a:font script="Gujr" typeface="Shruti"/>
+        <a:font script="Khmr" typeface="DaunPenh"/>
+        <a:font script="Knda" typeface="Tunga"/>
+        <a:font script="Guru" typeface="Raavi"/>
+        <a:font script="Cans" typeface="Euphemia"/>
+        <a:font script="Cher" typeface="Plantagenet Cherokee"/>
+        <a:font script="Yiii" typeface="Microsoft Yi Baiti"/>
+        <a:font script="Tibt" typeface="Microsoft Himalaya"/>
+        <a:font script="Thaa" typeface="MV Boli"/>
+        <a:font script="Deva" typeface="Mangal"/>
+        <a:font script="Telu" typeface="Gautami"/>
+        <a:font script="Taml" typeface="Latha"/>
+        <a:font script="Syrc" typeface="Estrangelo Edessa"/>
+        <a:font script="Orya" typeface="Kalinga"/>
+        <a:font script="Mlym" typeface="Kartika"/>
+        <a:font script="Laoo" typeface="DokChampa"/>
+        <a:font script="Sinh" typeface="Iskoola Pota"/>
+        <a:font script="Mong" typeface="Mongolian Baiti"/>
+        <a:font script="Viet" typeface="Arial"/>
+        <a:font script="Uigh" typeface="Microsoft Uighur"/>
+        <a:font script="Geor" typeface="Sylfaen"/>
+      </a:minorFont>
+    </a:fontScheme>
+    <a:fmtScheme name="Office">
+      <a:fillStyleLst>
+        <a:solidFill>
+          <a:schemeClr val="phClr"/>
+        </a:solidFill>
+        <a:gradFill rotWithShape="1">
+          <a:gsLst>
+            <a:gs pos="0">
+              <a:schemeClr val="phClr">
+                <a:tint val="50000"/>
+                <a:satMod val="300000"/>
+              </a:schemeClr>
+            </a:gs>
+            <a:gs pos="35000">
+              <a:schemeClr val="phClr">
+                <a:tint val="37000"/>
+                <a:satMod val="300000"/>
+              </a:schemeClr>
+            </a:gs>
+            <a:gs pos="100000">
+              <a:schemeClr val="phClr">
+                <a:tint val="15000"/>
+                <a:satMod val="350000"/>
+              </a:schemeClr>
+            </a:gs>
+          </a:gsLst>
+          <a:lin ang="16200000" scaled="1"/>
+        </a:gradFill>
+        <a:gradFill rotWithShape="1">
+          <a:gsLst>
+            <a:gs pos="0">
+              <a:schemeClr val="phClr">
+                <a:tint val="100000"/>
+                <a:shade val="100000"/>
+                <a:satMod val="130000"/>
+              </a:schemeClr>
+            </a:gs>
+            <a:gs pos="100000">
+              <a:schemeClr val="phClr">
+                <a:tint val="50000"/>
+                <a:shade val="100000"/>
+                <a:satMod val="350000"/>
+              </a:schemeClr>
+            </a:gs>
+          </a:gsLst>
+          <a:lin ang="16200000" scaled="0"/>
+        </a:gradFill>
+      </a:fillStyleLst>
+      <a:lnStyleLst>
+        <a:ln w="9525" cap="flat" cmpd="sng" algn="ctr">
+          <a:solidFill>
+            <a:schemeClr val="phClr">
+              <a:shade val="95000"/>
+              <a:satMod val="105000"/>
+            </a:schemeClr>
+          </a:solidFill>
+          <a:prstDash val="solid"/>
+        </a:ln>
+        <a:ln w="25400" cap="flat" cmpd="sng" algn="ctr">
+          <a:solidFill>
+            <a:schemeClr val="phClr"/>
+          </a:solidFill>
+          <a:prstDash val="solid"/>
+        </a:ln>
+        <a:ln w="38100" cap="flat" cmpd="sng" algn="ctr">
+          <a:solidFill>
+            <a:schemeClr val="phClr"/>
+          </a:solidFill>
+          <a:prstDash val="solid"/>
+        </a:ln>
+      </a:lnStyleLst>
+      <a:effectStyleLst>
+        <a:effectStyle>
+          <a:effectLst>
+            <a:outerShdw blurRad="40000" dist="20000" dir="5400000" rotWithShape="0">
+              <a:srgbClr val="000000">
+                <a:alpha val="38000"/>
+              </a:srgbClr>
+            </a:outerShdw>
+          </a:effectLst>
+        </a:effectStyle>
+        <a:effectStyle>
+          <a:effectLst>
+            <a:outerShdw blurRad="40000" dist="23000" dir="5400000" rotWithShape="0">
+              <a:srgbClr val="000000">
+                <a:alpha val="35000"/>
+              </a:srgbClr>
+            </a:outerShdw>
+          </a:effectLst>
+        </a:effectStyle>
+        <a:effectStyle>
+          <a:effectLst>
+            <a:outerShdw blurRad="40000" dist="23000" dir="5400000" rotWithShape="0">
+              <a:srgbClr val="000000">
+                <a:alpha val="35000"/>
+              </a:srgbClr>
+            </a:outerShdw>
+          </a:effectLst>
+          <a:scene3d>
+            <a:camera prst="orthographicFront">
+              <a:rot lat="0" lon="0" rev="0"/>
+            </a:camera>
+            <a:lightRig rig="threePt" dir="t">
+              <a:rot lat="0" lon="0" rev="1200000"/>
+            </a:lightRig>
+          </a:scene3d>
+          <a:sp3d>
+            <a:bevelT w="63500" h="25400"/>
+          </a:sp3d>
+        </a:effectStyle>
+      </a:effectStyleLst>
+      <a:bgFillStyleLst>
+        <a:solidFill>
+          <a:schemeClr val="phClr"/>
+        </a:solidFill>
+        <a:gradFill rotWithShape="1">
+          <a:gsLst>
+            <a:gs pos="0">
+              <a:schemeClr val="phClr">
+                <a:tint val="40000"/>
+                <a:satMod val="350000"/>
+              </a:schemeClr>
+            </a:gs>
+            <a:gs pos="40000">
+              <a:schemeClr val="phClr">
+                <a:tint val="45000"/>
+                <a:shade val="99000"/>
+                <a:satMod val="350000"/>
+              </a:schemeClr>
+            </a:gs>
+            <a:gs pos="100000">
+              <a:schemeClr val="phClr">
+                <a:shade val="20000"/>
+                <a:satMod val="255000"/>
+              </a:schemeClr>
+            </a:gs>
+          </a:gsLst>
+          <a:path path="circle">
+            <a:fillToRect l="50000" t="-80000" r="50000" b="180000"/>
+          </a:path>
+        </a:gradFill>
+        <a:gradFill rotWithShape="1">
+          <a:gsLst>
+            <a:gs pos="0">
+              <a:schemeClr val="phClr">
+                <a:tint val="80000"/>
+                <a:satMod val="300000"/>
+              </a:schemeClr>
+            </a:gs>
+            <a:gs pos="100000">
+              <a:schemeClr val="phClr">
+                <a:shade val="30000"/>
+                <a:satMod val="200000"/>
+              </a:schemeClr>
+            </a:gs>
+          </a:gsLst>
+          <a:path path="circle">
+            <a:fillToRect l="50000" t="50000" r="50000" b="50000"/>
+          </a:path>
+        </a:gradFill>
+      </a:bgFillStyleLst>
+    </a:fmtScheme>
+  </a:themeElements>
+</a:theme>
+</file>
+
+<file path=ppt/theme/theme2.xml><?xml version="1.0" encoding="utf-8"?>
 <a:theme xmlns:a="http://schemas.openxmlformats.org/drawingml/2006/main" xmlns:r="http://schemas.openxmlformats.org/officeDocument/2006/relationships">
   <a:themeElements>
     <a:clrScheme name="Default">
@@ -13933,283 +14212,4 @@
     </a:fmtScheme>
   </a:themeElements>
 </a:theme>
-</file>
-
-<file path=ppt/theme/theme2.xml><?xml version="1.0" encoding="utf-8"?>
-<a:theme xmlns:a="http://schemas.openxmlformats.org/drawingml/2006/main" xmlns:r="http://schemas.openxmlformats.org/officeDocument/2006/relationships" name="Simple Light">
-  <a:themeElements>
-    <a:clrScheme name="Simple Light">
-      <a:dk1>
-        <a:srgbClr val="000000"/>
-      </a:dk1>
-      <a:lt1>
-        <a:srgbClr val="FFFFFF"/>
-      </a:lt1>
-      <a:dk2>
-        <a:srgbClr val="595959"/>
-      </a:dk2>
-      <a:lt2>
-        <a:srgbClr val="EEEEEE"/>
-      </a:lt2>
-      <a:accent1>
-        <a:srgbClr val="FFAB40"/>
-      </a:accent1>
-      <a:accent2>
-        <a:srgbClr val="212121"/>
-      </a:accent2>
-      <a:accent3>
-        <a:srgbClr val="78909C"/>
-      </a:accent3>
-      <a:accent4>
-        <a:srgbClr val="FFAB40"/>
-      </a:accent4>
-      <a:accent5>
-        <a:srgbClr val="0097A7"/>
-      </a:accent5>
-      <a:accent6>
-        <a:srgbClr val="EEFF41"/>
-      </a:accent6>
-      <a:hlink>
-        <a:srgbClr val="0097A7"/>
-      </a:hlink>
-      <a:folHlink>
-        <a:srgbClr val="0097A7"/>
-      </a:folHlink>
-    </a:clrScheme>
-    <a:fontScheme name="Office">
-      <a:majorFont>
-        <a:latin typeface="Arial"/>
-        <a:ea typeface=""/>
-        <a:cs typeface=""/>
-        <a:font script="Jpan" typeface="ＭＳ Ｐゴシック"/>
-        <a:font script="Hang" typeface="맑은 고딕"/>
-        <a:font script="Hans" typeface="宋体"/>
-        <a:font script="Hant" typeface="新細明體"/>
-        <a:font script="Arab" typeface="Times New Roman"/>
-        <a:font script="Hebr" typeface="Times New Roman"/>
-        <a:font script="Thai" typeface="Angsana New"/>
-        <a:font script="Ethi" typeface="Nyala"/>
-        <a:font script="Beng" typeface="Vrinda"/>
-        <a:font script="Gujr" typeface="Shruti"/>
-        <a:font script="Khmr" typeface="MoolBoran"/>
-        <a:font script="Knda" typeface="Tunga"/>
-        <a:font script="Guru" typeface="Raavi"/>
-        <a:font script="Cans" typeface="Euphemia"/>
-        <a:font script="Cher" typeface="Plantagenet Cherokee"/>
-        <a:font script="Yiii" typeface="Microsoft Yi Baiti"/>
-        <a:font script="Tibt" typeface="Microsoft Himalaya"/>
-        <a:font script="Thaa" typeface="MV Boli"/>
-        <a:font script="Deva" typeface="Mangal"/>
-        <a:font script="Telu" typeface="Gautami"/>
-        <a:font script="Taml" typeface="Latha"/>
-        <a:font script="Syrc" typeface="Estrangelo Edessa"/>
-        <a:font script="Orya" typeface="Kalinga"/>
-        <a:font script="Mlym" typeface="Kartika"/>
-        <a:font script="Laoo" typeface="DokChampa"/>
-        <a:font script="Sinh" typeface="Iskoola Pota"/>
-        <a:font script="Mong" typeface="Mongolian Baiti"/>
-        <a:font script="Viet" typeface="Times New Roman"/>
-        <a:font script="Uigh" typeface="Microsoft Uighur"/>
-        <a:font script="Geor" typeface="Sylfaen"/>
-      </a:majorFont>
-      <a:minorFont>
-        <a:latin typeface="Arial"/>
-        <a:ea typeface=""/>
-        <a:cs typeface=""/>
-        <a:font script="Jpan" typeface="ＭＳ Ｐゴシック"/>
-        <a:font script="Hang" typeface="맑은 고딕"/>
-        <a:font script="Hans" typeface="宋体"/>
-        <a:font script="Hant" typeface="新細明體"/>
-        <a:font script="Arab" typeface="Arial"/>
-        <a:font script="Hebr" typeface="Arial"/>
-        <a:font script="Thai" typeface="Cordia New"/>
-        <a:font script="Ethi" typeface="Nyala"/>
-        <a:font script="Beng" typeface="Vrinda"/>
-        <a:font script="Gujr" typeface="Shruti"/>
-        <a:font script="Khmr" typeface="DaunPenh"/>
-        <a:font script="Knda" typeface="Tunga"/>
-        <a:font script="Guru" typeface="Raavi"/>
-        <a:font script="Cans" typeface="Euphemia"/>
-        <a:font script="Cher" typeface="Plantagenet Cherokee"/>
-        <a:font script="Yiii" typeface="Microsoft Yi Baiti"/>
-        <a:font script="Tibt" typeface="Microsoft Himalaya"/>
-        <a:font script="Thaa" typeface="MV Boli"/>
-        <a:font script="Deva" typeface="Mangal"/>
-        <a:font script="Telu" typeface="Gautami"/>
-        <a:font script="Taml" typeface="Latha"/>
-        <a:font script="Syrc" typeface="Estrangelo Edessa"/>
-        <a:font script="Orya" typeface="Kalinga"/>
-        <a:font script="Mlym" typeface="Kartika"/>
-        <a:font script="Laoo" typeface="DokChampa"/>
-        <a:font script="Sinh" typeface="Iskoola Pota"/>
-        <a:font script="Mong" typeface="Mongolian Baiti"/>
-        <a:font script="Viet" typeface="Arial"/>
-        <a:font script="Uigh" typeface="Microsoft Uighur"/>
-        <a:font script="Geor" typeface="Sylfaen"/>
-      </a:minorFont>
-    </a:fontScheme>
-    <a:fmtScheme name="Office">
-      <a:fillStyleLst>
-        <a:solidFill>
-          <a:schemeClr val="phClr"/>
-        </a:solidFill>
-        <a:gradFill rotWithShape="1">
-          <a:gsLst>
-            <a:gs pos="0">
-              <a:schemeClr val="phClr">
-                <a:tint val="50000"/>
-                <a:satMod val="300000"/>
-              </a:schemeClr>
-            </a:gs>
-            <a:gs pos="35000">
-              <a:schemeClr val="phClr">
-                <a:tint val="37000"/>
-                <a:satMod val="300000"/>
-              </a:schemeClr>
-            </a:gs>
-            <a:gs pos="100000">
-              <a:schemeClr val="phClr">
-                <a:tint val="15000"/>
-                <a:satMod val="350000"/>
-              </a:schemeClr>
-            </a:gs>
-          </a:gsLst>
-          <a:lin ang="16200000" scaled="1"/>
-        </a:gradFill>
-        <a:gradFill rotWithShape="1">
-          <a:gsLst>
-            <a:gs pos="0">
-              <a:schemeClr val="phClr">
-                <a:tint val="100000"/>
-                <a:shade val="100000"/>
-                <a:satMod val="130000"/>
-              </a:schemeClr>
-            </a:gs>
-            <a:gs pos="100000">
-              <a:schemeClr val="phClr">
-                <a:tint val="50000"/>
-                <a:shade val="100000"/>
-                <a:satMod val="350000"/>
-              </a:schemeClr>
-            </a:gs>
-          </a:gsLst>
-          <a:lin ang="16200000" scaled="0"/>
-        </a:gradFill>
-      </a:fillStyleLst>
-      <a:lnStyleLst>
-        <a:ln w="9525" cap="flat" cmpd="sng" algn="ctr">
-          <a:solidFill>
-            <a:schemeClr val="phClr">
-              <a:shade val="95000"/>
-              <a:satMod val="105000"/>
-            </a:schemeClr>
-          </a:solidFill>
-          <a:prstDash val="solid"/>
-        </a:ln>
-        <a:ln w="25400" cap="flat" cmpd="sng" algn="ctr">
-          <a:solidFill>
-            <a:schemeClr val="phClr"/>
-          </a:solidFill>
-          <a:prstDash val="solid"/>
-        </a:ln>
-        <a:ln w="38100" cap="flat" cmpd="sng" algn="ctr">
-          <a:solidFill>
-            <a:schemeClr val="phClr"/>
-          </a:solidFill>
-          <a:prstDash val="solid"/>
-        </a:ln>
-      </a:lnStyleLst>
-      <a:effectStyleLst>
-        <a:effectStyle>
-          <a:effectLst>
-            <a:outerShdw blurRad="40000" dist="20000" dir="5400000" rotWithShape="0">
-              <a:srgbClr val="000000">
-                <a:alpha val="38000"/>
-              </a:srgbClr>
-            </a:outerShdw>
-          </a:effectLst>
-        </a:effectStyle>
-        <a:effectStyle>
-          <a:effectLst>
-            <a:outerShdw blurRad="40000" dist="23000" dir="5400000" rotWithShape="0">
-              <a:srgbClr val="000000">
-                <a:alpha val="35000"/>
-              </a:srgbClr>
-            </a:outerShdw>
-          </a:effectLst>
-        </a:effectStyle>
-        <a:effectStyle>
-          <a:effectLst>
-            <a:outerShdw blurRad="40000" dist="23000" dir="5400000" rotWithShape="0">
-              <a:srgbClr val="000000">
-                <a:alpha val="35000"/>
-              </a:srgbClr>
-            </a:outerShdw>
-          </a:effectLst>
-          <a:scene3d>
-            <a:camera prst="orthographicFront">
-              <a:rot lat="0" lon="0" rev="0"/>
-            </a:camera>
-            <a:lightRig rig="threePt" dir="t">
-              <a:rot lat="0" lon="0" rev="1200000"/>
-            </a:lightRig>
-          </a:scene3d>
-          <a:sp3d>
-            <a:bevelT w="63500" h="25400"/>
-          </a:sp3d>
-        </a:effectStyle>
-      </a:effectStyleLst>
-      <a:bgFillStyleLst>
-        <a:solidFill>
-          <a:schemeClr val="phClr"/>
-        </a:solidFill>
-        <a:gradFill rotWithShape="1">
-          <a:gsLst>
-            <a:gs pos="0">
-              <a:schemeClr val="phClr">
-                <a:tint val="40000"/>
-                <a:satMod val="350000"/>
-              </a:schemeClr>
-            </a:gs>
-            <a:gs pos="40000">
-              <a:schemeClr val="phClr">
-                <a:tint val="45000"/>
-                <a:shade val="99000"/>
-                <a:satMod val="350000"/>
-              </a:schemeClr>
-            </a:gs>
-            <a:gs pos="100000">
-              <a:schemeClr val="phClr">
-                <a:shade val="20000"/>
-                <a:satMod val="255000"/>
-              </a:schemeClr>
-            </a:gs>
-          </a:gsLst>
-          <a:path path="circle">
-            <a:fillToRect l="50000" t="-80000" r="50000" b="180000"/>
-          </a:path>
-        </a:gradFill>
-        <a:gradFill rotWithShape="1">
-          <a:gsLst>
-            <a:gs pos="0">
-              <a:schemeClr val="phClr">
-                <a:tint val="80000"/>
-                <a:satMod val="300000"/>
-              </a:schemeClr>
-            </a:gs>
-            <a:gs pos="100000">
-              <a:schemeClr val="phClr">
-                <a:shade val="30000"/>
-                <a:satMod val="200000"/>
-              </a:schemeClr>
-            </a:gs>
-          </a:gsLst>
-          <a:path path="circle">
-            <a:fillToRect l="50000" t="50000" r="50000" b="50000"/>
-          </a:path>
-        </a:gradFill>
-      </a:bgFillStyleLst>
-    </a:fmtScheme>
-  </a:themeElements>
-</a:theme>
 </file>
</xml_diff>

<commit_message>
Atualizando artefatos 15 e 16
</commit_message>
<xml_diff>
--- a/15. Arquitetura de negócio.pptx
+++ b/15. Arquitetura de negócio.pptx
@@ -2,7 +2,7 @@
 <file path=ppt/presentation.xml><?xml version="1.0" encoding="utf-8"?>
 <p:presentation xmlns:a="http://schemas.openxmlformats.org/drawingml/2006/main" xmlns:r="http://schemas.openxmlformats.org/officeDocument/2006/relationships" xmlns:mc="http://schemas.openxmlformats.org/markup-compatibility/2006" xmlns:mv="urn:schemas-microsoft-com:mac:vml" xmlns:p="http://schemas.openxmlformats.org/presentationml/2006/main" xmlns:c="http://schemas.openxmlformats.org/drawingml/2006/chart" xmlns:dgm="http://schemas.openxmlformats.org/drawingml/2006/diagram" xmlns:o="urn:schemas-microsoft-com:office:office" xmlns:v="urn:schemas-microsoft-com:vml" xmlns:pvml="urn:schemas-microsoft-com:office:powerpoint" xmlns:com="http://schemas.openxmlformats.org/drawingml/2006/compatibility" xmlns:p14="http://schemas.microsoft.com/office/powerpoint/2010/main" xmlns:p15="http://schemas.microsoft.com/office/powerpoint/2012/main" autoCompressPictures="0" strictFirstAndLastChars="0" saveSubsetFonts="1">
   <p:sldMasterIdLst>
-    <p:sldMasterId id="2147483659" r:id="rId4"/>
+    <p:sldMasterId id="2147483648" r:id="rId4"/>
   </p:sldMasterIdLst>
   <p:notesMasterIdLst>
     <p:notesMasterId r:id="rId5"/>
@@ -260,6 +260,9 @@
           </p15:clr>
         </p15:guide>
       </p15:sldGuideLst>
+    </p:ext>
+    <p:ext uri="http://customooxmlschemas.google.com/">
+      <go:slidesCustomData xmlns:go="http://customooxmlschemas.google.com/" r:id="rId12" roundtripDataSignature="AMtx7mj8Ey1t0ejgbyff1rRKrcLvIJaSBg=="/>
     </p:ext>
   </p:extLst>
 </p:presentation>
@@ -1430,7 +1433,7 @@
       </p:grpSpPr>
       <p:sp>
         <p:nvSpPr>
-          <p:cNvPr id="135" name="Google Shape;135;g75337751b0_0_0:notes"/>
+          <p:cNvPr id="135" name="Google Shape;135;p6:notes"/>
           <p:cNvSpPr/>
           <p:nvPr>
             <p:ph idx="2" type="sldImg"/>
@@ -1475,7 +1478,7 @@
       </p:sp>
       <p:sp>
         <p:nvSpPr>
-          <p:cNvPr id="136" name="Google Shape;136;g75337751b0_0_0:notes"/>
+          <p:cNvPr id="136" name="Google Shape;136;p6:notes"/>
           <p:cNvSpPr txBox="1"/>
           <p:nvPr>
             <p:ph idx="1" type="body"/>
@@ -1547,7 +1550,7 @@
       </p:grpSpPr>
       <p:sp>
         <p:nvSpPr>
-          <p:cNvPr id="10" name="Google Shape;10;p2"/>
+          <p:cNvPr id="10" name="Google Shape;10;p8"/>
           <p:cNvSpPr txBox="1"/>
           <p:nvPr>
             <p:ph type="ctrTitle"/>
@@ -1703,7 +1706,7 @@
       </p:sp>
       <p:sp>
         <p:nvSpPr>
-          <p:cNvPr id="11" name="Google Shape;11;p2"/>
+          <p:cNvPr id="11" name="Google Shape;11;p8"/>
           <p:cNvSpPr txBox="1"/>
           <p:nvPr>
             <p:ph idx="1" type="subTitle"/>
@@ -1859,7 +1862,7 @@
       </p:sp>
       <p:sp>
         <p:nvSpPr>
-          <p:cNvPr id="12" name="Google Shape;12;p2"/>
+          <p:cNvPr id="12" name="Google Shape;12;p8"/>
           <p:cNvSpPr txBox="1"/>
           <p:nvPr>
             <p:ph idx="12" type="sldNum"/>
@@ -2163,7 +2166,7 @@
       </p:grpSpPr>
       <p:sp>
         <p:nvSpPr>
-          <p:cNvPr id="45" name="Google Shape;45;p11"/>
+          <p:cNvPr id="45" name="Google Shape;45;p17"/>
           <p:cNvSpPr txBox="1"/>
           <p:nvPr>
             <p:ph hasCustomPrompt="1" type="title"/>
@@ -2323,7 +2326,7 @@
       </p:sp>
       <p:sp>
         <p:nvSpPr>
-          <p:cNvPr id="46" name="Google Shape;46;p11"/>
+          <p:cNvPr id="46" name="Google Shape;46;p17"/>
           <p:cNvSpPr txBox="1"/>
           <p:nvPr>
             <p:ph idx="1" type="body"/>
@@ -2479,7 +2482,7 @@
       </p:sp>
       <p:sp>
         <p:nvSpPr>
-          <p:cNvPr id="47" name="Google Shape;47;p11"/>
+          <p:cNvPr id="47" name="Google Shape;47;p17"/>
           <p:cNvSpPr txBox="1"/>
           <p:nvPr>
             <p:ph idx="12" type="sldNum"/>
@@ -2783,7 +2786,7 @@
       </p:grpSpPr>
       <p:sp>
         <p:nvSpPr>
-          <p:cNvPr id="49" name="Google Shape;49;p12"/>
+          <p:cNvPr id="49" name="Google Shape;49;p18"/>
           <p:cNvSpPr txBox="1"/>
           <p:nvPr>
             <p:ph idx="12" type="sldNum"/>
@@ -3087,7 +3090,7 @@
       </p:grpSpPr>
       <p:sp>
         <p:nvSpPr>
-          <p:cNvPr id="14" name="Google Shape;14;p3"/>
+          <p:cNvPr id="14" name="Google Shape;14;p9"/>
           <p:cNvSpPr txBox="1"/>
           <p:nvPr>
             <p:ph type="title"/>
@@ -3243,7 +3246,7 @@
       </p:sp>
       <p:sp>
         <p:nvSpPr>
-          <p:cNvPr id="15" name="Google Shape;15;p3"/>
+          <p:cNvPr id="15" name="Google Shape;15;p9"/>
           <p:cNvSpPr txBox="1"/>
           <p:nvPr>
             <p:ph idx="1" type="body"/>
@@ -3399,7 +3402,7 @@
       </p:sp>
       <p:sp>
         <p:nvSpPr>
-          <p:cNvPr id="16" name="Google Shape;16;p3"/>
+          <p:cNvPr id="16" name="Google Shape;16;p9"/>
           <p:cNvSpPr txBox="1"/>
           <p:nvPr>
             <p:ph idx="12" type="sldNum"/>
@@ -3703,7 +3706,7 @@
       </p:grpSpPr>
       <p:sp>
         <p:nvSpPr>
-          <p:cNvPr id="18" name="Google Shape;18;p4"/>
+          <p:cNvPr id="18" name="Google Shape;18;p10"/>
           <p:cNvSpPr txBox="1"/>
           <p:nvPr>
             <p:ph type="title"/>
@@ -3859,7 +3862,7 @@
       </p:sp>
       <p:sp>
         <p:nvSpPr>
-          <p:cNvPr id="19" name="Google Shape;19;p4"/>
+          <p:cNvPr id="19" name="Google Shape;19;p10"/>
           <p:cNvSpPr txBox="1"/>
           <p:nvPr>
             <p:ph idx="12" type="sldNum"/>
@@ -4163,7 +4166,7 @@
       </p:grpSpPr>
       <p:sp>
         <p:nvSpPr>
-          <p:cNvPr id="21" name="Google Shape;21;p5"/>
+          <p:cNvPr id="21" name="Google Shape;21;p11"/>
           <p:cNvSpPr txBox="1"/>
           <p:nvPr>
             <p:ph type="title"/>
@@ -4319,7 +4322,7 @@
       </p:sp>
       <p:sp>
         <p:nvSpPr>
-          <p:cNvPr id="22" name="Google Shape;22;p5"/>
+          <p:cNvPr id="22" name="Google Shape;22;p11"/>
           <p:cNvSpPr txBox="1"/>
           <p:nvPr>
             <p:ph idx="1" type="body"/>
@@ -4475,7 +4478,7 @@
       </p:sp>
       <p:sp>
         <p:nvSpPr>
-          <p:cNvPr id="23" name="Google Shape;23;p5"/>
+          <p:cNvPr id="23" name="Google Shape;23;p11"/>
           <p:cNvSpPr txBox="1"/>
           <p:nvPr>
             <p:ph idx="2" type="body"/>
@@ -4631,7 +4634,7 @@
       </p:sp>
       <p:sp>
         <p:nvSpPr>
-          <p:cNvPr id="24" name="Google Shape;24;p5"/>
+          <p:cNvPr id="24" name="Google Shape;24;p11"/>
           <p:cNvSpPr txBox="1"/>
           <p:nvPr>
             <p:ph idx="12" type="sldNum"/>
@@ -4935,7 +4938,7 @@
       </p:grpSpPr>
       <p:sp>
         <p:nvSpPr>
-          <p:cNvPr id="26" name="Google Shape;26;p6"/>
+          <p:cNvPr id="26" name="Google Shape;26;p12"/>
           <p:cNvSpPr txBox="1"/>
           <p:nvPr>
             <p:ph type="title"/>
@@ -5091,7 +5094,7 @@
       </p:sp>
       <p:sp>
         <p:nvSpPr>
-          <p:cNvPr id="27" name="Google Shape;27;p6"/>
+          <p:cNvPr id="27" name="Google Shape;27;p12"/>
           <p:cNvSpPr txBox="1"/>
           <p:nvPr>
             <p:ph idx="12" type="sldNum"/>
@@ -5395,7 +5398,7 @@
       </p:grpSpPr>
       <p:sp>
         <p:nvSpPr>
-          <p:cNvPr id="29" name="Google Shape;29;p7"/>
+          <p:cNvPr id="29" name="Google Shape;29;p13"/>
           <p:cNvSpPr txBox="1"/>
           <p:nvPr>
             <p:ph type="title"/>
@@ -5551,7 +5554,7 @@
       </p:sp>
       <p:sp>
         <p:nvSpPr>
-          <p:cNvPr id="30" name="Google Shape;30;p7"/>
+          <p:cNvPr id="30" name="Google Shape;30;p13"/>
           <p:cNvSpPr txBox="1"/>
           <p:nvPr>
             <p:ph idx="1" type="body"/>
@@ -5707,7 +5710,7 @@
       </p:sp>
       <p:sp>
         <p:nvSpPr>
-          <p:cNvPr id="31" name="Google Shape;31;p7"/>
+          <p:cNvPr id="31" name="Google Shape;31;p13"/>
           <p:cNvSpPr txBox="1"/>
           <p:nvPr>
             <p:ph idx="12" type="sldNum"/>
@@ -6011,7 +6014,7 @@
       </p:grpSpPr>
       <p:sp>
         <p:nvSpPr>
-          <p:cNvPr id="33" name="Google Shape;33;p8"/>
+          <p:cNvPr id="33" name="Google Shape;33;p14"/>
           <p:cNvSpPr txBox="1"/>
           <p:nvPr>
             <p:ph type="title"/>
@@ -6167,7 +6170,7 @@
       </p:sp>
       <p:sp>
         <p:nvSpPr>
-          <p:cNvPr id="34" name="Google Shape;34;p8"/>
+          <p:cNvPr id="34" name="Google Shape;34;p14"/>
           <p:cNvSpPr txBox="1"/>
           <p:nvPr>
             <p:ph idx="12" type="sldNum"/>
@@ -6471,7 +6474,7 @@
       </p:grpSpPr>
       <p:sp>
         <p:nvSpPr>
-          <p:cNvPr id="36" name="Google Shape;36;p9"/>
+          <p:cNvPr id="36" name="Google Shape;36;p15"/>
           <p:cNvSpPr/>
           <p:nvPr/>
         </p:nvSpPr>
@@ -6530,7 +6533,7 @@
       </p:sp>
       <p:sp>
         <p:nvSpPr>
-          <p:cNvPr id="37" name="Google Shape;37;p9"/>
+          <p:cNvPr id="37" name="Google Shape;37;p15"/>
           <p:cNvSpPr txBox="1"/>
           <p:nvPr>
             <p:ph type="title"/>
@@ -6686,7 +6689,7 @@
       </p:sp>
       <p:sp>
         <p:nvSpPr>
-          <p:cNvPr id="38" name="Google Shape;38;p9"/>
+          <p:cNvPr id="38" name="Google Shape;38;p15"/>
           <p:cNvSpPr txBox="1"/>
           <p:nvPr>
             <p:ph idx="1" type="subTitle"/>
@@ -6842,7 +6845,7 @@
       </p:sp>
       <p:sp>
         <p:nvSpPr>
-          <p:cNvPr id="39" name="Google Shape;39;p9"/>
+          <p:cNvPr id="39" name="Google Shape;39;p15"/>
           <p:cNvSpPr txBox="1"/>
           <p:nvPr>
             <p:ph idx="2" type="body"/>
@@ -6998,7 +7001,7 @@
       </p:sp>
       <p:sp>
         <p:nvSpPr>
-          <p:cNvPr id="40" name="Google Shape;40;p9"/>
+          <p:cNvPr id="40" name="Google Shape;40;p15"/>
           <p:cNvSpPr txBox="1"/>
           <p:nvPr>
             <p:ph idx="12" type="sldNum"/>
@@ -7302,7 +7305,7 @@
       </p:grpSpPr>
       <p:sp>
         <p:nvSpPr>
-          <p:cNvPr id="42" name="Google Shape;42;p10"/>
+          <p:cNvPr id="42" name="Google Shape;42;p16"/>
           <p:cNvSpPr txBox="1"/>
           <p:nvPr>
             <p:ph idx="1" type="body"/>
@@ -7346,7 +7349,7 @@
       </p:sp>
       <p:sp>
         <p:nvSpPr>
-          <p:cNvPr id="43" name="Google Shape;43;p10"/>
+          <p:cNvPr id="43" name="Google Shape;43;p16"/>
           <p:cNvSpPr txBox="1"/>
           <p:nvPr>
             <p:ph idx="12" type="sldNum"/>
@@ -7657,7 +7660,7 @@
       </p:grpSpPr>
       <p:sp>
         <p:nvSpPr>
-          <p:cNvPr id="6" name="Google Shape;6;p1"/>
+          <p:cNvPr id="6" name="Google Shape;6;p7"/>
           <p:cNvSpPr txBox="1"/>
           <p:nvPr>
             <p:ph type="title"/>
@@ -7921,7 +7924,7 @@
       </p:sp>
       <p:sp>
         <p:nvSpPr>
-          <p:cNvPr id="7" name="Google Shape;7;p1"/>
+          <p:cNvPr id="7" name="Google Shape;7;p7"/>
           <p:cNvSpPr txBox="1"/>
           <p:nvPr>
             <p:ph idx="1" type="body"/>
@@ -8185,7 +8188,7 @@
       </p:sp>
       <p:sp>
         <p:nvSpPr>
-          <p:cNvPr id="8" name="Google Shape;8;p1"/>
+          <p:cNvPr id="8" name="Google Shape;8;p7"/>
           <p:cNvSpPr txBox="1"/>
           <p:nvPr>
             <p:ph idx="12" type="sldNum"/>
@@ -8466,17 +8469,17 @@
   </p:cSld>
   <p:clrMap accent1="accent1" accent2="accent2" accent3="accent3" accent4="accent4" accent5="accent5" accent6="accent6" bg1="lt1" bg2="dk2" tx1="dk1" tx2="lt2" folHlink="folHlink" hlink="hlink"/>
   <p:sldLayoutIdLst>
-    <p:sldLayoutId id="2147483648" r:id="rId1"/>
-    <p:sldLayoutId id="2147483649" r:id="rId2"/>
-    <p:sldLayoutId id="2147483650" r:id="rId3"/>
-    <p:sldLayoutId id="2147483651" r:id="rId4"/>
-    <p:sldLayoutId id="2147483652" r:id="rId5"/>
-    <p:sldLayoutId id="2147483653" r:id="rId6"/>
-    <p:sldLayoutId id="2147483654" r:id="rId7"/>
-    <p:sldLayoutId id="2147483655" r:id="rId8"/>
-    <p:sldLayoutId id="2147483656" r:id="rId9"/>
-    <p:sldLayoutId id="2147483657" r:id="rId10"/>
-    <p:sldLayoutId id="2147483658" r:id="rId11"/>
+    <p:sldLayoutId id="2147483649" r:id="rId1"/>
+    <p:sldLayoutId id="2147483650" r:id="rId2"/>
+    <p:sldLayoutId id="2147483651" r:id="rId3"/>
+    <p:sldLayoutId id="2147483652" r:id="rId4"/>
+    <p:sldLayoutId id="2147483653" r:id="rId5"/>
+    <p:sldLayoutId id="2147483654" r:id="rId6"/>
+    <p:sldLayoutId id="2147483655" r:id="rId7"/>
+    <p:sldLayoutId id="2147483656" r:id="rId8"/>
+    <p:sldLayoutId id="2147483657" r:id="rId9"/>
+    <p:sldLayoutId id="2147483658" r:id="rId10"/>
+    <p:sldLayoutId id="2147483659" r:id="rId11"/>
   </p:sldLayoutIdLst>
   <p:hf dt="0" ftr="0" hdr="0" sldNum="0"/>
   <p:txStyles>
@@ -9190,7 +9193,7 @@
       </p:grpSpPr>
       <p:sp>
         <p:nvSpPr>
-          <p:cNvPr id="54" name="Google Shape;54;p13"/>
+          <p:cNvPr id="54" name="Google Shape;54;p1"/>
           <p:cNvSpPr/>
           <p:nvPr/>
         </p:nvSpPr>
@@ -9255,7 +9258,7 @@
       </p:sp>
       <p:sp>
         <p:nvSpPr>
-          <p:cNvPr id="55" name="Google Shape;55;p13"/>
+          <p:cNvPr id="55" name="Google Shape;55;p1"/>
           <p:cNvSpPr txBox="1"/>
           <p:nvPr/>
         </p:nvSpPr>
@@ -9352,7 +9355,7 @@
       </p:sp>
       <p:pic>
         <p:nvPicPr>
-          <p:cNvPr id="56" name="Google Shape;56;p13"/>
+          <p:cNvPr id="56" name="Google Shape;56;p1"/>
           <p:cNvPicPr preferRelativeResize="0"/>
           <p:nvPr/>
         </p:nvPicPr>
@@ -9379,7 +9382,7 @@
       </p:pic>
       <p:sp>
         <p:nvSpPr>
-          <p:cNvPr id="57" name="Google Shape;57;p13"/>
+          <p:cNvPr id="57" name="Google Shape;57;p1"/>
           <p:cNvSpPr txBox="1"/>
           <p:nvPr/>
         </p:nvSpPr>
@@ -9445,7 +9448,7 @@
       </p:sp>
       <p:sp>
         <p:nvSpPr>
-          <p:cNvPr id="58" name="Google Shape;58;p13"/>
+          <p:cNvPr id="58" name="Google Shape;58;p1"/>
           <p:cNvSpPr txBox="1"/>
           <p:nvPr/>
         </p:nvSpPr>
@@ -9511,7 +9514,7 @@
       </p:sp>
       <p:sp>
         <p:nvSpPr>
-          <p:cNvPr id="59" name="Google Shape;59;p13"/>
+          <p:cNvPr id="59" name="Google Shape;59;p1"/>
           <p:cNvSpPr txBox="1"/>
           <p:nvPr/>
         </p:nvSpPr>
@@ -9552,7 +9555,15 @@
               <a:buChar char="❖"/>
             </a:pPr>
             <a:r>
-              <a:rPr lang="pt-BR"/>
+              <a:rPr b="0" i="0" lang="pt-BR" sz="1400" u="none" cap="none" strike="noStrike">
+                <a:solidFill>
+                  <a:srgbClr val="000000"/>
+                </a:solidFill>
+                <a:latin typeface="Arial"/>
+                <a:ea typeface="Arial"/>
+                <a:cs typeface="Arial"/>
+                <a:sym typeface="Arial"/>
+              </a:rPr>
               <a:t>Realizar compra</a:t>
             </a:r>
             <a:endParaRPr b="0" i="0" sz="1400" u="none" cap="none" strike="noStrike">
@@ -9584,10 +9595,14 @@
               <a:buChar char="❖"/>
             </a:pPr>
             <a:r>
-              <a:rPr lang="pt-BR">
+              <a:rPr b="0" i="0" lang="pt-BR" sz="1400" u="none" cap="none" strike="noStrike">
                 <a:solidFill>
                   <a:schemeClr val="dk1"/>
                 </a:solidFill>
+                <a:latin typeface="Arial"/>
+                <a:ea typeface="Arial"/>
+                <a:cs typeface="Arial"/>
+                <a:sym typeface="Arial"/>
               </a:rPr>
               <a:t>Cancelar compra</a:t>
             </a:r>
@@ -9620,10 +9635,14 @@
               <a:buChar char="❖"/>
             </a:pPr>
             <a:r>
-              <a:rPr lang="pt-BR">
+              <a:rPr b="0" i="0" lang="pt-BR" sz="1400" u="none" cap="none" strike="noStrike">
                 <a:solidFill>
                   <a:schemeClr val="dk1"/>
                 </a:solidFill>
+                <a:latin typeface="Arial"/>
+                <a:ea typeface="Arial"/>
+                <a:cs typeface="Arial"/>
+                <a:sym typeface="Arial"/>
               </a:rPr>
               <a:t>Pagar compra</a:t>
             </a:r>
@@ -9656,17 +9675,25 @@
               <a:buChar char="❖"/>
             </a:pPr>
             <a:r>
-              <a:rPr lang="pt-BR">
+              <a:rPr b="0" i="0" lang="pt-BR" sz="1400" u="none" cap="none" strike="noStrike">
                 <a:solidFill>
                   <a:schemeClr val="dk1"/>
                 </a:solidFill>
+                <a:latin typeface="Arial"/>
+                <a:ea typeface="Arial"/>
+                <a:cs typeface="Arial"/>
+                <a:sym typeface="Arial"/>
               </a:rPr>
               <a:t>Receber produto</a:t>
             </a:r>
-            <a:endParaRPr>
+            <a:endParaRPr b="0" i="0" sz="1400" u="none" cap="none" strike="noStrike">
               <a:solidFill>
                 <a:schemeClr val="dk1"/>
               </a:solidFill>
+              <a:latin typeface="Arial"/>
+              <a:ea typeface="Arial"/>
+              <a:cs typeface="Arial"/>
+              <a:sym typeface="Arial"/>
             </a:endParaRPr>
           </a:p>
           <a:p>
@@ -9684,20 +9711,29 @@
                 <a:schemeClr val="dk1"/>
               </a:buClr>
               <a:buSzPts val="1400"/>
+              <a:buFont typeface="Arial"/>
               <a:buChar char="❖"/>
             </a:pPr>
             <a:r>
-              <a:rPr lang="pt-BR">
+              <a:rPr b="0" i="0" lang="pt-BR" sz="1400" u="none" cap="none" strike="noStrike">
                 <a:solidFill>
                   <a:schemeClr val="dk1"/>
                 </a:solidFill>
+                <a:latin typeface="Arial"/>
+                <a:ea typeface="Arial"/>
+                <a:cs typeface="Arial"/>
+                <a:sym typeface="Arial"/>
               </a:rPr>
               <a:t>Devolver compra</a:t>
             </a:r>
-            <a:endParaRPr>
+            <a:endParaRPr b="0" i="0" sz="1400" u="none" cap="none" strike="noStrike">
               <a:solidFill>
                 <a:schemeClr val="dk1"/>
               </a:solidFill>
+              <a:latin typeface="Arial"/>
+              <a:ea typeface="Arial"/>
+              <a:cs typeface="Arial"/>
+              <a:sym typeface="Arial"/>
             </a:endParaRPr>
           </a:p>
           <a:p>
@@ -9766,7 +9802,7 @@
       </p:sp>
       <p:sp>
         <p:nvSpPr>
-          <p:cNvPr id="60" name="Google Shape;60;p13"/>
+          <p:cNvPr id="60" name="Google Shape;60;p1"/>
           <p:cNvSpPr txBox="1"/>
           <p:nvPr/>
         </p:nvSpPr>
@@ -9799,6 +9835,11 @@
               <a:spcAft>
                 <a:spcPts val="0"/>
               </a:spcAft>
+              <a:buClr>
+                <a:srgbClr val="000000"/>
+              </a:buClr>
+              <a:buSzPts val="1400"/>
+              <a:buFont typeface="Arial"/>
               <a:buNone/>
             </a:pPr>
             <a:r>
@@ -9818,7 +9859,7 @@
       </p:sp>
       <p:cxnSp>
         <p:nvCxnSpPr>
-          <p:cNvPr id="61" name="Google Shape;61;p13"/>
+          <p:cNvPr id="61" name="Google Shape;61;p1"/>
           <p:cNvCxnSpPr>
             <a:stCxn id="56" idx="3"/>
           </p:cNvCxnSpPr>
@@ -9839,14 +9880,14 @@
             </a:solidFill>
             <a:prstDash val="solid"/>
             <a:round/>
-            <a:headEnd len="med" w="med" type="none"/>
-            <a:tailEnd len="med" w="med" type="none"/>
+            <a:headEnd len="sm" w="sm" type="none"/>
+            <a:tailEnd len="sm" w="sm" type="none"/>
           </a:ln>
         </p:spPr>
       </p:cxnSp>
       <p:sp>
         <p:nvSpPr>
-          <p:cNvPr id="62" name="Google Shape;62;p13"/>
+          <p:cNvPr id="62" name="Google Shape;62;p1"/>
           <p:cNvSpPr/>
           <p:nvPr/>
         </p:nvSpPr>
@@ -9877,20 +9918,44 @@
           </a:bodyPr>
           <a:lstStyle/>
           <a:p>
-            <a:pPr indent="0" lvl="0" marL="0" rtl="0" algn="ctr">
-              <a:spcBef>
-                <a:spcPts val="0"/>
-              </a:spcBef>
-              <a:spcAft>
-                <a:spcPts val="0"/>
-              </a:spcAft>
+            <a:pPr indent="0" lvl="0" marL="0" marR="0" rtl="0" algn="ctr">
+              <a:lnSpc>
+                <a:spcPct val="100000"/>
+              </a:lnSpc>
+              <a:spcBef>
+                <a:spcPts val="0"/>
+              </a:spcBef>
+              <a:spcAft>
+                <a:spcPts val="0"/>
+              </a:spcAft>
+              <a:buClr>
+                <a:srgbClr val="000000"/>
+              </a:buClr>
+              <a:buSzPts val="1400"/>
+              <a:buFont typeface="Arial"/>
               <a:buNone/>
             </a:pPr>
             <a:r>
-              <a:rPr lang="pt-BR"/>
+              <a:rPr b="0" i="0" lang="pt-BR" sz="1400" u="none" cap="none" strike="noStrike">
+                <a:solidFill>
+                  <a:srgbClr val="000000"/>
+                </a:solidFill>
+                <a:latin typeface="Arial"/>
+                <a:ea typeface="Arial"/>
+                <a:cs typeface="Arial"/>
+                <a:sym typeface="Arial"/>
+              </a:rPr>
               <a:t>Loja </a:t>
             </a:r>
-            <a:endParaRPr/>
+            <a:endParaRPr b="0" i="0" sz="1400" u="none" cap="none" strike="noStrike">
+              <a:solidFill>
+                <a:srgbClr val="000000"/>
+              </a:solidFill>
+              <a:latin typeface="Arial"/>
+              <a:ea typeface="Arial"/>
+              <a:cs typeface="Arial"/>
+              <a:sym typeface="Arial"/>
+            </a:endParaRPr>
           </a:p>
         </p:txBody>
       </p:sp>
@@ -9921,7 +9986,7 @@
       </p:grpSpPr>
       <p:sp>
         <p:nvSpPr>
-          <p:cNvPr id="67" name="Google Shape;67;p14"/>
+          <p:cNvPr id="67" name="Google Shape;67;p2"/>
           <p:cNvSpPr/>
           <p:nvPr/>
         </p:nvSpPr>
@@ -9986,7 +10051,7 @@
       </p:sp>
       <p:sp>
         <p:nvSpPr>
-          <p:cNvPr id="68" name="Google Shape;68;p14"/>
+          <p:cNvPr id="68" name="Google Shape;68;p2"/>
           <p:cNvSpPr/>
           <p:nvPr/>
         </p:nvSpPr>
@@ -10051,7 +10116,7 @@
       </p:sp>
       <p:cxnSp>
         <p:nvCxnSpPr>
-          <p:cNvPr id="69" name="Google Shape;69;p14"/>
+          <p:cNvPr id="69" name="Google Shape;69;p2"/>
           <p:cNvCxnSpPr/>
           <p:nvPr/>
         </p:nvCxnSpPr>
@@ -10077,7 +10142,7 @@
       </p:cxnSp>
       <p:sp>
         <p:nvSpPr>
-          <p:cNvPr id="70" name="Google Shape;70;p14"/>
+          <p:cNvPr id="70" name="Google Shape;70;p2"/>
           <p:cNvSpPr txBox="1"/>
           <p:nvPr/>
         </p:nvSpPr>
@@ -10143,7 +10208,7 @@
       </p:sp>
       <p:sp>
         <p:nvSpPr>
-          <p:cNvPr id="71" name="Google Shape;71;p14"/>
+          <p:cNvPr id="71" name="Google Shape;71;p2"/>
           <p:cNvSpPr txBox="1"/>
           <p:nvPr/>
         </p:nvSpPr>
@@ -10209,7 +10274,7 @@
       </p:sp>
       <p:pic>
         <p:nvPicPr>
-          <p:cNvPr id="72" name="Google Shape;72;p14"/>
+          <p:cNvPr id="72" name="Google Shape;72;p2"/>
           <p:cNvPicPr preferRelativeResize="0"/>
           <p:nvPr/>
         </p:nvPicPr>
@@ -10217,7 +10282,7 @@
           <a:blip r:embed="rId3">
             <a:alphaModFix/>
           </a:blip>
-          <a:srcRect b="12375" l="0" r="9624" t="12384"/>
+          <a:srcRect b="12374" l="0" r="9624" t="12384"/>
           <a:stretch/>
         </p:blipFill>
         <p:spPr>
@@ -10236,7 +10301,7 @@
       </p:pic>
       <p:sp>
         <p:nvSpPr>
-          <p:cNvPr id="73" name="Google Shape;73;p14"/>
+          <p:cNvPr id="73" name="Google Shape;73;p2"/>
           <p:cNvSpPr/>
           <p:nvPr/>
         </p:nvSpPr>
@@ -10301,7 +10366,7 @@
       </p:sp>
       <p:sp>
         <p:nvSpPr>
-          <p:cNvPr id="74" name="Google Shape;74;p14"/>
+          <p:cNvPr id="74" name="Google Shape;74;p2"/>
           <p:cNvSpPr/>
           <p:nvPr/>
         </p:nvSpPr>
@@ -10366,7 +10431,7 @@
       </p:sp>
       <p:sp>
         <p:nvSpPr>
-          <p:cNvPr id="75" name="Google Shape;75;p14"/>
+          <p:cNvPr id="75" name="Google Shape;75;p2"/>
           <p:cNvSpPr txBox="1"/>
           <p:nvPr/>
         </p:nvSpPr>
@@ -10389,27 +10454,43 @@
           </a:bodyPr>
           <a:lstStyle/>
           <a:p>
-            <a:pPr indent="0" lvl="0" marL="457200" rtl="0" algn="ctr">
-              <a:spcBef>
-                <a:spcPts val="0"/>
-              </a:spcBef>
-              <a:spcAft>
-                <a:spcPts val="0"/>
-              </a:spcAft>
+            <a:pPr indent="0" lvl="0" marL="457200" marR="0" rtl="0" algn="ctr">
+              <a:lnSpc>
+                <a:spcPct val="100000"/>
+              </a:lnSpc>
+              <a:spcBef>
+                <a:spcPts val="0"/>
+              </a:spcBef>
+              <a:spcAft>
+                <a:spcPts val="0"/>
+              </a:spcAft>
+              <a:buClr>
+                <a:srgbClr val="000000"/>
+              </a:buClr>
+              <a:buSzPts val="1400"/>
+              <a:buFont typeface="Arial"/>
               <a:buNone/>
             </a:pPr>
             <a:r>
-              <a:rPr lang="pt-BR">
+              <a:rPr b="0" i="0" lang="pt-BR" sz="1400" u="none" cap="none" strike="noStrike">
                 <a:solidFill>
                   <a:schemeClr val="dk1"/>
                 </a:solidFill>
+                <a:latin typeface="Arial"/>
+                <a:ea typeface="Arial"/>
+                <a:cs typeface="Arial"/>
+                <a:sym typeface="Arial"/>
               </a:rPr>
               <a:t>Realizar compra</a:t>
             </a:r>
-            <a:endParaRPr>
+            <a:endParaRPr b="0" i="0" sz="1400" u="none" cap="none" strike="noStrike">
               <a:solidFill>
                 <a:schemeClr val="dk1"/>
               </a:solidFill>
+              <a:latin typeface="Arial"/>
+              <a:ea typeface="Arial"/>
+              <a:cs typeface="Arial"/>
+              <a:sym typeface="Arial"/>
             </a:endParaRPr>
           </a:p>
           <a:p>
@@ -10433,13 +10514,21 @@
             <a:r>
               <a:t/>
             </a:r>
-            <a:endParaRPr/>
+            <a:endParaRPr b="0" i="0" sz="1400" u="none" cap="none" strike="noStrike">
+              <a:solidFill>
+                <a:srgbClr val="000000"/>
+              </a:solidFill>
+              <a:latin typeface="Arial"/>
+              <a:ea typeface="Arial"/>
+              <a:cs typeface="Arial"/>
+              <a:sym typeface="Arial"/>
+            </a:endParaRPr>
           </a:p>
         </p:txBody>
       </p:sp>
       <p:cxnSp>
         <p:nvCxnSpPr>
-          <p:cNvPr id="76" name="Google Shape;76;p14"/>
+          <p:cNvPr id="76" name="Google Shape;76;p2"/>
           <p:cNvCxnSpPr>
             <a:stCxn id="67" idx="2"/>
             <a:endCxn id="72" idx="0"/>
@@ -10463,14 +10552,14 @@
             </a:solidFill>
             <a:prstDash val="solid"/>
             <a:round/>
-            <a:headEnd len="med" w="med" type="none"/>
-            <a:tailEnd len="med" w="med" type="none"/>
+            <a:headEnd len="sm" w="sm" type="none"/>
+            <a:tailEnd len="sm" w="sm" type="none"/>
           </a:ln>
         </p:spPr>
       </p:cxnSp>
       <p:cxnSp>
         <p:nvCxnSpPr>
-          <p:cNvPr id="77" name="Google Shape;77;p14"/>
+          <p:cNvPr id="77" name="Google Shape;77;p2"/>
           <p:cNvCxnSpPr>
             <a:stCxn id="67" idx="2"/>
             <a:endCxn id="73" idx="1"/>
@@ -10492,14 +10581,14 @@
             </a:solidFill>
             <a:prstDash val="solid"/>
             <a:round/>
-            <a:headEnd len="med" w="med" type="none"/>
-            <a:tailEnd len="med" w="med" type="none"/>
+            <a:headEnd len="sm" w="sm" type="none"/>
+            <a:tailEnd len="sm" w="sm" type="none"/>
           </a:ln>
         </p:spPr>
       </p:cxnSp>
       <p:sp>
         <p:nvSpPr>
-          <p:cNvPr id="78" name="Google Shape;78;p14"/>
+          <p:cNvPr id="78" name="Google Shape;78;p2"/>
           <p:cNvSpPr txBox="1"/>
           <p:nvPr/>
         </p:nvSpPr>
@@ -10522,27 +10611,50 @@
           </a:bodyPr>
           <a:lstStyle/>
           <a:p>
-            <a:pPr indent="-317500" lvl="0" marL="457200" rtl="0" algn="l">
-              <a:spcBef>
-                <a:spcPts val="0"/>
-              </a:spcBef>
-              <a:spcAft>
-                <a:spcPts val="0"/>
-              </a:spcAft>
+            <a:pPr indent="-317500" lvl="0" marL="457200" marR="0" rtl="0" algn="l">
+              <a:lnSpc>
+                <a:spcPct val="100000"/>
+              </a:lnSpc>
+              <a:spcBef>
+                <a:spcPts val="0"/>
+              </a:spcBef>
+              <a:spcAft>
+                <a:spcPts val="0"/>
+              </a:spcAft>
+              <a:buClr>
+                <a:srgbClr val="000000"/>
+              </a:buClr>
               <a:buSzPts val="1400"/>
+              <a:buFont typeface="Arial"/>
               <a:buChar char="●"/>
             </a:pPr>
             <a:r>
-              <a:rPr lang="pt-BR"/>
+              <a:rPr b="0" i="0" lang="pt-BR" sz="1400" u="none" cap="none" strike="noStrike">
+                <a:solidFill>
+                  <a:srgbClr val="000000"/>
+                </a:solidFill>
+                <a:latin typeface="Arial"/>
+                <a:ea typeface="Arial"/>
+                <a:cs typeface="Arial"/>
+                <a:sym typeface="Arial"/>
+              </a:rPr>
               <a:t>Vender</a:t>
             </a:r>
-            <a:endParaRPr/>
+            <a:endParaRPr b="0" i="0" sz="1400" u="none" cap="none" strike="noStrike">
+              <a:solidFill>
+                <a:srgbClr val="000000"/>
+              </a:solidFill>
+              <a:latin typeface="Arial"/>
+              <a:ea typeface="Arial"/>
+              <a:cs typeface="Arial"/>
+              <a:sym typeface="Arial"/>
+            </a:endParaRPr>
           </a:p>
         </p:txBody>
       </p:sp>
       <p:sp>
         <p:nvSpPr>
-          <p:cNvPr id="79" name="Google Shape;79;p14"/>
+          <p:cNvPr id="79" name="Google Shape;79;p2"/>
           <p:cNvSpPr/>
           <p:nvPr/>
         </p:nvSpPr>
@@ -10573,20 +10685,44 @@
           </a:bodyPr>
           <a:lstStyle/>
           <a:p>
-            <a:pPr indent="0" lvl="0" marL="0" rtl="0" algn="ctr">
-              <a:spcBef>
-                <a:spcPts val="0"/>
-              </a:spcBef>
-              <a:spcAft>
-                <a:spcPts val="0"/>
-              </a:spcAft>
+            <a:pPr indent="0" lvl="0" marL="0" marR="0" rtl="0" algn="ctr">
+              <a:lnSpc>
+                <a:spcPct val="100000"/>
+              </a:lnSpc>
+              <a:spcBef>
+                <a:spcPts val="0"/>
+              </a:spcBef>
+              <a:spcAft>
+                <a:spcPts val="0"/>
+              </a:spcAft>
+              <a:buClr>
+                <a:srgbClr val="000000"/>
+              </a:buClr>
+              <a:buSzPts val="1400"/>
+              <a:buFont typeface="Arial"/>
               <a:buNone/>
             </a:pPr>
             <a:r>
-              <a:rPr lang="pt-BR"/>
+              <a:rPr b="0" i="0" lang="pt-BR" sz="1400" u="none" cap="none" strike="noStrike">
+                <a:solidFill>
+                  <a:srgbClr val="000000"/>
+                </a:solidFill>
+                <a:latin typeface="Arial"/>
+                <a:ea typeface="Arial"/>
+                <a:cs typeface="Arial"/>
+                <a:sym typeface="Arial"/>
+              </a:rPr>
               <a:t>Loja </a:t>
             </a:r>
-            <a:endParaRPr/>
+            <a:endParaRPr b="0" i="0" sz="1400" u="none" cap="none" strike="noStrike">
+              <a:solidFill>
+                <a:srgbClr val="000000"/>
+              </a:solidFill>
+              <a:latin typeface="Arial"/>
+              <a:ea typeface="Arial"/>
+              <a:cs typeface="Arial"/>
+              <a:sym typeface="Arial"/>
+            </a:endParaRPr>
           </a:p>
         </p:txBody>
       </p:sp>
@@ -10617,7 +10753,7 @@
       </p:grpSpPr>
       <p:sp>
         <p:nvSpPr>
-          <p:cNvPr id="84" name="Google Shape;84;p15"/>
+          <p:cNvPr id="84" name="Google Shape;84;p3"/>
           <p:cNvSpPr/>
           <p:nvPr/>
         </p:nvSpPr>
@@ -10682,7 +10818,7 @@
       </p:sp>
       <p:sp>
         <p:nvSpPr>
-          <p:cNvPr id="85" name="Google Shape;85;p15"/>
+          <p:cNvPr id="85" name="Google Shape;85;p3"/>
           <p:cNvSpPr txBox="1"/>
           <p:nvPr/>
         </p:nvSpPr>
@@ -10723,16 +10859,32 @@
               <a:buNone/>
             </a:pPr>
             <a:r>
-              <a:rPr lang="pt-BR"/>
+              <a:rPr b="0" i="0" lang="pt-BR" sz="1400" u="none" cap="none" strike="noStrike">
+                <a:solidFill>
+                  <a:srgbClr val="000000"/>
+                </a:solidFill>
+                <a:latin typeface="Arial"/>
+                <a:ea typeface="Arial"/>
+                <a:cs typeface="Arial"/>
+                <a:sym typeface="Arial"/>
+              </a:rPr>
               <a:t>Cancelar compra</a:t>
             </a:r>
-            <a:endParaRPr/>
+            <a:endParaRPr b="0" i="0" sz="1400" u="none" cap="none" strike="noStrike">
+              <a:solidFill>
+                <a:srgbClr val="000000"/>
+              </a:solidFill>
+              <a:latin typeface="Arial"/>
+              <a:ea typeface="Arial"/>
+              <a:cs typeface="Arial"/>
+              <a:sym typeface="Arial"/>
+            </a:endParaRPr>
           </a:p>
         </p:txBody>
       </p:sp>
       <p:sp>
         <p:nvSpPr>
-          <p:cNvPr id="86" name="Google Shape;86;p15"/>
+          <p:cNvPr id="86" name="Google Shape;86;p3"/>
           <p:cNvSpPr/>
           <p:nvPr/>
         </p:nvSpPr>
@@ -10797,7 +10949,7 @@
       </p:sp>
       <p:cxnSp>
         <p:nvCxnSpPr>
-          <p:cNvPr id="87" name="Google Shape;87;p15"/>
+          <p:cNvPr id="87" name="Google Shape;87;p3"/>
           <p:cNvCxnSpPr/>
           <p:nvPr/>
         </p:nvCxnSpPr>
@@ -10823,7 +10975,7 @@
       </p:cxnSp>
       <p:sp>
         <p:nvSpPr>
-          <p:cNvPr id="88" name="Google Shape;88;p15"/>
+          <p:cNvPr id="88" name="Google Shape;88;p3"/>
           <p:cNvSpPr txBox="1"/>
           <p:nvPr/>
         </p:nvSpPr>
@@ -10889,7 +11041,7 @@
       </p:sp>
       <p:sp>
         <p:nvSpPr>
-          <p:cNvPr id="89" name="Google Shape;89;p15"/>
+          <p:cNvPr id="89" name="Google Shape;89;p3"/>
           <p:cNvSpPr txBox="1"/>
           <p:nvPr/>
         </p:nvSpPr>
@@ -10955,7 +11107,7 @@
       </p:sp>
       <p:pic>
         <p:nvPicPr>
-          <p:cNvPr id="90" name="Google Shape;90;p15"/>
+          <p:cNvPr id="90" name="Google Shape;90;p3"/>
           <p:cNvPicPr preferRelativeResize="0"/>
           <p:nvPr/>
         </p:nvPicPr>
@@ -10963,7 +11115,7 @@
           <a:blip r:embed="rId3">
             <a:alphaModFix/>
           </a:blip>
-          <a:srcRect b="12375" l="0" r="9624" t="12384"/>
+          <a:srcRect b="12374" l="0" r="9624" t="12384"/>
           <a:stretch/>
         </p:blipFill>
         <p:spPr>
@@ -10982,7 +11134,7 @@
       </p:pic>
       <p:sp>
         <p:nvSpPr>
-          <p:cNvPr id="91" name="Google Shape;91;p15"/>
+          <p:cNvPr id="91" name="Google Shape;91;p3"/>
           <p:cNvSpPr/>
           <p:nvPr/>
         </p:nvSpPr>
@@ -11047,7 +11199,7 @@
       </p:sp>
       <p:sp>
         <p:nvSpPr>
-          <p:cNvPr id="92" name="Google Shape;92;p15"/>
+          <p:cNvPr id="92" name="Google Shape;92;p3"/>
           <p:cNvSpPr/>
           <p:nvPr/>
         </p:nvSpPr>
@@ -11112,7 +11264,7 @@
       </p:sp>
       <p:sp>
         <p:nvSpPr>
-          <p:cNvPr id="93" name="Google Shape;93;p15"/>
+          <p:cNvPr id="93" name="Google Shape;93;p3"/>
           <p:cNvSpPr txBox="1"/>
           <p:nvPr/>
         </p:nvSpPr>
@@ -11153,10 +11305,26 @@
               <a:buChar char="●"/>
             </a:pPr>
             <a:r>
-              <a:rPr lang="pt-BR"/>
+              <a:rPr b="0" i="0" lang="pt-BR" sz="1400" u="none" cap="none" strike="noStrike">
+                <a:solidFill>
+                  <a:srgbClr val="000000"/>
+                </a:solidFill>
+                <a:latin typeface="Arial"/>
+                <a:ea typeface="Arial"/>
+                <a:cs typeface="Arial"/>
+                <a:sym typeface="Arial"/>
+              </a:rPr>
               <a:t>Cancelar compra</a:t>
             </a:r>
-            <a:endParaRPr/>
+            <a:endParaRPr b="0" i="0" sz="1400" u="none" cap="none" strike="noStrike">
+              <a:solidFill>
+                <a:srgbClr val="000000"/>
+              </a:solidFill>
+              <a:latin typeface="Arial"/>
+              <a:ea typeface="Arial"/>
+              <a:cs typeface="Arial"/>
+              <a:sym typeface="Arial"/>
+            </a:endParaRPr>
           </a:p>
           <a:p>
             <a:pPr indent="0" lvl="0" marL="457200" marR="0" rtl="0" algn="l">
@@ -11169,18 +11337,31 @@
               <a:spcAft>
                 <a:spcPts val="0"/>
               </a:spcAft>
+              <a:buClr>
+                <a:srgbClr val="000000"/>
+              </a:buClr>
+              <a:buSzPts val="1400"/>
+              <a:buFont typeface="Arial"/>
               <a:buNone/>
             </a:pPr>
             <a:r>
               <a:t/>
             </a:r>
-            <a:endParaRPr/>
+            <a:endParaRPr b="0" i="0" sz="1400" u="none" cap="none" strike="noStrike">
+              <a:solidFill>
+                <a:srgbClr val="000000"/>
+              </a:solidFill>
+              <a:latin typeface="Arial"/>
+              <a:ea typeface="Arial"/>
+              <a:cs typeface="Arial"/>
+              <a:sym typeface="Arial"/>
+            </a:endParaRPr>
           </a:p>
         </p:txBody>
       </p:sp>
       <p:cxnSp>
         <p:nvCxnSpPr>
-          <p:cNvPr id="94" name="Google Shape;94;p15"/>
+          <p:cNvPr id="94" name="Google Shape;94;p3"/>
           <p:cNvCxnSpPr>
             <a:stCxn id="84" idx="2"/>
             <a:endCxn id="90" idx="0"/>
@@ -11189,7 +11370,7 @@
         </p:nvCxnSpPr>
         <p:spPr>
           <a:xfrm rot="5400000">
-            <a:off x="3434938" y="525321"/>
+            <a:off x="3434938" y="525320"/>
             <a:ext cx="639300" cy="1166400"/>
           </a:xfrm>
           <a:prstGeom prst="curvedConnector3">
@@ -11204,14 +11385,14 @@
             </a:solidFill>
             <a:prstDash val="solid"/>
             <a:round/>
-            <a:headEnd len="med" w="med" type="none"/>
-            <a:tailEnd len="med" w="med" type="none"/>
+            <a:headEnd len="sm" w="sm" type="none"/>
+            <a:tailEnd len="sm" w="sm" type="none"/>
           </a:ln>
         </p:spPr>
       </p:cxnSp>
       <p:cxnSp>
         <p:nvCxnSpPr>
-          <p:cNvPr id="95" name="Google Shape;95;p15"/>
+          <p:cNvPr id="95" name="Google Shape;95;p3"/>
           <p:cNvCxnSpPr>
             <a:endCxn id="93" idx="1"/>
           </p:cNvCxnSpPr>
@@ -11232,14 +11413,14 @@
             </a:solidFill>
             <a:prstDash val="solid"/>
             <a:round/>
-            <a:headEnd len="med" w="med" type="none"/>
-            <a:tailEnd len="med" w="med" type="none"/>
+            <a:headEnd len="sm" w="sm" type="none"/>
+            <a:tailEnd len="sm" w="sm" type="none"/>
           </a:ln>
         </p:spPr>
       </p:cxnSp>
       <p:sp>
         <p:nvSpPr>
-          <p:cNvPr id="96" name="Google Shape;96;p15"/>
+          <p:cNvPr id="96" name="Google Shape;96;p3"/>
           <p:cNvSpPr/>
           <p:nvPr/>
         </p:nvSpPr>
@@ -11270,20 +11451,44 @@
           </a:bodyPr>
           <a:lstStyle/>
           <a:p>
-            <a:pPr indent="0" lvl="0" marL="0" rtl="0" algn="ctr">
-              <a:spcBef>
-                <a:spcPts val="0"/>
-              </a:spcBef>
-              <a:spcAft>
-                <a:spcPts val="0"/>
-              </a:spcAft>
+            <a:pPr indent="0" lvl="0" marL="0" marR="0" rtl="0" algn="ctr">
+              <a:lnSpc>
+                <a:spcPct val="100000"/>
+              </a:lnSpc>
+              <a:spcBef>
+                <a:spcPts val="0"/>
+              </a:spcBef>
+              <a:spcAft>
+                <a:spcPts val="0"/>
+              </a:spcAft>
+              <a:buClr>
+                <a:srgbClr val="000000"/>
+              </a:buClr>
+              <a:buSzPts val="1400"/>
+              <a:buFont typeface="Arial"/>
               <a:buNone/>
             </a:pPr>
             <a:r>
-              <a:rPr lang="pt-BR"/>
+              <a:rPr b="0" i="0" lang="pt-BR" sz="1400" u="none" cap="none" strike="noStrike">
+                <a:solidFill>
+                  <a:srgbClr val="000000"/>
+                </a:solidFill>
+                <a:latin typeface="Arial"/>
+                <a:ea typeface="Arial"/>
+                <a:cs typeface="Arial"/>
+                <a:sym typeface="Arial"/>
+              </a:rPr>
               <a:t>Loja </a:t>
             </a:r>
-            <a:endParaRPr/>
+            <a:endParaRPr b="0" i="0" sz="1400" u="none" cap="none" strike="noStrike">
+              <a:solidFill>
+                <a:srgbClr val="000000"/>
+              </a:solidFill>
+              <a:latin typeface="Arial"/>
+              <a:ea typeface="Arial"/>
+              <a:cs typeface="Arial"/>
+              <a:sym typeface="Arial"/>
+            </a:endParaRPr>
           </a:p>
         </p:txBody>
       </p:sp>
@@ -11314,7 +11519,7 @@
       </p:grpSpPr>
       <p:sp>
         <p:nvSpPr>
-          <p:cNvPr id="101" name="Google Shape;101;p16"/>
+          <p:cNvPr id="101" name="Google Shape;101;p4"/>
           <p:cNvSpPr/>
           <p:nvPr/>
         </p:nvSpPr>
@@ -11379,7 +11584,7 @@
       </p:sp>
       <p:sp>
         <p:nvSpPr>
-          <p:cNvPr id="102" name="Google Shape;102;p16"/>
+          <p:cNvPr id="102" name="Google Shape;102;p4"/>
           <p:cNvSpPr txBox="1"/>
           <p:nvPr/>
         </p:nvSpPr>
@@ -11420,7 +11625,15 @@
               <a:buNone/>
             </a:pPr>
             <a:r>
-              <a:rPr lang="pt-BR"/>
+              <a:rPr b="0" i="0" lang="pt-BR" sz="1400" u="none" cap="none" strike="noStrike">
+                <a:solidFill>
+                  <a:srgbClr val="000000"/>
+                </a:solidFill>
+                <a:latin typeface="Arial"/>
+                <a:ea typeface="Arial"/>
+                <a:cs typeface="Arial"/>
+                <a:sym typeface="Arial"/>
+              </a:rPr>
               <a:t>Pagar compra</a:t>
             </a:r>
             <a:endParaRPr b="0" i="0" sz="1400" u="none" cap="none" strike="noStrike">
@@ -11437,7 +11650,7 @@
       </p:sp>
       <p:sp>
         <p:nvSpPr>
-          <p:cNvPr id="103" name="Google Shape;103;p16"/>
+          <p:cNvPr id="103" name="Google Shape;103;p4"/>
           <p:cNvSpPr/>
           <p:nvPr/>
         </p:nvSpPr>
@@ -11502,7 +11715,7 @@
       </p:sp>
       <p:cxnSp>
         <p:nvCxnSpPr>
-          <p:cNvPr id="104" name="Google Shape;104;p16"/>
+          <p:cNvPr id="104" name="Google Shape;104;p4"/>
           <p:cNvCxnSpPr/>
           <p:nvPr/>
         </p:nvCxnSpPr>
@@ -11528,7 +11741,7 @@
       </p:cxnSp>
       <p:sp>
         <p:nvSpPr>
-          <p:cNvPr id="105" name="Google Shape;105;p16"/>
+          <p:cNvPr id="105" name="Google Shape;105;p4"/>
           <p:cNvSpPr txBox="1"/>
           <p:nvPr/>
         </p:nvSpPr>
@@ -11594,7 +11807,7 @@
       </p:sp>
       <p:sp>
         <p:nvSpPr>
-          <p:cNvPr id="106" name="Google Shape;106;p16"/>
+          <p:cNvPr id="106" name="Google Shape;106;p4"/>
           <p:cNvSpPr txBox="1"/>
           <p:nvPr/>
         </p:nvSpPr>
@@ -11660,7 +11873,7 @@
       </p:sp>
       <p:sp>
         <p:nvSpPr>
-          <p:cNvPr id="107" name="Google Shape;107;p16"/>
+          <p:cNvPr id="107" name="Google Shape;107;p4"/>
           <p:cNvSpPr/>
           <p:nvPr/>
         </p:nvSpPr>
@@ -11725,7 +11938,7 @@
       </p:sp>
       <p:sp>
         <p:nvSpPr>
-          <p:cNvPr id="108" name="Google Shape;108;p16"/>
+          <p:cNvPr id="108" name="Google Shape;108;p4"/>
           <p:cNvSpPr/>
           <p:nvPr/>
         </p:nvSpPr>
@@ -11790,7 +12003,7 @@
       </p:sp>
       <p:sp>
         <p:nvSpPr>
-          <p:cNvPr id="109" name="Google Shape;109;p16"/>
+          <p:cNvPr id="109" name="Google Shape;109;p4"/>
           <p:cNvSpPr txBox="1"/>
           <p:nvPr/>
         </p:nvSpPr>
@@ -11823,14 +12036,38 @@
               <a:spcAft>
                 <a:spcPts val="0"/>
               </a:spcAft>
+              <a:buClr>
+                <a:srgbClr val="000000"/>
+              </a:buClr>
               <a:buSzPts val="1400"/>
+              <a:buFont typeface="Arial"/>
               <a:buChar char="●"/>
             </a:pPr>
             <a:r>
               <a:rPr lang="pt-BR"/>
-              <a:t>Disponibilizar pagamento</a:t>
+              <a:t>Receber </a:t>
             </a:r>
-            <a:endParaRPr/>
+            <a:r>
+              <a:rPr b="0" i="0" lang="pt-BR" sz="1400" u="none" cap="none" strike="noStrike">
+                <a:solidFill>
+                  <a:srgbClr val="000000"/>
+                </a:solidFill>
+                <a:latin typeface="Arial"/>
+                <a:ea typeface="Arial"/>
+                <a:cs typeface="Arial"/>
+                <a:sym typeface="Arial"/>
+              </a:rPr>
+              <a:t>pagamento</a:t>
+            </a:r>
+            <a:endParaRPr b="0" i="0" sz="1400" u="none" cap="none" strike="noStrike">
+              <a:solidFill>
+                <a:srgbClr val="000000"/>
+              </a:solidFill>
+              <a:latin typeface="Arial"/>
+              <a:ea typeface="Arial"/>
+              <a:cs typeface="Arial"/>
+              <a:sym typeface="Arial"/>
+            </a:endParaRPr>
           </a:p>
           <a:p>
             <a:pPr indent="0" lvl="0" marL="457200" marR="0" rtl="0" algn="l">
@@ -11898,7 +12135,7 @@
       </p:sp>
       <p:pic>
         <p:nvPicPr>
-          <p:cNvPr id="110" name="Google Shape;110;p16"/>
+          <p:cNvPr id="110" name="Google Shape;110;p4"/>
           <p:cNvPicPr preferRelativeResize="0"/>
           <p:nvPr/>
         </p:nvPicPr>
@@ -11906,7 +12143,7 @@
           <a:blip r:embed="rId3">
             <a:alphaModFix/>
           </a:blip>
-          <a:srcRect b="12376" l="0" r="9624" t="12384"/>
+          <a:srcRect b="12375" l="0" r="9624" t="12384"/>
           <a:stretch/>
         </p:blipFill>
         <p:spPr>
@@ -11925,7 +12162,7 @@
       </p:pic>
       <p:cxnSp>
         <p:nvCxnSpPr>
-          <p:cNvPr id="111" name="Google Shape;111;p16"/>
+          <p:cNvPr id="111" name="Google Shape;111;p4"/>
           <p:cNvCxnSpPr>
             <a:stCxn id="101" idx="2"/>
             <a:endCxn id="110" idx="0"/>
@@ -11949,14 +12186,14 @@
             </a:solidFill>
             <a:prstDash val="solid"/>
             <a:round/>
-            <a:headEnd len="med" w="med" type="none"/>
-            <a:tailEnd len="med" w="med" type="none"/>
+            <a:headEnd len="sm" w="sm" type="none"/>
+            <a:tailEnd len="sm" w="sm" type="none"/>
           </a:ln>
         </p:spPr>
       </p:cxnSp>
       <p:cxnSp>
         <p:nvCxnSpPr>
-          <p:cNvPr id="112" name="Google Shape;112;p16"/>
+          <p:cNvPr id="112" name="Google Shape;112;p4"/>
           <p:cNvCxnSpPr>
             <a:stCxn id="101" idx="2"/>
             <a:endCxn id="109" idx="1"/>
@@ -11978,14 +12215,14 @@
             </a:solidFill>
             <a:prstDash val="solid"/>
             <a:round/>
-            <a:headEnd len="med" w="med" type="none"/>
-            <a:tailEnd len="med" w="med" type="none"/>
+            <a:headEnd len="sm" w="sm" type="none"/>
+            <a:tailEnd len="sm" w="sm" type="none"/>
           </a:ln>
         </p:spPr>
       </p:cxnSp>
       <p:sp>
         <p:nvSpPr>
-          <p:cNvPr id="113" name="Google Shape;113;p16"/>
+          <p:cNvPr id="113" name="Google Shape;113;p4"/>
           <p:cNvSpPr/>
           <p:nvPr/>
         </p:nvSpPr>
@@ -12016,20 +12253,44 @@
           </a:bodyPr>
           <a:lstStyle/>
           <a:p>
-            <a:pPr indent="0" lvl="0" marL="0" rtl="0" algn="ctr">
-              <a:spcBef>
-                <a:spcPts val="0"/>
-              </a:spcBef>
-              <a:spcAft>
-                <a:spcPts val="0"/>
-              </a:spcAft>
+            <a:pPr indent="0" lvl="0" marL="0" marR="0" rtl="0" algn="ctr">
+              <a:lnSpc>
+                <a:spcPct val="100000"/>
+              </a:lnSpc>
+              <a:spcBef>
+                <a:spcPts val="0"/>
+              </a:spcBef>
+              <a:spcAft>
+                <a:spcPts val="0"/>
+              </a:spcAft>
+              <a:buClr>
+                <a:srgbClr val="000000"/>
+              </a:buClr>
+              <a:buSzPts val="1400"/>
+              <a:buFont typeface="Arial"/>
               <a:buNone/>
             </a:pPr>
             <a:r>
-              <a:rPr lang="pt-BR"/>
+              <a:rPr b="0" i="0" lang="pt-BR" sz="1400" u="none" cap="none" strike="noStrike">
+                <a:solidFill>
+                  <a:srgbClr val="000000"/>
+                </a:solidFill>
+                <a:latin typeface="Arial"/>
+                <a:ea typeface="Arial"/>
+                <a:cs typeface="Arial"/>
+                <a:sym typeface="Arial"/>
+              </a:rPr>
               <a:t>Loja </a:t>
             </a:r>
-            <a:endParaRPr/>
+            <a:endParaRPr b="0" i="0" sz="1400" u="none" cap="none" strike="noStrike">
+              <a:solidFill>
+                <a:srgbClr val="000000"/>
+              </a:solidFill>
+              <a:latin typeface="Arial"/>
+              <a:ea typeface="Arial"/>
+              <a:cs typeface="Arial"/>
+              <a:sym typeface="Arial"/>
+            </a:endParaRPr>
           </a:p>
         </p:txBody>
       </p:sp>
@@ -12060,7 +12321,7 @@
       </p:grpSpPr>
       <p:sp>
         <p:nvSpPr>
-          <p:cNvPr id="118" name="Google Shape;118;p17"/>
+          <p:cNvPr id="118" name="Google Shape;118;p5"/>
           <p:cNvSpPr/>
           <p:nvPr/>
         </p:nvSpPr>
@@ -12125,7 +12386,7 @@
       </p:sp>
       <p:sp>
         <p:nvSpPr>
-          <p:cNvPr id="119" name="Google Shape;119;p17"/>
+          <p:cNvPr id="119" name="Google Shape;119;p5"/>
           <p:cNvSpPr/>
           <p:nvPr/>
         </p:nvSpPr>
@@ -12190,7 +12451,7 @@
       </p:sp>
       <p:sp>
         <p:nvSpPr>
-          <p:cNvPr id="120" name="Google Shape;120;p17"/>
+          <p:cNvPr id="120" name="Google Shape;120;p5"/>
           <p:cNvSpPr txBox="1"/>
           <p:nvPr/>
         </p:nvSpPr>
@@ -12256,7 +12517,7 @@
       </p:sp>
       <p:cxnSp>
         <p:nvCxnSpPr>
-          <p:cNvPr id="121" name="Google Shape;121;p17"/>
+          <p:cNvPr id="121" name="Google Shape;121;p5"/>
           <p:cNvCxnSpPr/>
           <p:nvPr/>
         </p:nvCxnSpPr>
@@ -12282,7 +12543,7 @@
       </p:cxnSp>
       <p:sp>
         <p:nvSpPr>
-          <p:cNvPr id="122" name="Google Shape;122;p17"/>
+          <p:cNvPr id="122" name="Google Shape;122;p5"/>
           <p:cNvSpPr txBox="1"/>
           <p:nvPr/>
         </p:nvSpPr>
@@ -12388,7 +12649,7 @@
       </p:sp>
       <p:sp>
         <p:nvSpPr>
-          <p:cNvPr id="123" name="Google Shape;123;p17"/>
+          <p:cNvPr id="123" name="Google Shape;123;p5"/>
           <p:cNvSpPr txBox="1"/>
           <p:nvPr/>
         </p:nvSpPr>
@@ -12429,16 +12690,32 @@
               <a:buNone/>
             </a:pPr>
             <a:r>
-              <a:rPr lang="pt-BR"/>
+              <a:rPr b="0" i="0" lang="pt-BR" sz="1400" u="none" cap="none" strike="noStrike">
+                <a:solidFill>
+                  <a:srgbClr val="000000"/>
+                </a:solidFill>
+                <a:latin typeface="Arial"/>
+                <a:ea typeface="Arial"/>
+                <a:cs typeface="Arial"/>
+                <a:sym typeface="Arial"/>
+              </a:rPr>
               <a:t>Receber produto</a:t>
             </a:r>
-            <a:endParaRPr/>
+            <a:endParaRPr b="0" i="0" sz="1400" u="none" cap="none" strike="noStrike">
+              <a:solidFill>
+                <a:srgbClr val="000000"/>
+              </a:solidFill>
+              <a:latin typeface="Arial"/>
+              <a:ea typeface="Arial"/>
+              <a:cs typeface="Arial"/>
+              <a:sym typeface="Arial"/>
+            </a:endParaRPr>
           </a:p>
         </p:txBody>
       </p:sp>
       <p:pic>
         <p:nvPicPr>
-          <p:cNvPr id="124" name="Google Shape;124;p17"/>
+          <p:cNvPr id="124" name="Google Shape;124;p5"/>
           <p:cNvPicPr preferRelativeResize="0"/>
           <p:nvPr/>
         </p:nvPicPr>
@@ -12446,7 +12723,7 @@
           <a:blip r:embed="rId3">
             <a:alphaModFix/>
           </a:blip>
-          <a:srcRect b="12375" l="0" r="9624" t="12384"/>
+          <a:srcRect b="12374" l="0" r="9624" t="12384"/>
           <a:stretch/>
         </p:blipFill>
         <p:spPr>
@@ -12465,7 +12742,7 @@
       </p:pic>
       <p:sp>
         <p:nvSpPr>
-          <p:cNvPr id="125" name="Google Shape;125;p17"/>
+          <p:cNvPr id="125" name="Google Shape;125;p5"/>
           <p:cNvSpPr txBox="1"/>
           <p:nvPr/>
         </p:nvSpPr>
@@ -12498,14 +12775,34 @@
               <a:spcAft>
                 <a:spcPts val="0"/>
               </a:spcAft>
+              <a:buClr>
+                <a:srgbClr val="000000"/>
+              </a:buClr>
               <a:buSzPts val="1400"/>
+              <a:buFont typeface="Arial"/>
               <a:buChar char="●"/>
             </a:pPr>
             <a:r>
-              <a:rPr lang="pt-BR"/>
+              <a:rPr b="0" i="0" lang="pt-BR" sz="1400" u="none" cap="none" strike="noStrike">
+                <a:solidFill>
+                  <a:srgbClr val="000000"/>
+                </a:solidFill>
+                <a:latin typeface="Arial"/>
+                <a:ea typeface="Arial"/>
+                <a:cs typeface="Arial"/>
+                <a:sym typeface="Arial"/>
+              </a:rPr>
               <a:t>Entregar pedido</a:t>
             </a:r>
-            <a:endParaRPr/>
+            <a:endParaRPr b="0" i="0" sz="1400" u="none" cap="none" strike="noStrike">
+              <a:solidFill>
+                <a:srgbClr val="000000"/>
+              </a:solidFill>
+              <a:latin typeface="Arial"/>
+              <a:ea typeface="Arial"/>
+              <a:cs typeface="Arial"/>
+              <a:sym typeface="Arial"/>
+            </a:endParaRPr>
           </a:p>
           <a:p>
             <a:pPr indent="0" lvl="0" marL="457200" marR="0" rtl="0" algn="l">
@@ -12542,7 +12839,7 @@
       </p:sp>
       <p:sp>
         <p:nvSpPr>
-          <p:cNvPr id="126" name="Google Shape;126;p17"/>
+          <p:cNvPr id="126" name="Google Shape;126;p5"/>
           <p:cNvSpPr/>
           <p:nvPr/>
         </p:nvSpPr>
@@ -12607,7 +12904,7 @@
       </p:sp>
       <p:sp>
         <p:nvSpPr>
-          <p:cNvPr id="127" name="Google Shape;127;p17"/>
+          <p:cNvPr id="127" name="Google Shape;127;p5"/>
           <p:cNvSpPr/>
           <p:nvPr/>
         </p:nvSpPr>
@@ -12672,7 +12969,7 @@
       </p:sp>
       <p:cxnSp>
         <p:nvCxnSpPr>
-          <p:cNvPr id="128" name="Google Shape;128;p17"/>
+          <p:cNvPr id="128" name="Google Shape;128;p5"/>
           <p:cNvCxnSpPr>
             <a:stCxn id="119" idx="2"/>
             <a:endCxn id="124" idx="0"/>
@@ -12696,14 +12993,14 @@
             </a:solidFill>
             <a:prstDash val="solid"/>
             <a:round/>
-            <a:headEnd len="med" w="med" type="none"/>
-            <a:tailEnd len="med" w="med" type="none"/>
+            <a:headEnd len="sm" w="sm" type="none"/>
+            <a:tailEnd len="sm" w="sm" type="none"/>
           </a:ln>
         </p:spPr>
       </p:cxnSp>
       <p:cxnSp>
         <p:nvCxnSpPr>
-          <p:cNvPr id="129" name="Google Shape;129;p17"/>
+          <p:cNvPr id="129" name="Google Shape;129;p5"/>
           <p:cNvCxnSpPr>
             <a:stCxn id="119" idx="2"/>
             <a:endCxn id="126" idx="1"/>
@@ -12725,14 +13022,14 @@
             </a:solidFill>
             <a:prstDash val="solid"/>
             <a:round/>
-            <a:headEnd len="med" w="med" type="none"/>
-            <a:tailEnd len="med" w="med" type="none"/>
+            <a:headEnd len="sm" w="sm" type="none"/>
+            <a:tailEnd len="sm" w="sm" type="none"/>
           </a:ln>
         </p:spPr>
       </p:cxnSp>
       <p:sp>
         <p:nvSpPr>
-          <p:cNvPr id="130" name="Google Shape;130;p17"/>
+          <p:cNvPr id="130" name="Google Shape;130;p5"/>
           <p:cNvSpPr/>
           <p:nvPr/>
         </p:nvSpPr>
@@ -12763,42 +13060,90 @@
           </a:bodyPr>
           <a:lstStyle/>
           <a:p>
-            <a:pPr indent="0" lvl="0" marL="0" rtl="0" algn="ctr">
-              <a:spcBef>
-                <a:spcPts val="0"/>
-              </a:spcBef>
-              <a:spcAft>
-                <a:spcPts val="0"/>
-              </a:spcAft>
+            <a:pPr indent="0" lvl="0" marL="0" marR="0" rtl="0" algn="ctr">
+              <a:lnSpc>
+                <a:spcPct val="100000"/>
+              </a:lnSpc>
+              <a:spcBef>
+                <a:spcPts val="0"/>
+              </a:spcBef>
+              <a:spcAft>
+                <a:spcPts val="0"/>
+              </a:spcAft>
+              <a:buClr>
+                <a:srgbClr val="000000"/>
+              </a:buClr>
+              <a:buSzPts val="1400"/>
+              <a:buFont typeface="Arial"/>
               <a:buNone/>
             </a:pPr>
             <a:r>
-              <a:rPr lang="pt-BR"/>
+              <a:rPr b="0" i="0" lang="pt-BR" sz="1400" u="none" cap="none" strike="noStrike">
+                <a:solidFill>
+                  <a:srgbClr val="000000"/>
+                </a:solidFill>
+                <a:latin typeface="Arial"/>
+                <a:ea typeface="Arial"/>
+                <a:cs typeface="Arial"/>
+                <a:sym typeface="Arial"/>
+              </a:rPr>
               <a:t>Setor de</a:t>
             </a:r>
-            <a:endParaRPr/>
+            <a:endParaRPr b="0" i="0" sz="1400" u="none" cap="none" strike="noStrike">
+              <a:solidFill>
+                <a:srgbClr val="000000"/>
+              </a:solidFill>
+              <a:latin typeface="Arial"/>
+              <a:ea typeface="Arial"/>
+              <a:cs typeface="Arial"/>
+              <a:sym typeface="Arial"/>
+            </a:endParaRPr>
           </a:p>
           <a:p>
-            <a:pPr indent="0" lvl="0" marL="0" rtl="0" algn="ctr">
-              <a:spcBef>
-                <a:spcPts val="0"/>
-              </a:spcBef>
-              <a:spcAft>
-                <a:spcPts val="0"/>
-              </a:spcAft>
+            <a:pPr indent="0" lvl="0" marL="0" marR="0" rtl="0" algn="ctr">
+              <a:lnSpc>
+                <a:spcPct val="100000"/>
+              </a:lnSpc>
+              <a:spcBef>
+                <a:spcPts val="0"/>
+              </a:spcBef>
+              <a:spcAft>
+                <a:spcPts val="0"/>
+              </a:spcAft>
+              <a:buClr>
+                <a:srgbClr val="000000"/>
+              </a:buClr>
+              <a:buSzPts val="1400"/>
+              <a:buFont typeface="Arial"/>
               <a:buNone/>
             </a:pPr>
             <a:r>
-              <a:rPr lang="pt-BR"/>
+              <a:rPr b="0" i="0" lang="pt-BR" sz="1400" u="none" cap="none" strike="noStrike">
+                <a:solidFill>
+                  <a:srgbClr val="000000"/>
+                </a:solidFill>
+                <a:latin typeface="Arial"/>
+                <a:ea typeface="Arial"/>
+                <a:cs typeface="Arial"/>
+                <a:sym typeface="Arial"/>
+              </a:rPr>
               <a:t>entrega</a:t>
             </a:r>
-            <a:endParaRPr/>
+            <a:endParaRPr b="0" i="0" sz="1400" u="none" cap="none" strike="noStrike">
+              <a:solidFill>
+                <a:srgbClr val="000000"/>
+              </a:solidFill>
+              <a:latin typeface="Arial"/>
+              <a:ea typeface="Arial"/>
+              <a:cs typeface="Arial"/>
+              <a:sym typeface="Arial"/>
+            </a:endParaRPr>
           </a:p>
         </p:txBody>
       </p:sp>
       <p:pic>
         <p:nvPicPr>
-          <p:cNvPr id="131" name="Google Shape;131;p17"/>
+          <p:cNvPr id="131" name="Google Shape;131;p5"/>
           <p:cNvPicPr preferRelativeResize="0"/>
           <p:nvPr/>
         </p:nvPicPr>
@@ -12806,7 +13151,7 @@
           <a:blip r:embed="rId4">
             <a:alphaModFix/>
           </a:blip>
-          <a:srcRect b="7629" l="0" r="0" t="0"/>
+          <a:srcRect b="7628" l="0" r="0" t="0"/>
           <a:stretch/>
         </p:blipFill>
         <p:spPr>
@@ -12825,7 +13170,7 @@
       </p:pic>
       <p:sp>
         <p:nvSpPr>
-          <p:cNvPr id="132" name="Google Shape;132;p17"/>
+          <p:cNvPr id="132" name="Google Shape;132;p5"/>
           <p:cNvSpPr txBox="1"/>
           <p:nvPr/>
         </p:nvSpPr>
@@ -12848,26 +13193,50 @@
           </a:bodyPr>
           <a:lstStyle/>
           <a:p>
-            <a:pPr indent="0" lvl="0" marL="0" rtl="0" algn="l">
-              <a:spcBef>
-                <a:spcPts val="0"/>
-              </a:spcBef>
-              <a:spcAft>
-                <a:spcPts val="0"/>
-              </a:spcAft>
+            <a:pPr indent="0" lvl="0" marL="0" marR="0" rtl="0" algn="l">
+              <a:lnSpc>
+                <a:spcPct val="100000"/>
+              </a:lnSpc>
+              <a:spcBef>
+                <a:spcPts val="0"/>
+              </a:spcBef>
+              <a:spcAft>
+                <a:spcPts val="0"/>
+              </a:spcAft>
+              <a:buClr>
+                <a:srgbClr val="000000"/>
+              </a:buClr>
+              <a:buSzPts val="1000"/>
+              <a:buFont typeface="Arial"/>
               <a:buNone/>
             </a:pPr>
             <a:r>
-              <a:rPr lang="pt-BR" sz="1000"/>
+              <a:rPr b="0" i="0" lang="pt-BR" sz="1000" u="none" cap="none" strike="noStrike">
+                <a:solidFill>
+                  <a:srgbClr val="000000"/>
+                </a:solidFill>
+                <a:latin typeface="Arial"/>
+                <a:ea typeface="Arial"/>
+                <a:cs typeface="Arial"/>
+                <a:sym typeface="Arial"/>
+              </a:rPr>
               <a:t>Entregador</a:t>
             </a:r>
-            <a:endParaRPr sz="1000"/>
+            <a:endParaRPr b="0" i="0" sz="1000" u="none" cap="none" strike="noStrike">
+              <a:solidFill>
+                <a:srgbClr val="000000"/>
+              </a:solidFill>
+              <a:latin typeface="Arial"/>
+              <a:ea typeface="Arial"/>
+              <a:cs typeface="Arial"/>
+              <a:sym typeface="Arial"/>
+            </a:endParaRPr>
           </a:p>
         </p:txBody>
       </p:sp>
       <p:cxnSp>
         <p:nvCxnSpPr>
-          <p:cNvPr id="133" name="Google Shape;133;p17"/>
+          <p:cNvPr id="133" name="Google Shape;133;p5"/>
           <p:cNvCxnSpPr>
             <a:stCxn id="119" idx="2"/>
           </p:cNvCxnSpPr>
@@ -12888,8 +13257,8 @@
             </a:solidFill>
             <a:prstDash val="solid"/>
             <a:round/>
-            <a:headEnd len="med" w="med" type="none"/>
-            <a:tailEnd len="med" w="med" type="none"/>
+            <a:headEnd len="sm" w="sm" type="none"/>
+            <a:tailEnd len="sm" w="sm" type="none"/>
           </a:ln>
         </p:spPr>
       </p:cxnSp>
@@ -12920,7 +13289,7 @@
       </p:grpSpPr>
       <p:sp>
         <p:nvSpPr>
-          <p:cNvPr id="138" name="Google Shape;138;p18"/>
+          <p:cNvPr id="138" name="Google Shape;138;p6"/>
           <p:cNvSpPr/>
           <p:nvPr/>
         </p:nvSpPr>
@@ -12985,7 +13354,7 @@
       </p:sp>
       <p:sp>
         <p:nvSpPr>
-          <p:cNvPr id="139" name="Google Shape;139;p18"/>
+          <p:cNvPr id="139" name="Google Shape;139;p6"/>
           <p:cNvSpPr/>
           <p:nvPr/>
         </p:nvSpPr>
@@ -13050,7 +13419,7 @@
       </p:sp>
       <p:sp>
         <p:nvSpPr>
-          <p:cNvPr id="140" name="Google Shape;140;p18"/>
+          <p:cNvPr id="140" name="Google Shape;140;p6"/>
           <p:cNvSpPr txBox="1"/>
           <p:nvPr/>
         </p:nvSpPr>
@@ -13116,7 +13485,7 @@
       </p:sp>
       <p:cxnSp>
         <p:nvCxnSpPr>
-          <p:cNvPr id="141" name="Google Shape;141;p18"/>
+          <p:cNvPr id="141" name="Google Shape;141;p6"/>
           <p:cNvCxnSpPr/>
           <p:nvPr/>
         </p:nvCxnSpPr>
@@ -13142,7 +13511,7 @@
       </p:cxnSp>
       <p:sp>
         <p:nvSpPr>
-          <p:cNvPr id="142" name="Google Shape;142;p18"/>
+          <p:cNvPr id="142" name="Google Shape;142;p6"/>
           <p:cNvSpPr txBox="1"/>
           <p:nvPr/>
         </p:nvSpPr>
@@ -13248,7 +13617,7 @@
       </p:sp>
       <p:sp>
         <p:nvSpPr>
-          <p:cNvPr id="143" name="Google Shape;143;p18"/>
+          <p:cNvPr id="143" name="Google Shape;143;p6"/>
           <p:cNvSpPr txBox="1"/>
           <p:nvPr/>
         </p:nvSpPr>
@@ -13289,16 +13658,32 @@
               <a:buNone/>
             </a:pPr>
             <a:r>
-              <a:rPr lang="pt-BR"/>
+              <a:rPr b="0" i="0" lang="pt-BR" sz="1400" u="none" cap="none" strike="noStrike">
+                <a:solidFill>
+                  <a:srgbClr val="000000"/>
+                </a:solidFill>
+                <a:latin typeface="Arial"/>
+                <a:ea typeface="Arial"/>
+                <a:cs typeface="Arial"/>
+                <a:sym typeface="Arial"/>
+              </a:rPr>
               <a:t>Devolver compra</a:t>
             </a:r>
-            <a:endParaRPr/>
+            <a:endParaRPr b="0" i="0" sz="1400" u="none" cap="none" strike="noStrike">
+              <a:solidFill>
+                <a:srgbClr val="000000"/>
+              </a:solidFill>
+              <a:latin typeface="Arial"/>
+              <a:ea typeface="Arial"/>
+              <a:cs typeface="Arial"/>
+              <a:sym typeface="Arial"/>
+            </a:endParaRPr>
           </a:p>
         </p:txBody>
       </p:sp>
       <p:pic>
         <p:nvPicPr>
-          <p:cNvPr id="144" name="Google Shape;144;p18"/>
+          <p:cNvPr id="144" name="Google Shape;144;p6"/>
           <p:cNvPicPr preferRelativeResize="0"/>
           <p:nvPr/>
         </p:nvPicPr>
@@ -13306,7 +13691,7 @@
           <a:blip r:embed="rId3">
             <a:alphaModFix/>
           </a:blip>
-          <a:srcRect b="12376" l="0" r="9624" t="12384"/>
+          <a:srcRect b="12375" l="0" r="9624" t="12384"/>
           <a:stretch/>
         </p:blipFill>
         <p:spPr>
@@ -13325,7 +13710,7 @@
       </p:pic>
       <p:sp>
         <p:nvSpPr>
-          <p:cNvPr id="145" name="Google Shape;145;p18"/>
+          <p:cNvPr id="145" name="Google Shape;145;p6"/>
           <p:cNvSpPr txBox="1"/>
           <p:nvPr/>
         </p:nvSpPr>
@@ -13366,14 +13751,26 @@
               <a:buChar char="●"/>
             </a:pPr>
             <a:r>
-              <a:rPr lang="pt-BR"/>
-              <a:t>Receber </a:t>
+              <a:rPr b="0" i="0" lang="pt-BR" sz="1400" u="none" cap="none" strike="noStrike">
+                <a:solidFill>
+                  <a:srgbClr val="000000"/>
+                </a:solidFill>
+                <a:latin typeface="Arial"/>
+                <a:ea typeface="Arial"/>
+                <a:cs typeface="Arial"/>
+                <a:sym typeface="Arial"/>
+              </a:rPr>
+              <a:t>Receber devolução</a:t>
             </a:r>
-            <a:r>
-              <a:rPr lang="pt-BR"/>
-              <a:t>devolução</a:t>
-            </a:r>
-            <a:endParaRPr/>
+            <a:endParaRPr b="0" i="0" sz="1400" u="none" cap="none" strike="noStrike">
+              <a:solidFill>
+                <a:srgbClr val="000000"/>
+              </a:solidFill>
+              <a:latin typeface="Arial"/>
+              <a:ea typeface="Arial"/>
+              <a:cs typeface="Arial"/>
+              <a:sym typeface="Arial"/>
+            </a:endParaRPr>
           </a:p>
           <a:p>
             <a:pPr indent="0" lvl="0" marL="457200" marR="0" rtl="0" algn="l">
@@ -13410,7 +13807,7 @@
       </p:sp>
       <p:sp>
         <p:nvSpPr>
-          <p:cNvPr id="146" name="Google Shape;146;p18"/>
+          <p:cNvPr id="146" name="Google Shape;146;p6"/>
           <p:cNvSpPr/>
           <p:nvPr/>
         </p:nvSpPr>
@@ -13475,7 +13872,7 @@
       </p:sp>
       <p:sp>
         <p:nvSpPr>
-          <p:cNvPr id="147" name="Google Shape;147;p18"/>
+          <p:cNvPr id="147" name="Google Shape;147;p6"/>
           <p:cNvSpPr/>
           <p:nvPr/>
         </p:nvSpPr>
@@ -13540,7 +13937,7 @@
       </p:sp>
       <p:cxnSp>
         <p:nvCxnSpPr>
-          <p:cNvPr id="148" name="Google Shape;148;p18"/>
+          <p:cNvPr id="148" name="Google Shape;148;p6"/>
           <p:cNvCxnSpPr>
             <a:stCxn id="139" idx="2"/>
             <a:endCxn id="144" idx="0"/>
@@ -13549,7 +13946,7 @@
         </p:nvCxnSpPr>
         <p:spPr>
           <a:xfrm rot="5400000">
-            <a:off x="3331588" y="421983"/>
+            <a:off x="3331588" y="421982"/>
             <a:ext cx="639300" cy="1373100"/>
           </a:xfrm>
           <a:prstGeom prst="curvedConnector3">
@@ -13564,14 +13961,14 @@
             </a:solidFill>
             <a:prstDash val="solid"/>
             <a:round/>
-            <a:headEnd len="med" w="med" type="none"/>
-            <a:tailEnd len="med" w="med" type="none"/>
+            <a:headEnd len="sm" w="sm" type="none"/>
+            <a:tailEnd len="sm" w="sm" type="none"/>
           </a:ln>
         </p:spPr>
       </p:cxnSp>
       <p:cxnSp>
         <p:nvCxnSpPr>
-          <p:cNvPr id="149" name="Google Shape;149;p18"/>
+          <p:cNvPr id="149" name="Google Shape;149;p6"/>
           <p:cNvCxnSpPr>
             <a:stCxn id="139" idx="2"/>
             <a:endCxn id="146" idx="1"/>
@@ -13580,7 +13977,7 @@
         </p:nvCxnSpPr>
         <p:spPr>
           <a:xfrm flipH="1" rot="-5400000">
-            <a:off x="3302938" y="1823733"/>
+            <a:off x="3302938" y="1823732"/>
             <a:ext cx="2714700" cy="645000"/>
           </a:xfrm>
           <a:prstGeom prst="curvedConnector2">
@@ -13593,14 +13990,14 @@
             </a:solidFill>
             <a:prstDash val="solid"/>
             <a:round/>
-            <a:headEnd len="med" w="med" type="none"/>
-            <a:tailEnd len="med" w="med" type="none"/>
+            <a:headEnd len="sm" w="sm" type="none"/>
+            <a:tailEnd len="sm" w="sm" type="none"/>
           </a:ln>
         </p:spPr>
       </p:cxnSp>
       <p:sp>
         <p:nvSpPr>
-          <p:cNvPr id="150" name="Google Shape;150;p18"/>
+          <p:cNvPr id="150" name="Google Shape;150;p6"/>
           <p:cNvSpPr/>
           <p:nvPr/>
         </p:nvSpPr>
@@ -13631,20 +14028,44 @@
           </a:bodyPr>
           <a:lstStyle/>
           <a:p>
-            <a:pPr indent="0" lvl="0" marL="0" rtl="0" algn="ctr">
-              <a:spcBef>
-                <a:spcPts val="0"/>
-              </a:spcBef>
-              <a:spcAft>
-                <a:spcPts val="0"/>
-              </a:spcAft>
+            <a:pPr indent="0" lvl="0" marL="0" marR="0" rtl="0" algn="ctr">
+              <a:lnSpc>
+                <a:spcPct val="100000"/>
+              </a:lnSpc>
+              <a:spcBef>
+                <a:spcPts val="0"/>
+              </a:spcBef>
+              <a:spcAft>
+                <a:spcPts val="0"/>
+              </a:spcAft>
+              <a:buClr>
+                <a:srgbClr val="000000"/>
+              </a:buClr>
+              <a:buSzPts val="1400"/>
+              <a:buFont typeface="Arial"/>
               <a:buNone/>
             </a:pPr>
             <a:r>
-              <a:rPr lang="pt-BR"/>
+              <a:rPr b="0" i="0" lang="pt-BR" sz="1400" u="none" cap="none" strike="noStrike">
+                <a:solidFill>
+                  <a:srgbClr val="000000"/>
+                </a:solidFill>
+                <a:latin typeface="Arial"/>
+                <a:ea typeface="Arial"/>
+                <a:cs typeface="Arial"/>
+                <a:sym typeface="Arial"/>
+              </a:rPr>
               <a:t>Loja</a:t>
             </a:r>
-            <a:endParaRPr/>
+            <a:endParaRPr b="0" i="0" sz="1400" u="none" cap="none" strike="noStrike">
+              <a:solidFill>
+                <a:srgbClr val="000000"/>
+              </a:solidFill>
+              <a:latin typeface="Arial"/>
+              <a:ea typeface="Arial"/>
+              <a:cs typeface="Arial"/>
+              <a:sym typeface="Arial"/>
+            </a:endParaRPr>
           </a:p>
         </p:txBody>
       </p:sp>

</xml_diff>

<commit_message>
Alterando os artefatos do 1 ao 24
</commit_message>
<xml_diff>
--- a/15. Arquitetura de negócio.pptx
+++ b/15. Arquitetura de negócio.pptx
@@ -2,7 +2,7 @@
 <file path=ppt/presentation.xml><?xml version="1.0" encoding="utf-8"?>
 <p:presentation xmlns:a="http://schemas.openxmlformats.org/drawingml/2006/main" xmlns:r="http://schemas.openxmlformats.org/officeDocument/2006/relationships" xmlns:mc="http://schemas.openxmlformats.org/markup-compatibility/2006" xmlns:mv="urn:schemas-microsoft-com:mac:vml" xmlns:p="http://schemas.openxmlformats.org/presentationml/2006/main" xmlns:c="http://schemas.openxmlformats.org/drawingml/2006/chart" xmlns:dgm="http://schemas.openxmlformats.org/drawingml/2006/diagram" xmlns:o="urn:schemas-microsoft-com:office:office" xmlns:v="urn:schemas-microsoft-com:vml" xmlns:pvml="urn:schemas-microsoft-com:office:powerpoint" xmlns:com="http://schemas.openxmlformats.org/drawingml/2006/compatibility" xmlns:p14="http://schemas.microsoft.com/office/powerpoint/2010/main" xmlns:p15="http://schemas.microsoft.com/office/powerpoint/2012/main" autoCompressPictures="0" strictFirstAndLastChars="0" saveSubsetFonts="1">
   <p:sldMasterIdLst>
-    <p:sldMasterId id="2147483648" r:id="rId4"/>
+    <p:sldMasterId id="2147483659" r:id="rId4"/>
   </p:sldMasterIdLst>
   <p:notesMasterIdLst>
     <p:notesMasterId r:id="rId5"/>
@@ -260,9 +260,6 @@
           </p15:clr>
         </p15:guide>
       </p15:sldGuideLst>
-    </p:ext>
-    <p:ext uri="http://customooxmlschemas.google.com/">
-      <go:slidesCustomData xmlns:go="http://customooxmlschemas.google.com/" r:id="rId12" roundtripDataSignature="AMtx7mj8Ey1t0ejgbyff1rRKrcLvIJaSBg=="/>
     </p:ext>
   </p:extLst>
 </p:presentation>
@@ -1185,7 +1182,7 @@
   <p:cSld>
     <p:spTree>
       <p:nvGrpSpPr>
-        <p:cNvPr id="97" name="Shape 97"/>
+        <p:cNvPr id="101" name="Shape 101"/>
         <p:cNvGrpSpPr/>
         <p:nvPr/>
       </p:nvGrpSpPr>
@@ -1199,7 +1196,7 @@
       </p:grpSpPr>
       <p:sp>
         <p:nvSpPr>
-          <p:cNvPr id="98" name="Google Shape;98;p4:notes"/>
+          <p:cNvPr id="102" name="Google Shape;102;p4:notes"/>
           <p:cNvSpPr/>
           <p:nvPr>
             <p:ph idx="2" type="sldImg"/>
@@ -1244,7 +1241,7 @@
       </p:sp>
       <p:sp>
         <p:nvSpPr>
-          <p:cNvPr id="99" name="Google Shape;99;p4:notes"/>
+          <p:cNvPr id="103" name="Google Shape;103;p4:notes"/>
           <p:cNvSpPr txBox="1"/>
           <p:nvPr>
             <p:ph idx="1" type="body"/>
@@ -1302,7 +1299,7 @@
   <p:cSld>
     <p:spTree>
       <p:nvGrpSpPr>
-        <p:cNvPr id="114" name="Shape 114"/>
+        <p:cNvPr id="122" name="Shape 122"/>
         <p:cNvGrpSpPr/>
         <p:nvPr/>
       </p:nvGrpSpPr>
@@ -1316,7 +1313,7 @@
       </p:grpSpPr>
       <p:sp>
         <p:nvSpPr>
-          <p:cNvPr id="115" name="Google Shape;115;p5:notes"/>
+          <p:cNvPr id="123" name="Google Shape;123;p5:notes"/>
           <p:cNvSpPr/>
           <p:nvPr>
             <p:ph idx="2" type="sldImg"/>
@@ -1361,7 +1358,7 @@
       </p:sp>
       <p:sp>
         <p:nvSpPr>
-          <p:cNvPr id="116" name="Google Shape;116;p5:notes"/>
+          <p:cNvPr id="124" name="Google Shape;124;p5:notes"/>
           <p:cNvSpPr txBox="1"/>
           <p:nvPr>
             <p:ph idx="1" type="body"/>
@@ -1419,7 +1416,7 @@
   <p:cSld>
     <p:spTree>
       <p:nvGrpSpPr>
-        <p:cNvPr id="134" name="Shape 134"/>
+        <p:cNvPr id="139" name="Shape 139"/>
         <p:cNvGrpSpPr/>
         <p:nvPr/>
       </p:nvGrpSpPr>
@@ -1433,7 +1430,7 @@
       </p:grpSpPr>
       <p:sp>
         <p:nvSpPr>
-          <p:cNvPr id="135" name="Google Shape;135;p6:notes"/>
+          <p:cNvPr id="140" name="Google Shape;140;p6:notes"/>
           <p:cNvSpPr/>
           <p:nvPr>
             <p:ph idx="2" type="sldImg"/>
@@ -1478,7 +1475,7 @@
       </p:sp>
       <p:sp>
         <p:nvSpPr>
-          <p:cNvPr id="136" name="Google Shape;136;p6:notes"/>
+          <p:cNvPr id="141" name="Google Shape;141;p6:notes"/>
           <p:cNvSpPr txBox="1"/>
           <p:nvPr>
             <p:ph idx="1" type="body"/>
@@ -1550,7 +1547,7 @@
       </p:grpSpPr>
       <p:sp>
         <p:nvSpPr>
-          <p:cNvPr id="10" name="Google Shape;10;p8"/>
+          <p:cNvPr id="10" name="Google Shape;10;p2"/>
           <p:cNvSpPr txBox="1"/>
           <p:nvPr>
             <p:ph type="ctrTitle"/>
@@ -1706,7 +1703,7 @@
       </p:sp>
       <p:sp>
         <p:nvSpPr>
-          <p:cNvPr id="11" name="Google Shape;11;p8"/>
+          <p:cNvPr id="11" name="Google Shape;11;p2"/>
           <p:cNvSpPr txBox="1"/>
           <p:nvPr>
             <p:ph idx="1" type="subTitle"/>
@@ -1862,7 +1859,7 @@
       </p:sp>
       <p:sp>
         <p:nvSpPr>
-          <p:cNvPr id="12" name="Google Shape;12;p8"/>
+          <p:cNvPr id="12" name="Google Shape;12;p2"/>
           <p:cNvSpPr txBox="1"/>
           <p:nvPr>
             <p:ph idx="12" type="sldNum"/>
@@ -2166,7 +2163,7 @@
       </p:grpSpPr>
       <p:sp>
         <p:nvSpPr>
-          <p:cNvPr id="45" name="Google Shape;45;p17"/>
+          <p:cNvPr id="45" name="Google Shape;45;p11"/>
           <p:cNvSpPr txBox="1"/>
           <p:nvPr>
             <p:ph hasCustomPrompt="1" type="title"/>
@@ -2326,7 +2323,7 @@
       </p:sp>
       <p:sp>
         <p:nvSpPr>
-          <p:cNvPr id="46" name="Google Shape;46;p17"/>
+          <p:cNvPr id="46" name="Google Shape;46;p11"/>
           <p:cNvSpPr txBox="1"/>
           <p:nvPr>
             <p:ph idx="1" type="body"/>
@@ -2482,7 +2479,7 @@
       </p:sp>
       <p:sp>
         <p:nvSpPr>
-          <p:cNvPr id="47" name="Google Shape;47;p17"/>
+          <p:cNvPr id="47" name="Google Shape;47;p11"/>
           <p:cNvSpPr txBox="1"/>
           <p:nvPr>
             <p:ph idx="12" type="sldNum"/>
@@ -2786,7 +2783,7 @@
       </p:grpSpPr>
       <p:sp>
         <p:nvSpPr>
-          <p:cNvPr id="49" name="Google Shape;49;p18"/>
+          <p:cNvPr id="49" name="Google Shape;49;p12"/>
           <p:cNvSpPr txBox="1"/>
           <p:nvPr>
             <p:ph idx="12" type="sldNum"/>
@@ -3090,7 +3087,7 @@
       </p:grpSpPr>
       <p:sp>
         <p:nvSpPr>
-          <p:cNvPr id="14" name="Google Shape;14;p9"/>
+          <p:cNvPr id="14" name="Google Shape;14;p3"/>
           <p:cNvSpPr txBox="1"/>
           <p:nvPr>
             <p:ph type="title"/>
@@ -3246,7 +3243,7 @@
       </p:sp>
       <p:sp>
         <p:nvSpPr>
-          <p:cNvPr id="15" name="Google Shape;15;p9"/>
+          <p:cNvPr id="15" name="Google Shape;15;p3"/>
           <p:cNvSpPr txBox="1"/>
           <p:nvPr>
             <p:ph idx="1" type="body"/>
@@ -3402,7 +3399,7 @@
       </p:sp>
       <p:sp>
         <p:nvSpPr>
-          <p:cNvPr id="16" name="Google Shape;16;p9"/>
+          <p:cNvPr id="16" name="Google Shape;16;p3"/>
           <p:cNvSpPr txBox="1"/>
           <p:nvPr>
             <p:ph idx="12" type="sldNum"/>
@@ -3706,7 +3703,7 @@
       </p:grpSpPr>
       <p:sp>
         <p:nvSpPr>
-          <p:cNvPr id="18" name="Google Shape;18;p10"/>
+          <p:cNvPr id="18" name="Google Shape;18;p4"/>
           <p:cNvSpPr txBox="1"/>
           <p:nvPr>
             <p:ph type="title"/>
@@ -3862,7 +3859,7 @@
       </p:sp>
       <p:sp>
         <p:nvSpPr>
-          <p:cNvPr id="19" name="Google Shape;19;p10"/>
+          <p:cNvPr id="19" name="Google Shape;19;p4"/>
           <p:cNvSpPr txBox="1"/>
           <p:nvPr>
             <p:ph idx="12" type="sldNum"/>
@@ -4166,7 +4163,7 @@
       </p:grpSpPr>
       <p:sp>
         <p:nvSpPr>
-          <p:cNvPr id="21" name="Google Shape;21;p11"/>
+          <p:cNvPr id="21" name="Google Shape;21;p5"/>
           <p:cNvSpPr txBox="1"/>
           <p:nvPr>
             <p:ph type="title"/>
@@ -4322,7 +4319,7 @@
       </p:sp>
       <p:sp>
         <p:nvSpPr>
-          <p:cNvPr id="22" name="Google Shape;22;p11"/>
+          <p:cNvPr id="22" name="Google Shape;22;p5"/>
           <p:cNvSpPr txBox="1"/>
           <p:nvPr>
             <p:ph idx="1" type="body"/>
@@ -4478,7 +4475,7 @@
       </p:sp>
       <p:sp>
         <p:nvSpPr>
-          <p:cNvPr id="23" name="Google Shape;23;p11"/>
+          <p:cNvPr id="23" name="Google Shape;23;p5"/>
           <p:cNvSpPr txBox="1"/>
           <p:nvPr>
             <p:ph idx="2" type="body"/>
@@ -4634,7 +4631,7 @@
       </p:sp>
       <p:sp>
         <p:nvSpPr>
-          <p:cNvPr id="24" name="Google Shape;24;p11"/>
+          <p:cNvPr id="24" name="Google Shape;24;p5"/>
           <p:cNvSpPr txBox="1"/>
           <p:nvPr>
             <p:ph idx="12" type="sldNum"/>
@@ -4938,7 +4935,7 @@
       </p:grpSpPr>
       <p:sp>
         <p:nvSpPr>
-          <p:cNvPr id="26" name="Google Shape;26;p12"/>
+          <p:cNvPr id="26" name="Google Shape;26;p6"/>
           <p:cNvSpPr txBox="1"/>
           <p:nvPr>
             <p:ph type="title"/>
@@ -5094,7 +5091,7 @@
       </p:sp>
       <p:sp>
         <p:nvSpPr>
-          <p:cNvPr id="27" name="Google Shape;27;p12"/>
+          <p:cNvPr id="27" name="Google Shape;27;p6"/>
           <p:cNvSpPr txBox="1"/>
           <p:nvPr>
             <p:ph idx="12" type="sldNum"/>
@@ -5398,7 +5395,7 @@
       </p:grpSpPr>
       <p:sp>
         <p:nvSpPr>
-          <p:cNvPr id="29" name="Google Shape;29;p13"/>
+          <p:cNvPr id="29" name="Google Shape;29;p7"/>
           <p:cNvSpPr txBox="1"/>
           <p:nvPr>
             <p:ph type="title"/>
@@ -5554,7 +5551,7 @@
       </p:sp>
       <p:sp>
         <p:nvSpPr>
-          <p:cNvPr id="30" name="Google Shape;30;p13"/>
+          <p:cNvPr id="30" name="Google Shape;30;p7"/>
           <p:cNvSpPr txBox="1"/>
           <p:nvPr>
             <p:ph idx="1" type="body"/>
@@ -5710,7 +5707,7 @@
       </p:sp>
       <p:sp>
         <p:nvSpPr>
-          <p:cNvPr id="31" name="Google Shape;31;p13"/>
+          <p:cNvPr id="31" name="Google Shape;31;p7"/>
           <p:cNvSpPr txBox="1"/>
           <p:nvPr>
             <p:ph idx="12" type="sldNum"/>
@@ -6014,7 +6011,7 @@
       </p:grpSpPr>
       <p:sp>
         <p:nvSpPr>
-          <p:cNvPr id="33" name="Google Shape;33;p14"/>
+          <p:cNvPr id="33" name="Google Shape;33;p8"/>
           <p:cNvSpPr txBox="1"/>
           <p:nvPr>
             <p:ph type="title"/>
@@ -6170,7 +6167,7 @@
       </p:sp>
       <p:sp>
         <p:nvSpPr>
-          <p:cNvPr id="34" name="Google Shape;34;p14"/>
+          <p:cNvPr id="34" name="Google Shape;34;p8"/>
           <p:cNvSpPr txBox="1"/>
           <p:nvPr>
             <p:ph idx="12" type="sldNum"/>
@@ -6474,7 +6471,7 @@
       </p:grpSpPr>
       <p:sp>
         <p:nvSpPr>
-          <p:cNvPr id="36" name="Google Shape;36;p15"/>
+          <p:cNvPr id="36" name="Google Shape;36;p9"/>
           <p:cNvSpPr/>
           <p:nvPr/>
         </p:nvSpPr>
@@ -6533,7 +6530,7 @@
       </p:sp>
       <p:sp>
         <p:nvSpPr>
-          <p:cNvPr id="37" name="Google Shape;37;p15"/>
+          <p:cNvPr id="37" name="Google Shape;37;p9"/>
           <p:cNvSpPr txBox="1"/>
           <p:nvPr>
             <p:ph type="title"/>
@@ -6689,7 +6686,7 @@
       </p:sp>
       <p:sp>
         <p:nvSpPr>
-          <p:cNvPr id="38" name="Google Shape;38;p15"/>
+          <p:cNvPr id="38" name="Google Shape;38;p9"/>
           <p:cNvSpPr txBox="1"/>
           <p:nvPr>
             <p:ph idx="1" type="subTitle"/>
@@ -6845,7 +6842,7 @@
       </p:sp>
       <p:sp>
         <p:nvSpPr>
-          <p:cNvPr id="39" name="Google Shape;39;p15"/>
+          <p:cNvPr id="39" name="Google Shape;39;p9"/>
           <p:cNvSpPr txBox="1"/>
           <p:nvPr>
             <p:ph idx="2" type="body"/>
@@ -7001,7 +6998,7 @@
       </p:sp>
       <p:sp>
         <p:nvSpPr>
-          <p:cNvPr id="40" name="Google Shape;40;p15"/>
+          <p:cNvPr id="40" name="Google Shape;40;p9"/>
           <p:cNvSpPr txBox="1"/>
           <p:nvPr>
             <p:ph idx="12" type="sldNum"/>
@@ -7305,7 +7302,7 @@
       </p:grpSpPr>
       <p:sp>
         <p:nvSpPr>
-          <p:cNvPr id="42" name="Google Shape;42;p16"/>
+          <p:cNvPr id="42" name="Google Shape;42;p10"/>
           <p:cNvSpPr txBox="1"/>
           <p:nvPr>
             <p:ph idx="1" type="body"/>
@@ -7349,7 +7346,7 @@
       </p:sp>
       <p:sp>
         <p:nvSpPr>
-          <p:cNvPr id="43" name="Google Shape;43;p16"/>
+          <p:cNvPr id="43" name="Google Shape;43;p10"/>
           <p:cNvSpPr txBox="1"/>
           <p:nvPr>
             <p:ph idx="12" type="sldNum"/>
@@ -7660,7 +7657,7 @@
       </p:grpSpPr>
       <p:sp>
         <p:nvSpPr>
-          <p:cNvPr id="6" name="Google Shape;6;p7"/>
+          <p:cNvPr id="6" name="Google Shape;6;p1"/>
           <p:cNvSpPr txBox="1"/>
           <p:nvPr>
             <p:ph type="title"/>
@@ -7924,7 +7921,7 @@
       </p:sp>
       <p:sp>
         <p:nvSpPr>
-          <p:cNvPr id="7" name="Google Shape;7;p7"/>
+          <p:cNvPr id="7" name="Google Shape;7;p1"/>
           <p:cNvSpPr txBox="1"/>
           <p:nvPr>
             <p:ph idx="1" type="body"/>
@@ -8188,7 +8185,7 @@
       </p:sp>
       <p:sp>
         <p:nvSpPr>
-          <p:cNvPr id="8" name="Google Shape;8;p7"/>
+          <p:cNvPr id="8" name="Google Shape;8;p1"/>
           <p:cNvSpPr txBox="1"/>
           <p:nvPr>
             <p:ph idx="12" type="sldNum"/>
@@ -8469,17 +8466,17 @@
   </p:cSld>
   <p:clrMap accent1="accent1" accent2="accent2" accent3="accent3" accent4="accent4" accent5="accent5" accent6="accent6" bg1="lt1" bg2="dk2" tx1="dk1" tx2="lt2" folHlink="folHlink" hlink="hlink"/>
   <p:sldLayoutIdLst>
-    <p:sldLayoutId id="2147483649" r:id="rId1"/>
-    <p:sldLayoutId id="2147483650" r:id="rId2"/>
-    <p:sldLayoutId id="2147483651" r:id="rId3"/>
-    <p:sldLayoutId id="2147483652" r:id="rId4"/>
-    <p:sldLayoutId id="2147483653" r:id="rId5"/>
-    <p:sldLayoutId id="2147483654" r:id="rId6"/>
-    <p:sldLayoutId id="2147483655" r:id="rId7"/>
-    <p:sldLayoutId id="2147483656" r:id="rId8"/>
-    <p:sldLayoutId id="2147483657" r:id="rId9"/>
-    <p:sldLayoutId id="2147483658" r:id="rId10"/>
-    <p:sldLayoutId id="2147483659" r:id="rId11"/>
+    <p:sldLayoutId id="2147483648" r:id="rId1"/>
+    <p:sldLayoutId id="2147483649" r:id="rId2"/>
+    <p:sldLayoutId id="2147483650" r:id="rId3"/>
+    <p:sldLayoutId id="2147483651" r:id="rId4"/>
+    <p:sldLayoutId id="2147483652" r:id="rId5"/>
+    <p:sldLayoutId id="2147483653" r:id="rId6"/>
+    <p:sldLayoutId id="2147483654" r:id="rId7"/>
+    <p:sldLayoutId id="2147483655" r:id="rId8"/>
+    <p:sldLayoutId id="2147483656" r:id="rId9"/>
+    <p:sldLayoutId id="2147483657" r:id="rId10"/>
+    <p:sldLayoutId id="2147483658" r:id="rId11"/>
   </p:sldLayoutIdLst>
   <p:hf dt="0" ftr="0" hdr="0" sldNum="0"/>
   <p:txStyles>
@@ -9193,7 +9190,7 @@
       </p:grpSpPr>
       <p:sp>
         <p:nvSpPr>
-          <p:cNvPr id="54" name="Google Shape;54;p1"/>
+          <p:cNvPr id="54" name="Google Shape;54;p13"/>
           <p:cNvSpPr/>
           <p:nvPr/>
         </p:nvSpPr>
@@ -9258,7 +9255,7 @@
       </p:sp>
       <p:sp>
         <p:nvSpPr>
-          <p:cNvPr id="55" name="Google Shape;55;p1"/>
+          <p:cNvPr id="55" name="Google Shape;55;p13"/>
           <p:cNvSpPr txBox="1"/>
           <p:nvPr/>
         </p:nvSpPr>
@@ -9355,7 +9352,7 @@
       </p:sp>
       <p:pic>
         <p:nvPicPr>
-          <p:cNvPr id="56" name="Google Shape;56;p1"/>
+          <p:cNvPr id="56" name="Google Shape;56;p13"/>
           <p:cNvPicPr preferRelativeResize="0"/>
           <p:nvPr/>
         </p:nvPicPr>
@@ -9382,7 +9379,7 @@
       </p:pic>
       <p:sp>
         <p:nvSpPr>
-          <p:cNvPr id="57" name="Google Shape;57;p1"/>
+          <p:cNvPr id="57" name="Google Shape;57;p13"/>
           <p:cNvSpPr txBox="1"/>
           <p:nvPr/>
         </p:nvSpPr>
@@ -9448,7 +9445,7 @@
       </p:sp>
       <p:sp>
         <p:nvSpPr>
-          <p:cNvPr id="58" name="Google Shape;58;p1"/>
+          <p:cNvPr id="58" name="Google Shape;58;p13"/>
           <p:cNvSpPr txBox="1"/>
           <p:nvPr/>
         </p:nvSpPr>
@@ -9514,7 +9511,7 @@
       </p:sp>
       <p:sp>
         <p:nvSpPr>
-          <p:cNvPr id="59" name="Google Shape;59;p1"/>
+          <p:cNvPr id="59" name="Google Shape;59;p13"/>
           <p:cNvSpPr txBox="1"/>
           <p:nvPr/>
         </p:nvSpPr>
@@ -9802,7 +9799,7 @@
       </p:sp>
       <p:sp>
         <p:nvSpPr>
-          <p:cNvPr id="60" name="Google Shape;60;p1"/>
+          <p:cNvPr id="60" name="Google Shape;60;p13"/>
           <p:cNvSpPr txBox="1"/>
           <p:nvPr/>
         </p:nvSpPr>
@@ -9859,7 +9856,7 @@
       </p:sp>
       <p:cxnSp>
         <p:nvCxnSpPr>
-          <p:cNvPr id="61" name="Google Shape;61;p1"/>
+          <p:cNvPr id="61" name="Google Shape;61;p13"/>
           <p:cNvCxnSpPr>
             <a:stCxn id="56" idx="3"/>
           </p:cNvCxnSpPr>
@@ -9887,7 +9884,7 @@
       </p:cxnSp>
       <p:sp>
         <p:nvSpPr>
-          <p:cNvPr id="62" name="Google Shape;62;p1"/>
+          <p:cNvPr id="62" name="Google Shape;62;p13"/>
           <p:cNvSpPr/>
           <p:nvPr/>
         </p:nvSpPr>
@@ -9986,7 +9983,7 @@
       </p:grpSpPr>
       <p:sp>
         <p:nvSpPr>
-          <p:cNvPr id="67" name="Google Shape;67;p2"/>
+          <p:cNvPr id="67" name="Google Shape;67;p14"/>
           <p:cNvSpPr/>
           <p:nvPr/>
         </p:nvSpPr>
@@ -10051,7 +10048,7 @@
       </p:sp>
       <p:sp>
         <p:nvSpPr>
-          <p:cNvPr id="68" name="Google Shape;68;p2"/>
+          <p:cNvPr id="68" name="Google Shape;68;p14"/>
           <p:cNvSpPr/>
           <p:nvPr/>
         </p:nvSpPr>
@@ -10116,7 +10113,7 @@
       </p:sp>
       <p:cxnSp>
         <p:nvCxnSpPr>
-          <p:cNvPr id="69" name="Google Shape;69;p2"/>
+          <p:cNvPr id="69" name="Google Shape;69;p14"/>
           <p:cNvCxnSpPr/>
           <p:nvPr/>
         </p:nvCxnSpPr>
@@ -10142,7 +10139,7 @@
       </p:cxnSp>
       <p:sp>
         <p:nvSpPr>
-          <p:cNvPr id="70" name="Google Shape;70;p2"/>
+          <p:cNvPr id="70" name="Google Shape;70;p14"/>
           <p:cNvSpPr txBox="1"/>
           <p:nvPr/>
         </p:nvSpPr>
@@ -10208,7 +10205,7 @@
       </p:sp>
       <p:sp>
         <p:nvSpPr>
-          <p:cNvPr id="71" name="Google Shape;71;p2"/>
+          <p:cNvPr id="71" name="Google Shape;71;p14"/>
           <p:cNvSpPr txBox="1"/>
           <p:nvPr/>
         </p:nvSpPr>
@@ -10274,7 +10271,7 @@
       </p:sp>
       <p:pic>
         <p:nvPicPr>
-          <p:cNvPr id="72" name="Google Shape;72;p2"/>
+          <p:cNvPr id="72" name="Google Shape;72;p14"/>
           <p:cNvPicPr preferRelativeResize="0"/>
           <p:nvPr/>
         </p:nvPicPr>
@@ -10301,7 +10298,7 @@
       </p:pic>
       <p:sp>
         <p:nvSpPr>
-          <p:cNvPr id="73" name="Google Shape;73;p2"/>
+          <p:cNvPr id="73" name="Google Shape;73;p14"/>
           <p:cNvSpPr/>
           <p:nvPr/>
         </p:nvSpPr>
@@ -10366,7 +10363,7 @@
       </p:sp>
       <p:sp>
         <p:nvSpPr>
-          <p:cNvPr id="74" name="Google Shape;74;p2"/>
+          <p:cNvPr id="74" name="Google Shape;74;p14"/>
           <p:cNvSpPr/>
           <p:nvPr/>
         </p:nvSpPr>
@@ -10431,7 +10428,7 @@
       </p:sp>
       <p:sp>
         <p:nvSpPr>
-          <p:cNvPr id="75" name="Google Shape;75;p2"/>
+          <p:cNvPr id="75" name="Google Shape;75;p14"/>
           <p:cNvSpPr txBox="1"/>
           <p:nvPr/>
         </p:nvSpPr>
@@ -10528,7 +10525,7 @@
       </p:sp>
       <p:cxnSp>
         <p:nvCxnSpPr>
-          <p:cNvPr id="76" name="Google Shape;76;p2"/>
+          <p:cNvPr id="76" name="Google Shape;76;p14"/>
           <p:cNvCxnSpPr>
             <a:stCxn id="67" idx="2"/>
             <a:endCxn id="72" idx="0"/>
@@ -10559,7 +10556,7 @@
       </p:cxnSp>
       <p:cxnSp>
         <p:nvCxnSpPr>
-          <p:cNvPr id="77" name="Google Shape;77;p2"/>
+          <p:cNvPr id="77" name="Google Shape;77;p14"/>
           <p:cNvCxnSpPr>
             <a:stCxn id="67" idx="2"/>
             <a:endCxn id="73" idx="1"/>
@@ -10588,7 +10585,7 @@
       </p:cxnSp>
       <p:sp>
         <p:nvSpPr>
-          <p:cNvPr id="78" name="Google Shape;78;p2"/>
+          <p:cNvPr id="78" name="Google Shape;78;p14"/>
           <p:cNvSpPr txBox="1"/>
           <p:nvPr/>
         </p:nvSpPr>
@@ -10654,7 +10651,7 @@
       </p:sp>
       <p:sp>
         <p:nvSpPr>
-          <p:cNvPr id="79" name="Google Shape;79;p2"/>
+          <p:cNvPr id="79" name="Google Shape;79;p14"/>
           <p:cNvSpPr/>
           <p:nvPr/>
         </p:nvSpPr>
@@ -10753,7 +10750,7 @@
       </p:grpSpPr>
       <p:sp>
         <p:nvSpPr>
-          <p:cNvPr id="84" name="Google Shape;84;p3"/>
+          <p:cNvPr id="84" name="Google Shape;84;p15"/>
           <p:cNvSpPr/>
           <p:nvPr/>
         </p:nvSpPr>
@@ -10818,7 +10815,7 @@
       </p:sp>
       <p:sp>
         <p:nvSpPr>
-          <p:cNvPr id="85" name="Google Shape;85;p3"/>
+          <p:cNvPr id="85" name="Google Shape;85;p15"/>
           <p:cNvSpPr txBox="1"/>
           <p:nvPr/>
         </p:nvSpPr>
@@ -10884,7 +10881,890 @@
       </p:sp>
       <p:sp>
         <p:nvSpPr>
-          <p:cNvPr id="86" name="Google Shape;86;p3"/>
+          <p:cNvPr id="86" name="Google Shape;86;p15"/>
+          <p:cNvSpPr/>
+          <p:nvPr/>
+        </p:nvSpPr>
+        <p:spPr>
+          <a:xfrm>
+            <a:off x="241100" y="1324375"/>
+            <a:ext cx="8733300" cy="3625800"/>
+          </a:xfrm>
+          <a:prstGeom prst="rect">
+            <a:avLst/>
+          </a:prstGeom>
+          <a:solidFill>
+            <a:srgbClr val="FFFFFF"/>
+          </a:solidFill>
+          <a:ln cap="flat" cmpd="sng" w="19050">
+            <a:solidFill>
+              <a:srgbClr val="000000"/>
+            </a:solidFill>
+            <a:prstDash val="solid"/>
+            <a:round/>
+            <a:headEnd len="sm" w="sm" type="none"/>
+            <a:tailEnd len="sm" w="sm" type="none"/>
+          </a:ln>
+        </p:spPr>
+        <p:txBody>
+          <a:bodyPr anchorCtr="0" anchor="ctr" bIns="91425" lIns="91425" spcFirstLastPara="1" rIns="91425" wrap="square" tIns="91425">
+            <a:noAutofit/>
+          </a:bodyPr>
+          <a:lstStyle/>
+          <a:p>
+            <a:pPr indent="0" lvl="0" marL="0" marR="0" rtl="0" algn="l">
+              <a:lnSpc>
+                <a:spcPct val="100000"/>
+              </a:lnSpc>
+              <a:spcBef>
+                <a:spcPts val="0"/>
+              </a:spcBef>
+              <a:spcAft>
+                <a:spcPts val="0"/>
+              </a:spcAft>
+              <a:buClr>
+                <a:srgbClr val="000000"/>
+              </a:buClr>
+              <a:buSzPts val="1400"/>
+              <a:buFont typeface="Arial"/>
+              <a:buNone/>
+            </a:pPr>
+            <a:r>
+              <a:t/>
+            </a:r>
+            <a:endParaRPr b="0" i="0" sz="1400" u="none" cap="none" strike="noStrike">
+              <a:solidFill>
+                <a:srgbClr val="000000"/>
+              </a:solidFill>
+              <a:latin typeface="Arial"/>
+              <a:ea typeface="Arial"/>
+              <a:cs typeface="Arial"/>
+              <a:sym typeface="Arial"/>
+            </a:endParaRPr>
+          </a:p>
+        </p:txBody>
+      </p:sp>
+      <p:cxnSp>
+        <p:nvCxnSpPr>
+          <p:cNvPr id="87" name="Google Shape;87;p15"/>
+          <p:cNvCxnSpPr/>
+          <p:nvPr/>
+        </p:nvCxnSpPr>
+        <p:spPr>
+          <a:xfrm>
+            <a:off x="254500" y="2745075"/>
+            <a:ext cx="8733300" cy="0"/>
+          </a:xfrm>
+          <a:prstGeom prst="straightConnector1">
+            <a:avLst/>
+          </a:prstGeom>
+          <a:noFill/>
+          <a:ln cap="flat" cmpd="sng" w="19050">
+            <a:solidFill>
+              <a:srgbClr val="000000"/>
+            </a:solidFill>
+            <a:prstDash val="solid"/>
+            <a:round/>
+            <a:headEnd len="sm" w="sm" type="none"/>
+            <a:tailEnd len="sm" w="sm" type="none"/>
+          </a:ln>
+        </p:spPr>
+      </p:cxnSp>
+      <p:sp>
+        <p:nvSpPr>
+          <p:cNvPr id="88" name="Google Shape;88;p15"/>
+          <p:cNvSpPr txBox="1"/>
+          <p:nvPr/>
+        </p:nvSpPr>
+        <p:spPr>
+          <a:xfrm>
+            <a:off x="231875" y="1324375"/>
+            <a:ext cx="1852500" cy="334800"/>
+          </a:xfrm>
+          <a:prstGeom prst="rect">
+            <a:avLst/>
+          </a:prstGeom>
+          <a:noFill/>
+          <a:ln>
+            <a:noFill/>
+          </a:ln>
+        </p:spPr>
+        <p:txBody>
+          <a:bodyPr anchorCtr="0" anchor="t" bIns="91425" lIns="91425" spcFirstLastPara="1" rIns="91425" wrap="square" tIns="91425">
+            <a:noAutofit/>
+          </a:bodyPr>
+          <a:lstStyle/>
+          <a:p>
+            <a:pPr indent="0" lvl="0" marL="0" marR="0" rtl="0" algn="l">
+              <a:lnSpc>
+                <a:spcPct val="100000"/>
+              </a:lnSpc>
+              <a:spcBef>
+                <a:spcPts val="0"/>
+              </a:spcBef>
+              <a:spcAft>
+                <a:spcPts val="0"/>
+              </a:spcAft>
+              <a:buClr>
+                <a:srgbClr val="000000"/>
+              </a:buClr>
+              <a:buSzPts val="1400"/>
+              <a:buFont typeface="Arial"/>
+              <a:buNone/>
+            </a:pPr>
+            <a:r>
+              <a:rPr b="1" i="0" lang="pt-BR" sz="1400" u="none" cap="none" strike="noStrike">
+                <a:solidFill>
+                  <a:srgbClr val="000000"/>
+                </a:solidFill>
+                <a:latin typeface="Arial"/>
+                <a:ea typeface="Arial"/>
+                <a:cs typeface="Arial"/>
+                <a:sym typeface="Arial"/>
+              </a:rPr>
+              <a:t>Nós Operacionais</a:t>
+            </a:r>
+            <a:endParaRPr b="1" i="0" sz="1400" u="none" cap="none" strike="noStrike">
+              <a:solidFill>
+                <a:srgbClr val="000000"/>
+              </a:solidFill>
+              <a:latin typeface="Arial"/>
+              <a:ea typeface="Arial"/>
+              <a:cs typeface="Arial"/>
+              <a:sym typeface="Arial"/>
+            </a:endParaRPr>
+          </a:p>
+        </p:txBody>
+      </p:sp>
+      <p:sp>
+        <p:nvSpPr>
+          <p:cNvPr id="89" name="Google Shape;89;p15"/>
+          <p:cNvSpPr txBox="1"/>
+          <p:nvPr/>
+        </p:nvSpPr>
+        <p:spPr>
+          <a:xfrm>
+            <a:off x="218475" y="2757575"/>
+            <a:ext cx="2540700" cy="420300"/>
+          </a:xfrm>
+          <a:prstGeom prst="rect">
+            <a:avLst/>
+          </a:prstGeom>
+          <a:noFill/>
+          <a:ln>
+            <a:noFill/>
+          </a:ln>
+        </p:spPr>
+        <p:txBody>
+          <a:bodyPr anchorCtr="0" anchor="t" bIns="91425" lIns="91425" spcFirstLastPara="1" rIns="91425" wrap="square" tIns="91425">
+            <a:noAutofit/>
+          </a:bodyPr>
+          <a:lstStyle/>
+          <a:p>
+            <a:pPr indent="0" lvl="0" marL="0" marR="0" rtl="0" algn="l">
+              <a:lnSpc>
+                <a:spcPct val="100000"/>
+              </a:lnSpc>
+              <a:spcBef>
+                <a:spcPts val="0"/>
+              </a:spcBef>
+              <a:spcAft>
+                <a:spcPts val="0"/>
+              </a:spcAft>
+              <a:buClr>
+                <a:srgbClr val="000000"/>
+              </a:buClr>
+              <a:buSzPts val="1400"/>
+              <a:buFont typeface="Arial"/>
+              <a:buNone/>
+            </a:pPr>
+            <a:r>
+              <a:rPr b="1" i="0" lang="pt-BR" sz="1400" u="none" cap="none" strike="noStrike">
+                <a:solidFill>
+                  <a:srgbClr val="000000"/>
+                </a:solidFill>
+                <a:latin typeface="Arial"/>
+                <a:ea typeface="Arial"/>
+                <a:cs typeface="Arial"/>
+                <a:sym typeface="Arial"/>
+              </a:rPr>
+              <a:t>Capacidades Operacionais</a:t>
+            </a:r>
+            <a:endParaRPr b="1" i="0" sz="1400" u="none" cap="none" strike="noStrike">
+              <a:solidFill>
+                <a:srgbClr val="000000"/>
+              </a:solidFill>
+              <a:latin typeface="Arial"/>
+              <a:ea typeface="Arial"/>
+              <a:cs typeface="Arial"/>
+              <a:sym typeface="Arial"/>
+            </a:endParaRPr>
+          </a:p>
+        </p:txBody>
+      </p:sp>
+      <p:pic>
+        <p:nvPicPr>
+          <p:cNvPr id="90" name="Google Shape;90;p15"/>
+          <p:cNvPicPr preferRelativeResize="0"/>
+          <p:nvPr/>
+        </p:nvPicPr>
+        <p:blipFill rotWithShape="1">
+          <a:blip r:embed="rId3">
+            <a:alphaModFix/>
+          </a:blip>
+          <a:srcRect b="12374" l="0" r="9624" t="12384"/>
+          <a:stretch/>
+        </p:blipFill>
+        <p:spPr>
+          <a:xfrm>
+            <a:off x="2745300" y="1428250"/>
+            <a:ext cx="852200" cy="1304325"/>
+          </a:xfrm>
+          <a:prstGeom prst="rect">
+            <a:avLst/>
+          </a:prstGeom>
+          <a:noFill/>
+          <a:ln>
+            <a:noFill/>
+          </a:ln>
+        </p:spPr>
+      </p:pic>
+      <p:sp>
+        <p:nvSpPr>
+          <p:cNvPr id="91" name="Google Shape;91;p15"/>
+          <p:cNvSpPr/>
+          <p:nvPr/>
+        </p:nvSpPr>
+        <p:spPr>
+          <a:xfrm>
+            <a:off x="4754125" y="3139475"/>
+            <a:ext cx="80100" cy="563100"/>
+          </a:xfrm>
+          <a:prstGeom prst="leftBracket">
+            <a:avLst>
+              <a:gd fmla="val 8333" name="adj"/>
+            </a:avLst>
+          </a:prstGeom>
+          <a:noFill/>
+          <a:ln cap="flat" cmpd="sng" w="19050">
+            <a:solidFill>
+              <a:srgbClr val="000000"/>
+            </a:solidFill>
+            <a:prstDash val="solid"/>
+            <a:round/>
+            <a:headEnd len="sm" w="sm" type="none"/>
+            <a:tailEnd len="sm" w="sm" type="none"/>
+          </a:ln>
+        </p:spPr>
+        <p:txBody>
+          <a:bodyPr anchorCtr="0" anchor="ctr" bIns="91425" lIns="91425" spcFirstLastPara="1" rIns="91425" wrap="square" tIns="91425">
+            <a:noAutofit/>
+          </a:bodyPr>
+          <a:lstStyle/>
+          <a:p>
+            <a:pPr indent="0" lvl="0" marL="0" marR="0" rtl="0" algn="l">
+              <a:lnSpc>
+                <a:spcPct val="100000"/>
+              </a:lnSpc>
+              <a:spcBef>
+                <a:spcPts val="0"/>
+              </a:spcBef>
+              <a:spcAft>
+                <a:spcPts val="0"/>
+              </a:spcAft>
+              <a:buClr>
+                <a:srgbClr val="000000"/>
+              </a:buClr>
+              <a:buSzPts val="1400"/>
+              <a:buFont typeface="Arial"/>
+              <a:buNone/>
+            </a:pPr>
+            <a:r>
+              <a:t/>
+            </a:r>
+            <a:endParaRPr b="1" i="0" sz="1400" u="none" cap="none" strike="noStrike">
+              <a:solidFill>
+                <a:srgbClr val="000000"/>
+              </a:solidFill>
+              <a:latin typeface="Arial"/>
+              <a:ea typeface="Arial"/>
+              <a:cs typeface="Arial"/>
+              <a:sym typeface="Arial"/>
+            </a:endParaRPr>
+          </a:p>
+        </p:txBody>
+      </p:sp>
+      <p:sp>
+        <p:nvSpPr>
+          <p:cNvPr id="92" name="Google Shape;92;p15"/>
+          <p:cNvSpPr/>
+          <p:nvPr/>
+        </p:nvSpPr>
+        <p:spPr>
+          <a:xfrm>
+            <a:off x="6824575" y="3140950"/>
+            <a:ext cx="80100" cy="563100"/>
+          </a:xfrm>
+          <a:prstGeom prst="rightBracket">
+            <a:avLst>
+              <a:gd fmla="val 8333" name="adj"/>
+            </a:avLst>
+          </a:prstGeom>
+          <a:noFill/>
+          <a:ln cap="flat" cmpd="sng" w="19050">
+            <a:solidFill>
+              <a:srgbClr val="000000"/>
+            </a:solidFill>
+            <a:prstDash val="solid"/>
+            <a:round/>
+            <a:headEnd len="sm" w="sm" type="none"/>
+            <a:tailEnd len="sm" w="sm" type="none"/>
+          </a:ln>
+        </p:spPr>
+        <p:txBody>
+          <a:bodyPr anchorCtr="0" anchor="ctr" bIns="91425" lIns="91425" spcFirstLastPara="1" rIns="91425" wrap="square" tIns="91425">
+            <a:noAutofit/>
+          </a:bodyPr>
+          <a:lstStyle/>
+          <a:p>
+            <a:pPr indent="0" lvl="0" marL="0" marR="0" rtl="0" algn="l">
+              <a:lnSpc>
+                <a:spcPct val="100000"/>
+              </a:lnSpc>
+              <a:spcBef>
+                <a:spcPts val="0"/>
+              </a:spcBef>
+              <a:spcAft>
+                <a:spcPts val="0"/>
+              </a:spcAft>
+              <a:buClr>
+                <a:srgbClr val="000000"/>
+              </a:buClr>
+              <a:buSzPts val="1400"/>
+              <a:buFont typeface="Arial"/>
+              <a:buNone/>
+            </a:pPr>
+            <a:r>
+              <a:t/>
+            </a:r>
+            <a:endParaRPr b="1" i="0" sz="1400" u="none" cap="none" strike="noStrike">
+              <a:solidFill>
+                <a:srgbClr val="000000"/>
+              </a:solidFill>
+              <a:latin typeface="Arial"/>
+              <a:ea typeface="Arial"/>
+              <a:cs typeface="Arial"/>
+              <a:sym typeface="Arial"/>
+            </a:endParaRPr>
+          </a:p>
+        </p:txBody>
+      </p:sp>
+      <p:sp>
+        <p:nvSpPr>
+          <p:cNvPr id="93" name="Google Shape;93;p15"/>
+          <p:cNvSpPr txBox="1"/>
+          <p:nvPr/>
+        </p:nvSpPr>
+        <p:spPr>
+          <a:xfrm>
+            <a:off x="4761475" y="3213275"/>
+            <a:ext cx="2540700" cy="420300"/>
+          </a:xfrm>
+          <a:prstGeom prst="rect">
+            <a:avLst/>
+          </a:prstGeom>
+          <a:noFill/>
+          <a:ln>
+            <a:noFill/>
+          </a:ln>
+        </p:spPr>
+        <p:txBody>
+          <a:bodyPr anchorCtr="0" anchor="t" bIns="91425" lIns="91425" spcFirstLastPara="1" rIns="91425" wrap="square" tIns="91425">
+            <a:noAutofit/>
+          </a:bodyPr>
+          <a:lstStyle/>
+          <a:p>
+            <a:pPr indent="-317500" lvl="0" marL="457200" marR="0" rtl="0" algn="l">
+              <a:lnSpc>
+                <a:spcPct val="100000"/>
+              </a:lnSpc>
+              <a:spcBef>
+                <a:spcPts val="0"/>
+              </a:spcBef>
+              <a:spcAft>
+                <a:spcPts val="0"/>
+              </a:spcAft>
+              <a:buClr>
+                <a:srgbClr val="000000"/>
+              </a:buClr>
+              <a:buSzPts val="1400"/>
+              <a:buFont typeface="Arial"/>
+              <a:buChar char="●"/>
+            </a:pPr>
+            <a:r>
+              <a:rPr b="0" i="0" lang="pt-BR" sz="1400" u="none" cap="none" strike="noStrike">
+                <a:solidFill>
+                  <a:srgbClr val="000000"/>
+                </a:solidFill>
+                <a:latin typeface="Arial"/>
+                <a:ea typeface="Arial"/>
+                <a:cs typeface="Arial"/>
+                <a:sym typeface="Arial"/>
+              </a:rPr>
+              <a:t>Cancelar compra</a:t>
+            </a:r>
+            <a:endParaRPr b="0" i="0" sz="1400" u="none" cap="none" strike="noStrike">
+              <a:solidFill>
+                <a:srgbClr val="000000"/>
+              </a:solidFill>
+              <a:latin typeface="Arial"/>
+              <a:ea typeface="Arial"/>
+              <a:cs typeface="Arial"/>
+              <a:sym typeface="Arial"/>
+            </a:endParaRPr>
+          </a:p>
+          <a:p>
+            <a:pPr indent="0" lvl="0" marL="457200" marR="0" rtl="0" algn="l">
+              <a:lnSpc>
+                <a:spcPct val="100000"/>
+              </a:lnSpc>
+              <a:spcBef>
+                <a:spcPts val="0"/>
+              </a:spcBef>
+              <a:spcAft>
+                <a:spcPts val="0"/>
+              </a:spcAft>
+              <a:buClr>
+                <a:srgbClr val="000000"/>
+              </a:buClr>
+              <a:buSzPts val="1400"/>
+              <a:buFont typeface="Arial"/>
+              <a:buNone/>
+            </a:pPr>
+            <a:r>
+              <a:t/>
+            </a:r>
+            <a:endParaRPr b="0" i="0" sz="1400" u="none" cap="none" strike="noStrike">
+              <a:solidFill>
+                <a:srgbClr val="000000"/>
+              </a:solidFill>
+              <a:latin typeface="Arial"/>
+              <a:ea typeface="Arial"/>
+              <a:cs typeface="Arial"/>
+              <a:sym typeface="Arial"/>
+            </a:endParaRPr>
+          </a:p>
+        </p:txBody>
+      </p:sp>
+      <p:cxnSp>
+        <p:nvCxnSpPr>
+          <p:cNvPr id="94" name="Google Shape;94;p15"/>
+          <p:cNvCxnSpPr>
+            <a:stCxn id="84" idx="2"/>
+            <a:endCxn id="90" idx="0"/>
+          </p:cNvCxnSpPr>
+          <p:nvPr/>
+        </p:nvCxnSpPr>
+        <p:spPr>
+          <a:xfrm rot="5400000">
+            <a:off x="3434938" y="525320"/>
+            <a:ext cx="639300" cy="1166400"/>
+          </a:xfrm>
+          <a:prstGeom prst="curvedConnector3">
+            <a:avLst>
+              <a:gd fmla="val 56268" name="adj1"/>
+            </a:avLst>
+          </a:prstGeom>
+          <a:noFill/>
+          <a:ln cap="flat" cmpd="sng" w="19050">
+            <a:solidFill>
+              <a:srgbClr val="000000"/>
+            </a:solidFill>
+            <a:prstDash val="solid"/>
+            <a:round/>
+            <a:headEnd len="sm" w="sm" type="none"/>
+            <a:tailEnd len="sm" w="sm" type="none"/>
+          </a:ln>
+        </p:spPr>
+      </p:cxnSp>
+      <p:cxnSp>
+        <p:nvCxnSpPr>
+          <p:cNvPr id="95" name="Google Shape;95;p15"/>
+          <p:cNvCxnSpPr>
+            <a:endCxn id="93" idx="1"/>
+          </p:cNvCxnSpPr>
+          <p:nvPr/>
+        </p:nvCxnSpPr>
+        <p:spPr>
+          <a:xfrm flipH="1" rot="-5400000">
+            <a:off x="3241075" y="1903025"/>
+            <a:ext cx="2603700" cy="437100"/>
+          </a:xfrm>
+          <a:prstGeom prst="curvedConnector2">
+            <a:avLst/>
+          </a:prstGeom>
+          <a:noFill/>
+          <a:ln cap="flat" cmpd="sng" w="19050">
+            <a:solidFill>
+              <a:srgbClr val="000000"/>
+            </a:solidFill>
+            <a:prstDash val="solid"/>
+            <a:round/>
+            <a:headEnd len="sm" w="sm" type="none"/>
+            <a:tailEnd len="sm" w="sm" type="none"/>
+          </a:ln>
+        </p:spPr>
+      </p:cxnSp>
+      <p:sp>
+        <p:nvSpPr>
+          <p:cNvPr id="96" name="Google Shape;96;p15"/>
+          <p:cNvSpPr/>
+          <p:nvPr/>
+        </p:nvSpPr>
+        <p:spPr>
+          <a:xfrm>
+            <a:off x="3923400" y="2014725"/>
+            <a:ext cx="1014300" cy="443100"/>
+          </a:xfrm>
+          <a:prstGeom prst="rect">
+            <a:avLst/>
+          </a:prstGeom>
+          <a:solidFill>
+            <a:srgbClr val="C9DAF8"/>
+          </a:solidFill>
+          <a:ln cap="flat" cmpd="sng" w="9525">
+            <a:solidFill>
+              <a:srgbClr val="000000"/>
+            </a:solidFill>
+            <a:prstDash val="solid"/>
+            <a:round/>
+            <a:headEnd len="sm" w="sm" type="none"/>
+            <a:tailEnd len="sm" w="sm" type="none"/>
+          </a:ln>
+        </p:spPr>
+        <p:txBody>
+          <a:bodyPr anchorCtr="0" anchor="ctr" bIns="91425" lIns="91425" spcFirstLastPara="1" rIns="91425" wrap="square" tIns="91425">
+            <a:noAutofit/>
+          </a:bodyPr>
+          <a:lstStyle/>
+          <a:p>
+            <a:pPr indent="0" lvl="0" marL="0" marR="0" rtl="0" algn="ctr">
+              <a:lnSpc>
+                <a:spcPct val="100000"/>
+              </a:lnSpc>
+              <a:spcBef>
+                <a:spcPts val="0"/>
+              </a:spcBef>
+              <a:spcAft>
+                <a:spcPts val="0"/>
+              </a:spcAft>
+              <a:buClr>
+                <a:srgbClr val="000000"/>
+              </a:buClr>
+              <a:buSzPts val="1400"/>
+              <a:buFont typeface="Arial"/>
+              <a:buNone/>
+            </a:pPr>
+            <a:r>
+              <a:rPr b="0" i="0" lang="pt-BR" sz="1400" u="none" cap="none" strike="noStrike">
+                <a:solidFill>
+                  <a:srgbClr val="000000"/>
+                </a:solidFill>
+                <a:latin typeface="Arial"/>
+                <a:ea typeface="Arial"/>
+                <a:cs typeface="Arial"/>
+                <a:sym typeface="Arial"/>
+              </a:rPr>
+              <a:t>Loja </a:t>
+            </a:r>
+            <a:endParaRPr b="0" i="0" sz="1400" u="none" cap="none" strike="noStrike">
+              <a:solidFill>
+                <a:srgbClr val="000000"/>
+              </a:solidFill>
+              <a:latin typeface="Arial"/>
+              <a:ea typeface="Arial"/>
+              <a:cs typeface="Arial"/>
+              <a:sym typeface="Arial"/>
+            </a:endParaRPr>
+          </a:p>
+        </p:txBody>
+      </p:sp>
+      <p:pic>
+        <p:nvPicPr>
+          <p:cNvPr id="97" name="Google Shape;97;p15"/>
+          <p:cNvPicPr preferRelativeResize="0"/>
+          <p:nvPr/>
+        </p:nvPicPr>
+        <p:blipFill rotWithShape="1">
+          <a:blip r:embed="rId4">
+            <a:alphaModFix/>
+          </a:blip>
+          <a:srcRect b="0" l="0" r="0" t="0"/>
+          <a:stretch/>
+        </p:blipFill>
+        <p:spPr>
+          <a:xfrm>
+            <a:off x="5563275" y="1436575"/>
+            <a:ext cx="937100" cy="1304325"/>
+          </a:xfrm>
+          <a:prstGeom prst="rect">
+            <a:avLst/>
+          </a:prstGeom>
+          <a:noFill/>
+          <a:ln>
+            <a:noFill/>
+          </a:ln>
+        </p:spPr>
+      </p:pic>
+      <p:pic>
+        <p:nvPicPr>
+          <p:cNvPr id="98" name="Google Shape;98;p15"/>
+          <p:cNvPicPr preferRelativeResize="0"/>
+          <p:nvPr/>
+        </p:nvPicPr>
+        <p:blipFill>
+          <a:blip r:embed="rId5">
+            <a:alphaModFix/>
+          </a:blip>
+          <a:stretch>
+            <a:fillRect/>
+          </a:stretch>
+        </p:blipFill>
+        <p:spPr>
+          <a:xfrm>
+            <a:off x="6824575" y="1436580"/>
+            <a:ext cx="723050" cy="1304325"/>
+          </a:xfrm>
+          <a:prstGeom prst="rect">
+            <a:avLst/>
+          </a:prstGeom>
+          <a:noFill/>
+          <a:ln>
+            <a:noFill/>
+          </a:ln>
+        </p:spPr>
+      </p:pic>
+      <p:cxnSp>
+        <p:nvCxnSpPr>
+          <p:cNvPr id="99" name="Google Shape;99;p15"/>
+          <p:cNvCxnSpPr>
+            <a:stCxn id="84" idx="2"/>
+            <a:endCxn id="97" idx="0"/>
+          </p:cNvCxnSpPr>
+          <p:nvPr/>
+        </p:nvCxnSpPr>
+        <p:spPr>
+          <a:xfrm flipH="1" rot="-5400000">
+            <a:off x="4860988" y="265670"/>
+            <a:ext cx="647700" cy="1694100"/>
+          </a:xfrm>
+          <a:prstGeom prst="curvedConnector3">
+            <a:avLst>
+              <a:gd fmla="val 56181" name="adj1"/>
+            </a:avLst>
+          </a:prstGeom>
+          <a:noFill/>
+          <a:ln cap="flat" cmpd="sng" w="19050">
+            <a:solidFill>
+              <a:srgbClr val="000000"/>
+            </a:solidFill>
+            <a:prstDash val="solid"/>
+            <a:round/>
+            <a:headEnd len="med" w="med" type="none"/>
+            <a:tailEnd len="med" w="med" type="none"/>
+          </a:ln>
+        </p:spPr>
+      </p:cxnSp>
+      <p:cxnSp>
+        <p:nvCxnSpPr>
+          <p:cNvPr id="100" name="Google Shape;100;p15"/>
+          <p:cNvCxnSpPr>
+            <a:stCxn id="84" idx="2"/>
+            <a:endCxn id="98" idx="0"/>
+          </p:cNvCxnSpPr>
+          <p:nvPr/>
+        </p:nvCxnSpPr>
+        <p:spPr>
+          <a:xfrm flipH="1" rot="-5400000">
+            <a:off x="5438038" y="-311380"/>
+            <a:ext cx="647700" cy="2848200"/>
+          </a:xfrm>
+          <a:prstGeom prst="curvedConnector3">
+            <a:avLst>
+              <a:gd fmla="val 56182" name="adj1"/>
+            </a:avLst>
+          </a:prstGeom>
+          <a:noFill/>
+          <a:ln cap="flat" cmpd="sng" w="19050">
+            <a:solidFill>
+              <a:srgbClr val="000000"/>
+            </a:solidFill>
+            <a:prstDash val="solid"/>
+            <a:round/>
+            <a:headEnd len="med" w="med" type="none"/>
+            <a:tailEnd len="med" w="med" type="none"/>
+          </a:ln>
+        </p:spPr>
+      </p:cxnSp>
+    </p:spTree>
+  </p:cSld>
+  <p:clrMapOvr>
+    <a:masterClrMapping/>
+  </p:clrMapOvr>
+</p:sld>
+</file>
+
+<file path=ppt/slides/slide4.xml><?xml version="1.0" encoding="utf-8"?>
+<p:sld xmlns:a="http://schemas.openxmlformats.org/drawingml/2006/main" xmlns:r="http://schemas.openxmlformats.org/officeDocument/2006/relationships" xmlns:mc="http://schemas.openxmlformats.org/markup-compatibility/2006" xmlns:mv="urn:schemas-microsoft-com:mac:vml" xmlns:p="http://schemas.openxmlformats.org/presentationml/2006/main" xmlns:c="http://schemas.openxmlformats.org/drawingml/2006/chart" xmlns:dgm="http://schemas.openxmlformats.org/drawingml/2006/diagram" xmlns:o="urn:schemas-microsoft-com:office:office" xmlns:v="urn:schemas-microsoft-com:vml" xmlns:pvml="urn:schemas-microsoft-com:office:powerpoint" xmlns:com="http://schemas.openxmlformats.org/drawingml/2006/compatibility" xmlns:p14="http://schemas.microsoft.com/office/powerpoint/2010/main" xmlns:p15="http://schemas.microsoft.com/office/powerpoint/2012/main">
+  <p:cSld>
+    <p:spTree>
+      <p:nvGrpSpPr>
+        <p:cNvPr id="104" name="Shape 104"/>
+        <p:cNvGrpSpPr/>
+        <p:nvPr/>
+      </p:nvGrpSpPr>
+      <p:grpSpPr>
+        <a:xfrm>
+          <a:off x="0" y="0"/>
+          <a:ext cx="0" cy="0"/>
+          <a:chOff x="0" y="0"/>
+          <a:chExt cx="0" cy="0"/>
+        </a:xfrm>
+      </p:grpSpPr>
+      <p:sp>
+        <p:nvSpPr>
+          <p:cNvPr id="105" name="Google Shape;105;p16"/>
+          <p:cNvSpPr/>
+          <p:nvPr/>
+        </p:nvSpPr>
+        <p:spPr>
+          <a:xfrm>
+            <a:off x="3411525" y="68275"/>
+            <a:ext cx="1852525" cy="800675"/>
+          </a:xfrm>
+          <a:prstGeom prst="flowChartPunchedTape">
+            <a:avLst/>
+          </a:prstGeom>
+          <a:solidFill>
+            <a:srgbClr val="EAD1DC"/>
+          </a:solidFill>
+          <a:ln cap="flat" cmpd="sng" w="9525">
+            <a:solidFill>
+              <a:srgbClr val="000000"/>
+            </a:solidFill>
+            <a:prstDash val="solid"/>
+            <a:round/>
+            <a:headEnd len="sm" w="sm" type="none"/>
+            <a:tailEnd len="sm" w="sm" type="none"/>
+          </a:ln>
+        </p:spPr>
+        <p:txBody>
+          <a:bodyPr anchorCtr="0" anchor="ctr" bIns="91425" lIns="91425" spcFirstLastPara="1" rIns="91425" wrap="square" tIns="91425">
+            <a:noAutofit/>
+          </a:bodyPr>
+          <a:lstStyle/>
+          <a:p>
+            <a:pPr indent="0" lvl="0" marL="0" marR="0" rtl="0" algn="l">
+              <a:lnSpc>
+                <a:spcPct val="100000"/>
+              </a:lnSpc>
+              <a:spcBef>
+                <a:spcPts val="0"/>
+              </a:spcBef>
+              <a:spcAft>
+                <a:spcPts val="0"/>
+              </a:spcAft>
+              <a:buClr>
+                <a:srgbClr val="000000"/>
+              </a:buClr>
+              <a:buSzPts val="1400"/>
+              <a:buFont typeface="Arial"/>
+              <a:buNone/>
+            </a:pPr>
+            <a:r>
+              <a:t/>
+            </a:r>
+            <a:endParaRPr b="0" i="0" sz="1400" u="none" cap="none" strike="noStrike">
+              <a:solidFill>
+                <a:srgbClr val="000000"/>
+              </a:solidFill>
+              <a:latin typeface="Arial"/>
+              <a:ea typeface="Arial"/>
+              <a:cs typeface="Arial"/>
+              <a:sym typeface="Arial"/>
+            </a:endParaRPr>
+          </a:p>
+        </p:txBody>
+      </p:sp>
+      <p:sp>
+        <p:nvSpPr>
+          <p:cNvPr id="106" name="Google Shape;106;p16"/>
+          <p:cNvSpPr txBox="1"/>
+          <p:nvPr/>
+        </p:nvSpPr>
+        <p:spPr>
+          <a:xfrm>
+            <a:off x="3411525" y="231163"/>
+            <a:ext cx="1922100" cy="474900"/>
+          </a:xfrm>
+          <a:prstGeom prst="rect">
+            <a:avLst/>
+          </a:prstGeom>
+          <a:noFill/>
+          <a:ln>
+            <a:noFill/>
+          </a:ln>
+        </p:spPr>
+        <p:txBody>
+          <a:bodyPr anchorCtr="0" anchor="t" bIns="91425" lIns="91425" spcFirstLastPara="1" rIns="91425" wrap="square" tIns="91425">
+            <a:noAutofit/>
+          </a:bodyPr>
+          <a:lstStyle/>
+          <a:p>
+            <a:pPr indent="0" lvl="0" marL="0" marR="0" rtl="0" algn="ctr">
+              <a:lnSpc>
+                <a:spcPct val="100000"/>
+              </a:lnSpc>
+              <a:spcBef>
+                <a:spcPts val="0"/>
+              </a:spcBef>
+              <a:spcAft>
+                <a:spcPts val="0"/>
+              </a:spcAft>
+              <a:buClr>
+                <a:srgbClr val="000000"/>
+              </a:buClr>
+              <a:buSzPts val="1400"/>
+              <a:buFont typeface="Arial"/>
+              <a:buNone/>
+            </a:pPr>
+            <a:r>
+              <a:rPr b="0" i="0" lang="pt-BR" sz="1400" u="none" cap="none" strike="noStrike">
+                <a:solidFill>
+                  <a:srgbClr val="000000"/>
+                </a:solidFill>
+                <a:latin typeface="Arial"/>
+                <a:ea typeface="Arial"/>
+                <a:cs typeface="Arial"/>
+                <a:sym typeface="Arial"/>
+              </a:rPr>
+              <a:t>Pagar compra</a:t>
+            </a:r>
+            <a:endParaRPr b="0" i="0" sz="1400" u="none" cap="none" strike="noStrike">
+              <a:solidFill>
+                <a:srgbClr val="000000"/>
+              </a:solidFill>
+              <a:latin typeface="Arial"/>
+              <a:ea typeface="Arial"/>
+              <a:cs typeface="Arial"/>
+              <a:sym typeface="Arial"/>
+            </a:endParaRPr>
+          </a:p>
+        </p:txBody>
+      </p:sp>
+      <p:sp>
+        <p:nvSpPr>
+          <p:cNvPr id="107" name="Google Shape;107;p16"/>
           <p:cNvSpPr/>
           <p:nvPr/>
         </p:nvSpPr>
@@ -10949,7 +11829,7 @@
       </p:sp>
       <p:cxnSp>
         <p:nvCxnSpPr>
-          <p:cNvPr id="87" name="Google Shape;87;p3"/>
+          <p:cNvPr id="108" name="Google Shape;108;p16"/>
           <p:cNvCxnSpPr/>
           <p:nvPr/>
         </p:nvCxnSpPr>
@@ -10975,7 +11855,7 @@
       </p:cxnSp>
       <p:sp>
         <p:nvSpPr>
-          <p:cNvPr id="88" name="Google Shape;88;p3"/>
+          <p:cNvPr id="109" name="Google Shape;109;p16"/>
           <p:cNvSpPr txBox="1"/>
           <p:nvPr/>
         </p:nvSpPr>
@@ -11041,7 +11921,7 @@
       </p:sp>
       <p:sp>
         <p:nvSpPr>
-          <p:cNvPr id="89" name="Google Shape;89;p3"/>
+          <p:cNvPr id="110" name="Google Shape;110;p16"/>
           <p:cNvSpPr txBox="1"/>
           <p:nvPr/>
         </p:nvSpPr>
@@ -11105,43 +11985,16 @@
           </a:p>
         </p:txBody>
       </p:sp>
-      <p:pic>
-        <p:nvPicPr>
-          <p:cNvPr id="90" name="Google Shape;90;p3"/>
-          <p:cNvPicPr preferRelativeResize="0"/>
-          <p:nvPr/>
-        </p:nvPicPr>
-        <p:blipFill rotWithShape="1">
-          <a:blip r:embed="rId3">
-            <a:alphaModFix/>
-          </a:blip>
-          <a:srcRect b="12374" l="0" r="9624" t="12384"/>
-          <a:stretch/>
-        </p:blipFill>
-        <p:spPr>
-          <a:xfrm>
-            <a:off x="2745300" y="1428250"/>
-            <a:ext cx="852200" cy="1304325"/>
-          </a:xfrm>
-          <a:prstGeom prst="rect">
-            <a:avLst/>
-          </a:prstGeom>
-          <a:noFill/>
-          <a:ln>
-            <a:noFill/>
-          </a:ln>
-        </p:spPr>
-      </p:pic>
       <p:sp>
         <p:nvSpPr>
-          <p:cNvPr id="91" name="Google Shape;91;p3"/>
+          <p:cNvPr id="111" name="Google Shape;111;p16"/>
           <p:cNvSpPr/>
           <p:nvPr/>
         </p:nvSpPr>
         <p:spPr>
           <a:xfrm>
-            <a:off x="4754125" y="3139475"/>
-            <a:ext cx="80100" cy="563100"/>
+            <a:off x="5022925" y="3085800"/>
+            <a:ext cx="88200" cy="639300"/>
           </a:xfrm>
           <a:prstGeom prst="leftBracket">
             <a:avLst>
@@ -11199,14 +12052,14 @@
       </p:sp>
       <p:sp>
         <p:nvSpPr>
-          <p:cNvPr id="92" name="Google Shape;92;p3"/>
+          <p:cNvPr id="112" name="Google Shape;112;p16"/>
           <p:cNvSpPr/>
           <p:nvPr/>
         </p:nvSpPr>
         <p:spPr>
           <a:xfrm>
-            <a:off x="6824575" y="3140950"/>
-            <a:ext cx="80100" cy="563100"/>
+            <a:off x="7283475" y="3085800"/>
+            <a:ext cx="88200" cy="639300"/>
           </a:xfrm>
           <a:prstGeom prst="rightBracket">
             <a:avLst>
@@ -11264,14 +12117,14 @@
       </p:sp>
       <p:sp>
         <p:nvSpPr>
-          <p:cNvPr id="93" name="Google Shape;93;p3"/>
+          <p:cNvPr id="113" name="Google Shape;113;p16"/>
           <p:cNvSpPr txBox="1"/>
           <p:nvPr/>
         </p:nvSpPr>
         <p:spPr>
           <a:xfrm>
-            <a:off x="4761475" y="3213275"/>
-            <a:ext cx="2540700" cy="420300"/>
+            <a:off x="5022925" y="3154800"/>
+            <a:ext cx="2653500" cy="443100"/>
           </a:xfrm>
           <a:prstGeom prst="rect">
             <a:avLst/>
@@ -11305,6 +12158,10 @@
               <a:buChar char="●"/>
             </a:pPr>
             <a:r>
+              <a:rPr lang="pt-BR"/>
+              <a:t>Receber </a:t>
+            </a:r>
+            <a:r>
               <a:rPr b="0" i="0" lang="pt-BR" sz="1400" u="none" cap="none" strike="noStrike">
                 <a:solidFill>
                   <a:srgbClr val="000000"/>
@@ -11314,7 +12171,7 @@
                 <a:cs typeface="Arial"/>
                 <a:sym typeface="Arial"/>
               </a:rPr>
-              <a:t>Cancelar compra</a:t>
+              <a:t>pagamento</a:t>
             </a:r>
             <a:endParaRPr b="0" i="0" sz="1400" u="none" cap="none" strike="noStrike">
               <a:solidFill>
@@ -11357,25 +12214,83 @@
               <a:sym typeface="Arial"/>
             </a:endParaRPr>
           </a:p>
+          <a:p>
+            <a:pPr indent="0" lvl="0" marL="457200" marR="0" rtl="0" algn="l">
+              <a:lnSpc>
+                <a:spcPct val="100000"/>
+              </a:lnSpc>
+              <a:spcBef>
+                <a:spcPts val="0"/>
+              </a:spcBef>
+              <a:spcAft>
+                <a:spcPts val="0"/>
+              </a:spcAft>
+              <a:buClr>
+                <a:srgbClr val="000000"/>
+              </a:buClr>
+              <a:buSzPts val="1400"/>
+              <a:buFont typeface="Arial"/>
+              <a:buNone/>
+            </a:pPr>
+            <a:r>
+              <a:t/>
+            </a:r>
+            <a:endParaRPr b="0" i="0" sz="1400" u="none" cap="none" strike="noStrike">
+              <a:solidFill>
+                <a:srgbClr val="000000"/>
+              </a:solidFill>
+              <a:latin typeface="Arial"/>
+              <a:ea typeface="Arial"/>
+              <a:cs typeface="Arial"/>
+              <a:sym typeface="Arial"/>
+            </a:endParaRPr>
+          </a:p>
         </p:txBody>
       </p:sp>
+      <p:pic>
+        <p:nvPicPr>
+          <p:cNvPr id="114" name="Google Shape;114;p16"/>
+          <p:cNvPicPr preferRelativeResize="0"/>
+          <p:nvPr/>
+        </p:nvPicPr>
+        <p:blipFill rotWithShape="1">
+          <a:blip r:embed="rId3">
+            <a:alphaModFix/>
+          </a:blip>
+          <a:srcRect b="12375" l="0" r="9624" t="12384"/>
+          <a:stretch/>
+        </p:blipFill>
+        <p:spPr>
+          <a:xfrm>
+            <a:off x="2745300" y="1428250"/>
+            <a:ext cx="852200" cy="1304325"/>
+          </a:xfrm>
+          <a:prstGeom prst="rect">
+            <a:avLst/>
+          </a:prstGeom>
+          <a:noFill/>
+          <a:ln>
+            <a:noFill/>
+          </a:ln>
+        </p:spPr>
+      </p:pic>
       <p:cxnSp>
         <p:nvCxnSpPr>
-          <p:cNvPr id="94" name="Google Shape;94;p3"/>
+          <p:cNvPr id="115" name="Google Shape;115;p16"/>
           <p:cNvCxnSpPr>
-            <a:stCxn id="84" idx="2"/>
-            <a:endCxn id="90" idx="0"/>
+            <a:stCxn id="105" idx="2"/>
+            <a:endCxn id="114" idx="0"/>
           </p:cNvCxnSpPr>
           <p:nvPr/>
         </p:nvCxnSpPr>
         <p:spPr>
           <a:xfrm rot="5400000">
-            <a:off x="3434938" y="525320"/>
+            <a:off x="3434938" y="525332"/>
             <a:ext cx="639300" cy="1166400"/>
           </a:xfrm>
           <a:prstGeom prst="curvedConnector3">
             <a:avLst>
-              <a:gd fmla="val 56268" name="adj1"/>
+              <a:gd fmla="val 56267" name="adj1"/>
             </a:avLst>
           </a:prstGeom>
           <a:noFill/>
@@ -11392,16 +12307,17 @@
       </p:cxnSp>
       <p:cxnSp>
         <p:nvCxnSpPr>
-          <p:cNvPr id="95" name="Google Shape;95;p3"/>
+          <p:cNvPr id="116" name="Google Shape;116;p16"/>
           <p:cNvCxnSpPr>
-            <a:endCxn id="93" idx="1"/>
+            <a:stCxn id="105" idx="2"/>
+            <a:endCxn id="113" idx="1"/>
           </p:cNvCxnSpPr>
           <p:nvPr/>
         </p:nvCxnSpPr>
         <p:spPr>
           <a:xfrm flipH="1" rot="-5400000">
-            <a:off x="3241075" y="1903025"/>
-            <a:ext cx="2603700" cy="437100"/>
+            <a:off x="3386638" y="1740032"/>
+            <a:ext cx="2587500" cy="685200"/>
           </a:xfrm>
           <a:prstGeom prst="curvedConnector2">
             <a:avLst/>
@@ -11420,13 +12336,13 @@
       </p:cxnSp>
       <p:sp>
         <p:nvSpPr>
-          <p:cNvPr id="96" name="Google Shape;96;p3"/>
+          <p:cNvPr id="117" name="Google Shape;117;p16"/>
           <p:cNvSpPr/>
           <p:nvPr/>
         </p:nvSpPr>
         <p:spPr>
           <a:xfrm>
-            <a:off x="3923400" y="2014725"/>
+            <a:off x="3999600" y="2014725"/>
             <a:ext cx="1014300" cy="443100"/>
           </a:xfrm>
           <a:prstGeom prst="rect">
@@ -11492,6 +12408,123 @@
           </a:p>
         </p:txBody>
       </p:sp>
+      <p:pic>
+        <p:nvPicPr>
+          <p:cNvPr id="118" name="Google Shape;118;p16"/>
+          <p:cNvPicPr preferRelativeResize="0"/>
+          <p:nvPr/>
+        </p:nvPicPr>
+        <p:blipFill rotWithShape="1">
+          <a:blip r:embed="rId4">
+            <a:alphaModFix/>
+          </a:blip>
+          <a:srcRect b="0" l="0" r="0" t="0"/>
+          <a:stretch/>
+        </p:blipFill>
+        <p:spPr>
+          <a:xfrm>
+            <a:off x="5563275" y="1436575"/>
+            <a:ext cx="937100" cy="1304325"/>
+          </a:xfrm>
+          <a:prstGeom prst="rect">
+            <a:avLst/>
+          </a:prstGeom>
+          <a:noFill/>
+          <a:ln>
+            <a:noFill/>
+          </a:ln>
+        </p:spPr>
+      </p:pic>
+      <p:pic>
+        <p:nvPicPr>
+          <p:cNvPr id="119" name="Google Shape;119;p16"/>
+          <p:cNvPicPr preferRelativeResize="0"/>
+          <p:nvPr/>
+        </p:nvPicPr>
+        <p:blipFill>
+          <a:blip r:embed="rId5">
+            <a:alphaModFix/>
+          </a:blip>
+          <a:stretch>
+            <a:fillRect/>
+          </a:stretch>
+        </p:blipFill>
+        <p:spPr>
+          <a:xfrm>
+            <a:off x="6824575" y="1436580"/>
+            <a:ext cx="723050" cy="1304325"/>
+          </a:xfrm>
+          <a:prstGeom prst="rect">
+            <a:avLst/>
+          </a:prstGeom>
+          <a:noFill/>
+          <a:ln>
+            <a:noFill/>
+          </a:ln>
+        </p:spPr>
+      </p:pic>
+      <p:cxnSp>
+        <p:nvCxnSpPr>
+          <p:cNvPr id="120" name="Google Shape;120;p16"/>
+          <p:cNvCxnSpPr>
+            <a:stCxn id="105" idx="2"/>
+            <a:endCxn id="118" idx="0"/>
+          </p:cNvCxnSpPr>
+          <p:nvPr/>
+        </p:nvCxnSpPr>
+        <p:spPr>
+          <a:xfrm flipH="1" rot="-5400000">
+            <a:off x="4860988" y="265682"/>
+            <a:ext cx="647700" cy="1694100"/>
+          </a:xfrm>
+          <a:prstGeom prst="curvedConnector3">
+            <a:avLst>
+              <a:gd fmla="val 56180" name="adj1"/>
+            </a:avLst>
+          </a:prstGeom>
+          <a:noFill/>
+          <a:ln cap="flat" cmpd="sng" w="19050">
+            <a:solidFill>
+              <a:srgbClr val="000000"/>
+            </a:solidFill>
+            <a:prstDash val="solid"/>
+            <a:round/>
+            <a:headEnd len="sm" w="sm" type="none"/>
+            <a:tailEnd len="sm" w="sm" type="none"/>
+          </a:ln>
+        </p:spPr>
+      </p:cxnSp>
+      <p:cxnSp>
+        <p:nvCxnSpPr>
+          <p:cNvPr id="121" name="Google Shape;121;p16"/>
+          <p:cNvCxnSpPr>
+            <a:stCxn id="105" idx="2"/>
+            <a:endCxn id="119" idx="0"/>
+          </p:cNvCxnSpPr>
+          <p:nvPr/>
+        </p:nvCxnSpPr>
+        <p:spPr>
+          <a:xfrm flipH="1" rot="-5400000">
+            <a:off x="5438038" y="-311368"/>
+            <a:ext cx="647700" cy="2848200"/>
+          </a:xfrm>
+          <a:prstGeom prst="curvedConnector3">
+            <a:avLst>
+              <a:gd fmla="val 56181" name="adj1"/>
+            </a:avLst>
+          </a:prstGeom>
+          <a:noFill/>
+          <a:ln cap="flat" cmpd="sng" w="19050">
+            <a:solidFill>
+              <a:srgbClr val="000000"/>
+            </a:solidFill>
+            <a:prstDash val="solid"/>
+            <a:round/>
+            <a:headEnd len="sm" w="sm" type="none"/>
+            <a:tailEnd len="sm" w="sm" type="none"/>
+          </a:ln>
+        </p:spPr>
+      </p:cxnSp>
     </p:spTree>
   </p:cSld>
   <p:clrMapOvr>
@@ -11500,12 +12533,12 @@
 </p:sld>
 </file>
 
-<file path=ppt/slides/slide4.xml><?xml version="1.0" encoding="utf-8"?>
+<file path=ppt/slides/slide5.xml><?xml version="1.0" encoding="utf-8"?>
 <p:sld xmlns:a="http://schemas.openxmlformats.org/drawingml/2006/main" xmlns:r="http://schemas.openxmlformats.org/officeDocument/2006/relationships" xmlns:mc="http://schemas.openxmlformats.org/markup-compatibility/2006" xmlns:mv="urn:schemas-microsoft-com:mac:vml" xmlns:p="http://schemas.openxmlformats.org/presentationml/2006/main" xmlns:c="http://schemas.openxmlformats.org/drawingml/2006/chart" xmlns:dgm="http://schemas.openxmlformats.org/drawingml/2006/diagram" xmlns:o="urn:schemas-microsoft-com:office:office" xmlns:v="urn:schemas-microsoft-com:vml" xmlns:pvml="urn:schemas-microsoft-com:office:powerpoint" xmlns:com="http://schemas.openxmlformats.org/drawingml/2006/compatibility" xmlns:p14="http://schemas.microsoft.com/office/powerpoint/2010/main" xmlns:p15="http://schemas.microsoft.com/office/powerpoint/2012/main">
   <p:cSld>
     <p:spTree>
       <p:nvGrpSpPr>
-        <p:cNvPr id="100" name="Shape 100"/>
+        <p:cNvPr id="125" name="Shape 125"/>
         <p:cNvGrpSpPr/>
         <p:nvPr/>
       </p:nvGrpSpPr>
@@ -11519,7 +12552,72 @@
       </p:grpSpPr>
       <p:sp>
         <p:nvSpPr>
-          <p:cNvPr id="101" name="Google Shape;101;p4"/>
+          <p:cNvPr id="126" name="Google Shape;126;p17"/>
+          <p:cNvSpPr/>
+          <p:nvPr/>
+        </p:nvSpPr>
+        <p:spPr>
+          <a:xfrm>
+            <a:off x="241100" y="1360375"/>
+            <a:ext cx="8733300" cy="3589800"/>
+          </a:xfrm>
+          <a:prstGeom prst="rect">
+            <a:avLst/>
+          </a:prstGeom>
+          <a:solidFill>
+            <a:srgbClr val="FFFFFF"/>
+          </a:solidFill>
+          <a:ln cap="flat" cmpd="sng" w="19050">
+            <a:solidFill>
+              <a:srgbClr val="000000"/>
+            </a:solidFill>
+            <a:prstDash val="solid"/>
+            <a:round/>
+            <a:headEnd len="sm" w="sm" type="none"/>
+            <a:tailEnd len="sm" w="sm" type="none"/>
+          </a:ln>
+        </p:spPr>
+        <p:txBody>
+          <a:bodyPr anchorCtr="0" anchor="ctr" bIns="91425" lIns="91425" spcFirstLastPara="1" rIns="91425" wrap="square" tIns="91425">
+            <a:noAutofit/>
+          </a:bodyPr>
+          <a:lstStyle/>
+          <a:p>
+            <a:pPr indent="0" lvl="0" marL="0" marR="0" rtl="0" algn="l">
+              <a:lnSpc>
+                <a:spcPct val="100000"/>
+              </a:lnSpc>
+              <a:spcBef>
+                <a:spcPts val="0"/>
+              </a:spcBef>
+              <a:spcAft>
+                <a:spcPts val="0"/>
+              </a:spcAft>
+              <a:buClr>
+                <a:srgbClr val="000000"/>
+              </a:buClr>
+              <a:buSzPts val="1400"/>
+              <a:buFont typeface="Arial"/>
+              <a:buNone/>
+            </a:pPr>
+            <a:r>
+              <a:t/>
+            </a:r>
+            <a:endParaRPr b="0" i="0" sz="1400" u="none" cap="none" strike="noStrike">
+              <a:solidFill>
+                <a:srgbClr val="000000"/>
+              </a:solidFill>
+              <a:latin typeface="Arial"/>
+              <a:ea typeface="Arial"/>
+              <a:cs typeface="Arial"/>
+              <a:sym typeface="Arial"/>
+            </a:endParaRPr>
+          </a:p>
+        </p:txBody>
+      </p:sp>
+      <p:sp>
+        <p:nvSpPr>
+          <p:cNvPr id="127" name="Google Shape;127;p17"/>
           <p:cNvSpPr/>
           <p:nvPr/>
         </p:nvSpPr>
@@ -11584,14 +12682,212 @@
       </p:sp>
       <p:sp>
         <p:nvSpPr>
-          <p:cNvPr id="102" name="Google Shape;102;p4"/>
+          <p:cNvPr id="128" name="Google Shape;128;p17"/>
           <p:cNvSpPr txBox="1"/>
           <p:nvPr/>
         </p:nvSpPr>
         <p:spPr>
           <a:xfrm>
-            <a:off x="3411525" y="231163"/>
-            <a:ext cx="1922100" cy="474900"/>
+            <a:off x="231875" y="1324375"/>
+            <a:ext cx="1852500" cy="334800"/>
+          </a:xfrm>
+          <a:prstGeom prst="rect">
+            <a:avLst/>
+          </a:prstGeom>
+          <a:noFill/>
+          <a:ln>
+            <a:noFill/>
+          </a:ln>
+        </p:spPr>
+        <p:txBody>
+          <a:bodyPr anchorCtr="0" anchor="t" bIns="91425" lIns="91425" spcFirstLastPara="1" rIns="91425" wrap="square" tIns="91425">
+            <a:noAutofit/>
+          </a:bodyPr>
+          <a:lstStyle/>
+          <a:p>
+            <a:pPr indent="0" lvl="0" marL="0" marR="0" rtl="0" algn="l">
+              <a:lnSpc>
+                <a:spcPct val="100000"/>
+              </a:lnSpc>
+              <a:spcBef>
+                <a:spcPts val="0"/>
+              </a:spcBef>
+              <a:spcAft>
+                <a:spcPts val="0"/>
+              </a:spcAft>
+              <a:buClr>
+                <a:srgbClr val="000000"/>
+              </a:buClr>
+              <a:buSzPts val="1400"/>
+              <a:buFont typeface="Arial"/>
+              <a:buNone/>
+            </a:pPr>
+            <a:r>
+              <a:rPr b="1" i="0" lang="pt-BR" sz="1400" u="none" cap="none" strike="noStrike">
+                <a:solidFill>
+                  <a:srgbClr val="000000"/>
+                </a:solidFill>
+                <a:latin typeface="Arial"/>
+                <a:ea typeface="Arial"/>
+                <a:cs typeface="Arial"/>
+                <a:sym typeface="Arial"/>
+              </a:rPr>
+              <a:t>Nós Operacionais</a:t>
+            </a:r>
+            <a:endParaRPr b="1" i="0" sz="1400" u="none" cap="none" strike="noStrike">
+              <a:solidFill>
+                <a:srgbClr val="000000"/>
+              </a:solidFill>
+              <a:latin typeface="Arial"/>
+              <a:ea typeface="Arial"/>
+              <a:cs typeface="Arial"/>
+              <a:sym typeface="Arial"/>
+            </a:endParaRPr>
+          </a:p>
+        </p:txBody>
+      </p:sp>
+      <p:cxnSp>
+        <p:nvCxnSpPr>
+          <p:cNvPr id="129" name="Google Shape;129;p17"/>
+          <p:cNvCxnSpPr/>
+          <p:nvPr/>
+        </p:nvCxnSpPr>
+        <p:spPr>
+          <a:xfrm>
+            <a:off x="254500" y="2745075"/>
+            <a:ext cx="8733300" cy="0"/>
+          </a:xfrm>
+          <a:prstGeom prst="straightConnector1">
+            <a:avLst/>
+          </a:prstGeom>
+          <a:noFill/>
+          <a:ln cap="flat" cmpd="sng" w="19050">
+            <a:solidFill>
+              <a:srgbClr val="000000"/>
+            </a:solidFill>
+            <a:prstDash val="solid"/>
+            <a:round/>
+            <a:headEnd len="sm" w="sm" type="none"/>
+            <a:tailEnd len="sm" w="sm" type="none"/>
+          </a:ln>
+        </p:spPr>
+      </p:cxnSp>
+      <p:sp>
+        <p:nvSpPr>
+          <p:cNvPr id="130" name="Google Shape;130;p17"/>
+          <p:cNvSpPr txBox="1"/>
+          <p:nvPr/>
+        </p:nvSpPr>
+        <p:spPr>
+          <a:xfrm>
+            <a:off x="218475" y="2757575"/>
+            <a:ext cx="2540700" cy="420300"/>
+          </a:xfrm>
+          <a:prstGeom prst="rect">
+            <a:avLst/>
+          </a:prstGeom>
+          <a:noFill/>
+          <a:ln>
+            <a:noFill/>
+          </a:ln>
+        </p:spPr>
+        <p:txBody>
+          <a:bodyPr anchorCtr="0" anchor="t" bIns="91425" lIns="91425" spcFirstLastPara="1" rIns="91425" wrap="square" tIns="91425">
+            <a:noAutofit/>
+          </a:bodyPr>
+          <a:lstStyle/>
+          <a:p>
+            <a:pPr indent="0" lvl="0" marL="0" marR="0" rtl="0" algn="l">
+              <a:lnSpc>
+                <a:spcPct val="100000"/>
+              </a:lnSpc>
+              <a:spcBef>
+                <a:spcPts val="0"/>
+              </a:spcBef>
+              <a:spcAft>
+                <a:spcPts val="0"/>
+              </a:spcAft>
+              <a:buClr>
+                <a:srgbClr val="000000"/>
+              </a:buClr>
+              <a:buSzPts val="1400"/>
+              <a:buFont typeface="Arial"/>
+              <a:buNone/>
+            </a:pPr>
+            <a:r>
+              <a:rPr b="1" i="0" lang="pt-BR" sz="1400" u="none" cap="none" strike="noStrike">
+                <a:solidFill>
+                  <a:srgbClr val="000000"/>
+                </a:solidFill>
+                <a:latin typeface="Arial"/>
+                <a:ea typeface="Arial"/>
+                <a:cs typeface="Arial"/>
+                <a:sym typeface="Arial"/>
+              </a:rPr>
+              <a:t>Capacidades</a:t>
+            </a:r>
+            <a:endParaRPr b="1" i="0" sz="1400" u="none" cap="none" strike="noStrike">
+              <a:solidFill>
+                <a:srgbClr val="000000"/>
+              </a:solidFill>
+              <a:latin typeface="Arial"/>
+              <a:ea typeface="Arial"/>
+              <a:cs typeface="Arial"/>
+              <a:sym typeface="Arial"/>
+            </a:endParaRPr>
+          </a:p>
+          <a:p>
+            <a:pPr indent="0" lvl="0" marL="0" marR="0" rtl="0" algn="l">
+              <a:lnSpc>
+                <a:spcPct val="100000"/>
+              </a:lnSpc>
+              <a:spcBef>
+                <a:spcPts val="0"/>
+              </a:spcBef>
+              <a:spcAft>
+                <a:spcPts val="0"/>
+              </a:spcAft>
+              <a:buClr>
+                <a:srgbClr val="000000"/>
+              </a:buClr>
+              <a:buSzPts val="1400"/>
+              <a:buFont typeface="Arial"/>
+              <a:buNone/>
+            </a:pPr>
+            <a:r>
+              <a:rPr b="1" i="0" lang="pt-BR" sz="1400" u="none" cap="none" strike="noStrike">
+                <a:solidFill>
+                  <a:srgbClr val="000000"/>
+                </a:solidFill>
+                <a:latin typeface="Arial"/>
+                <a:ea typeface="Arial"/>
+                <a:cs typeface="Arial"/>
+                <a:sym typeface="Arial"/>
+              </a:rPr>
+              <a:t>Operacionais</a:t>
+            </a:r>
+            <a:endParaRPr b="1" i="0" sz="1400" u="none" cap="none" strike="noStrike">
+              <a:solidFill>
+                <a:srgbClr val="000000"/>
+              </a:solidFill>
+              <a:latin typeface="Arial"/>
+              <a:ea typeface="Arial"/>
+              <a:cs typeface="Arial"/>
+              <a:sym typeface="Arial"/>
+            </a:endParaRPr>
+          </a:p>
+        </p:txBody>
+      </p:sp>
+      <p:sp>
+        <p:nvSpPr>
+          <p:cNvPr id="131" name="Google Shape;131;p17"/>
+          <p:cNvSpPr txBox="1"/>
+          <p:nvPr/>
+        </p:nvSpPr>
+        <p:spPr>
+          <a:xfrm>
+            <a:off x="3225988" y="267500"/>
+            <a:ext cx="2223600" cy="420300"/>
           </a:xfrm>
           <a:prstGeom prst="rect">
             <a:avLst/>
@@ -11634,7 +12930,131 @@
                 <a:cs typeface="Arial"/>
                 <a:sym typeface="Arial"/>
               </a:rPr>
-              <a:t>Pagar compra</a:t>
+              <a:t>Receber produto</a:t>
+            </a:r>
+            <a:endParaRPr b="0" i="0" sz="1400" u="none" cap="none" strike="noStrike">
+              <a:solidFill>
+                <a:srgbClr val="000000"/>
+              </a:solidFill>
+              <a:latin typeface="Arial"/>
+              <a:ea typeface="Arial"/>
+              <a:cs typeface="Arial"/>
+              <a:sym typeface="Arial"/>
+            </a:endParaRPr>
+          </a:p>
+        </p:txBody>
+      </p:sp>
+      <p:pic>
+        <p:nvPicPr>
+          <p:cNvPr id="132" name="Google Shape;132;p17"/>
+          <p:cNvPicPr preferRelativeResize="0"/>
+          <p:nvPr/>
+        </p:nvPicPr>
+        <p:blipFill rotWithShape="1">
+          <a:blip r:embed="rId3">
+            <a:alphaModFix/>
+          </a:blip>
+          <a:srcRect b="12374" l="0" r="9624" t="12384"/>
+          <a:stretch/>
+        </p:blipFill>
+        <p:spPr>
+          <a:xfrm>
+            <a:off x="2538725" y="1428250"/>
+            <a:ext cx="852200" cy="1304325"/>
+          </a:xfrm>
+          <a:prstGeom prst="rect">
+            <a:avLst/>
+          </a:prstGeom>
+          <a:noFill/>
+          <a:ln>
+            <a:noFill/>
+          </a:ln>
+        </p:spPr>
+      </p:pic>
+      <p:sp>
+        <p:nvSpPr>
+          <p:cNvPr id="133" name="Google Shape;133;p17"/>
+          <p:cNvSpPr txBox="1"/>
+          <p:nvPr/>
+        </p:nvSpPr>
+        <p:spPr>
+          <a:xfrm>
+            <a:off x="4837825" y="3291875"/>
+            <a:ext cx="2377200" cy="546900"/>
+          </a:xfrm>
+          <a:prstGeom prst="rect">
+            <a:avLst/>
+          </a:prstGeom>
+          <a:noFill/>
+          <a:ln>
+            <a:noFill/>
+          </a:ln>
+        </p:spPr>
+        <p:txBody>
+          <a:bodyPr anchorCtr="0" anchor="t" bIns="91425" lIns="91425" spcFirstLastPara="1" rIns="91425" wrap="square" tIns="91425">
+            <a:noAutofit/>
+          </a:bodyPr>
+          <a:lstStyle/>
+          <a:p>
+            <a:pPr indent="-317500" lvl="0" marL="457200" marR="0" rtl="0" algn="l">
+              <a:lnSpc>
+                <a:spcPct val="100000"/>
+              </a:lnSpc>
+              <a:spcBef>
+                <a:spcPts val="0"/>
+              </a:spcBef>
+              <a:spcAft>
+                <a:spcPts val="0"/>
+              </a:spcAft>
+              <a:buClr>
+                <a:srgbClr val="000000"/>
+              </a:buClr>
+              <a:buSzPts val="1400"/>
+              <a:buFont typeface="Arial"/>
+              <a:buChar char="●"/>
+            </a:pPr>
+            <a:r>
+              <a:rPr b="0" i="0" lang="pt-BR" sz="1400" u="none" cap="none" strike="noStrike">
+                <a:solidFill>
+                  <a:srgbClr val="000000"/>
+                </a:solidFill>
+                <a:latin typeface="Arial"/>
+                <a:ea typeface="Arial"/>
+                <a:cs typeface="Arial"/>
+                <a:sym typeface="Arial"/>
+              </a:rPr>
+              <a:t>Entregar pedido</a:t>
+            </a:r>
+            <a:endParaRPr b="0" i="0" sz="1400" u="none" cap="none" strike="noStrike">
+              <a:solidFill>
+                <a:srgbClr val="000000"/>
+              </a:solidFill>
+              <a:latin typeface="Arial"/>
+              <a:ea typeface="Arial"/>
+              <a:cs typeface="Arial"/>
+              <a:sym typeface="Arial"/>
+            </a:endParaRPr>
+          </a:p>
+          <a:p>
+            <a:pPr indent="0" lvl="0" marL="457200" marR="0" rtl="0" algn="l">
+              <a:lnSpc>
+                <a:spcPct val="100000"/>
+              </a:lnSpc>
+              <a:spcBef>
+                <a:spcPts val="0"/>
+              </a:spcBef>
+              <a:spcAft>
+                <a:spcPts val="0"/>
+              </a:spcAft>
+              <a:buClr>
+                <a:srgbClr val="000000"/>
+              </a:buClr>
+              <a:buSzPts val="1400"/>
+              <a:buFont typeface="Arial"/>
+              <a:buNone/>
+            </a:pPr>
+            <a:r>
+              <a:t/>
             </a:r>
             <a:endParaRPr b="0" i="0" sz="1400" u="none" cap="none" strike="noStrike">
               <a:solidFill>
@@ -11650,7 +13070,336 @@
       </p:sp>
       <p:sp>
         <p:nvSpPr>
-          <p:cNvPr id="103" name="Google Shape;103;p4"/>
+          <p:cNvPr id="134" name="Google Shape;134;p17"/>
+          <p:cNvSpPr/>
+          <p:nvPr/>
+        </p:nvSpPr>
+        <p:spPr>
+          <a:xfrm>
+            <a:off x="4982725" y="3291875"/>
+            <a:ext cx="80100" cy="639300"/>
+          </a:xfrm>
+          <a:prstGeom prst="leftBracket">
+            <a:avLst>
+              <a:gd fmla="val 8333" name="adj"/>
+            </a:avLst>
+          </a:prstGeom>
+          <a:noFill/>
+          <a:ln cap="flat" cmpd="sng" w="19050">
+            <a:solidFill>
+              <a:srgbClr val="000000"/>
+            </a:solidFill>
+            <a:prstDash val="solid"/>
+            <a:round/>
+            <a:headEnd len="sm" w="sm" type="none"/>
+            <a:tailEnd len="sm" w="sm" type="none"/>
+          </a:ln>
+        </p:spPr>
+        <p:txBody>
+          <a:bodyPr anchorCtr="0" anchor="ctr" bIns="91425" lIns="91425" spcFirstLastPara="1" rIns="91425" wrap="square" tIns="91425">
+            <a:noAutofit/>
+          </a:bodyPr>
+          <a:lstStyle/>
+          <a:p>
+            <a:pPr indent="0" lvl="0" marL="0" marR="0" rtl="0" algn="l">
+              <a:lnSpc>
+                <a:spcPct val="100000"/>
+              </a:lnSpc>
+              <a:spcBef>
+                <a:spcPts val="0"/>
+              </a:spcBef>
+              <a:spcAft>
+                <a:spcPts val="0"/>
+              </a:spcAft>
+              <a:buClr>
+                <a:srgbClr val="000000"/>
+              </a:buClr>
+              <a:buSzPts val="1400"/>
+              <a:buFont typeface="Arial"/>
+              <a:buNone/>
+            </a:pPr>
+            <a:r>
+              <a:t/>
+            </a:r>
+            <a:endParaRPr b="1" i="0" sz="1400" u="none" cap="none" strike="noStrike">
+              <a:solidFill>
+                <a:srgbClr val="000000"/>
+              </a:solidFill>
+              <a:latin typeface="Arial"/>
+              <a:ea typeface="Arial"/>
+              <a:cs typeface="Arial"/>
+              <a:sym typeface="Arial"/>
+            </a:endParaRPr>
+          </a:p>
+        </p:txBody>
+      </p:sp>
+      <p:sp>
+        <p:nvSpPr>
+          <p:cNvPr id="135" name="Google Shape;135;p17"/>
+          <p:cNvSpPr/>
+          <p:nvPr/>
+        </p:nvSpPr>
+        <p:spPr>
+          <a:xfrm>
+            <a:off x="6824675" y="3293350"/>
+            <a:ext cx="80100" cy="639300"/>
+          </a:xfrm>
+          <a:prstGeom prst="rightBracket">
+            <a:avLst>
+              <a:gd fmla="val 8333" name="adj"/>
+            </a:avLst>
+          </a:prstGeom>
+          <a:noFill/>
+          <a:ln cap="flat" cmpd="sng" w="19050">
+            <a:solidFill>
+              <a:srgbClr val="000000"/>
+            </a:solidFill>
+            <a:prstDash val="solid"/>
+            <a:round/>
+            <a:headEnd len="sm" w="sm" type="none"/>
+            <a:tailEnd len="sm" w="sm" type="none"/>
+          </a:ln>
+        </p:spPr>
+        <p:txBody>
+          <a:bodyPr anchorCtr="0" anchor="ctr" bIns="91425" lIns="91425" spcFirstLastPara="1" rIns="91425" wrap="square" tIns="91425">
+            <a:noAutofit/>
+          </a:bodyPr>
+          <a:lstStyle/>
+          <a:p>
+            <a:pPr indent="0" lvl="0" marL="0" marR="0" rtl="0" algn="l">
+              <a:lnSpc>
+                <a:spcPct val="100000"/>
+              </a:lnSpc>
+              <a:spcBef>
+                <a:spcPts val="0"/>
+              </a:spcBef>
+              <a:spcAft>
+                <a:spcPts val="0"/>
+              </a:spcAft>
+              <a:buClr>
+                <a:srgbClr val="000000"/>
+              </a:buClr>
+              <a:buSzPts val="1400"/>
+              <a:buFont typeface="Arial"/>
+              <a:buNone/>
+            </a:pPr>
+            <a:r>
+              <a:t/>
+            </a:r>
+            <a:endParaRPr b="1" i="0" sz="1400" u="none" cap="none" strike="noStrike">
+              <a:solidFill>
+                <a:srgbClr val="000000"/>
+              </a:solidFill>
+              <a:latin typeface="Arial"/>
+              <a:ea typeface="Arial"/>
+              <a:cs typeface="Arial"/>
+              <a:sym typeface="Arial"/>
+            </a:endParaRPr>
+          </a:p>
+        </p:txBody>
+      </p:sp>
+      <p:cxnSp>
+        <p:nvCxnSpPr>
+          <p:cNvPr id="136" name="Google Shape;136;p17"/>
+          <p:cNvCxnSpPr>
+            <a:stCxn id="127" idx="2"/>
+            <a:endCxn id="132" idx="0"/>
+          </p:cNvCxnSpPr>
+          <p:nvPr/>
+        </p:nvCxnSpPr>
+        <p:spPr>
+          <a:xfrm rot="5400000">
+            <a:off x="3331588" y="421982"/>
+            <a:ext cx="639300" cy="1373100"/>
+          </a:xfrm>
+          <a:prstGeom prst="curvedConnector3">
+            <a:avLst>
+              <a:gd fmla="val 56267" name="adj1"/>
+            </a:avLst>
+          </a:prstGeom>
+          <a:noFill/>
+          <a:ln cap="flat" cmpd="sng" w="19050">
+            <a:solidFill>
+              <a:srgbClr val="000000"/>
+            </a:solidFill>
+            <a:prstDash val="solid"/>
+            <a:round/>
+            <a:headEnd len="sm" w="sm" type="none"/>
+            <a:tailEnd len="sm" w="sm" type="none"/>
+          </a:ln>
+        </p:spPr>
+      </p:cxnSp>
+      <p:cxnSp>
+        <p:nvCxnSpPr>
+          <p:cNvPr id="137" name="Google Shape;137;p17"/>
+          <p:cNvCxnSpPr>
+            <a:stCxn id="127" idx="2"/>
+            <a:endCxn id="134" idx="1"/>
+          </p:cNvCxnSpPr>
+          <p:nvPr/>
+        </p:nvCxnSpPr>
+        <p:spPr>
+          <a:xfrm flipH="1" rot="-5400000">
+            <a:off x="3248938" y="1877732"/>
+            <a:ext cx="2822700" cy="645000"/>
+          </a:xfrm>
+          <a:prstGeom prst="curvedConnector2">
+            <a:avLst/>
+          </a:prstGeom>
+          <a:noFill/>
+          <a:ln cap="flat" cmpd="sng" w="19050">
+            <a:solidFill>
+              <a:srgbClr val="000000"/>
+            </a:solidFill>
+            <a:prstDash val="solid"/>
+            <a:round/>
+            <a:headEnd len="sm" w="sm" type="none"/>
+            <a:tailEnd len="sm" w="sm" type="none"/>
+          </a:ln>
+        </p:spPr>
+      </p:cxnSp>
+      <p:sp>
+        <p:nvSpPr>
+          <p:cNvPr id="138" name="Google Shape;138;p17"/>
+          <p:cNvSpPr/>
+          <p:nvPr/>
+        </p:nvSpPr>
+        <p:spPr>
+          <a:xfrm>
+            <a:off x="3999600" y="2014725"/>
+            <a:ext cx="1063200" cy="546900"/>
+          </a:xfrm>
+          <a:prstGeom prst="rect">
+            <a:avLst/>
+          </a:prstGeom>
+          <a:solidFill>
+            <a:srgbClr val="C9DAF8"/>
+          </a:solidFill>
+          <a:ln cap="flat" cmpd="sng" w="9525">
+            <a:solidFill>
+              <a:srgbClr val="000000"/>
+            </a:solidFill>
+            <a:prstDash val="solid"/>
+            <a:round/>
+            <a:headEnd len="sm" w="sm" type="none"/>
+            <a:tailEnd len="sm" w="sm" type="none"/>
+          </a:ln>
+        </p:spPr>
+        <p:txBody>
+          <a:bodyPr anchorCtr="0" anchor="ctr" bIns="91425" lIns="91425" spcFirstLastPara="1" rIns="91425" wrap="square" tIns="91425">
+            <a:noAutofit/>
+          </a:bodyPr>
+          <a:lstStyle/>
+          <a:p>
+            <a:pPr indent="0" lvl="0" marL="0" marR="0" rtl="0" algn="ctr">
+              <a:lnSpc>
+                <a:spcPct val="100000"/>
+              </a:lnSpc>
+              <a:spcBef>
+                <a:spcPts val="0"/>
+              </a:spcBef>
+              <a:spcAft>
+                <a:spcPts val="0"/>
+              </a:spcAft>
+              <a:buClr>
+                <a:srgbClr val="000000"/>
+              </a:buClr>
+              <a:buSzPts val="1400"/>
+              <a:buFont typeface="Arial"/>
+              <a:buNone/>
+            </a:pPr>
+            <a:r>
+              <a:rPr b="0" i="0" lang="pt-BR" sz="1400" u="none" cap="none" strike="noStrike">
+                <a:solidFill>
+                  <a:srgbClr val="000000"/>
+                </a:solidFill>
+                <a:latin typeface="Arial"/>
+                <a:ea typeface="Arial"/>
+                <a:cs typeface="Arial"/>
+                <a:sym typeface="Arial"/>
+              </a:rPr>
+              <a:t>Setor de</a:t>
+            </a:r>
+            <a:endParaRPr b="0" i="0" sz="1400" u="none" cap="none" strike="noStrike">
+              <a:solidFill>
+                <a:srgbClr val="000000"/>
+              </a:solidFill>
+              <a:latin typeface="Arial"/>
+              <a:ea typeface="Arial"/>
+              <a:cs typeface="Arial"/>
+              <a:sym typeface="Arial"/>
+            </a:endParaRPr>
+          </a:p>
+          <a:p>
+            <a:pPr indent="0" lvl="0" marL="0" marR="0" rtl="0" algn="ctr">
+              <a:lnSpc>
+                <a:spcPct val="100000"/>
+              </a:lnSpc>
+              <a:spcBef>
+                <a:spcPts val="0"/>
+              </a:spcBef>
+              <a:spcAft>
+                <a:spcPts val="0"/>
+              </a:spcAft>
+              <a:buClr>
+                <a:srgbClr val="000000"/>
+              </a:buClr>
+              <a:buSzPts val="1400"/>
+              <a:buFont typeface="Arial"/>
+              <a:buNone/>
+            </a:pPr>
+            <a:r>
+              <a:rPr b="0" i="0" lang="pt-BR" sz="1400" u="none" cap="none" strike="noStrike">
+                <a:solidFill>
+                  <a:srgbClr val="000000"/>
+                </a:solidFill>
+                <a:latin typeface="Arial"/>
+                <a:ea typeface="Arial"/>
+                <a:cs typeface="Arial"/>
+                <a:sym typeface="Arial"/>
+              </a:rPr>
+              <a:t>entrega</a:t>
+            </a:r>
+            <a:endParaRPr b="0" i="0" sz="1400" u="none" cap="none" strike="noStrike">
+              <a:solidFill>
+                <a:srgbClr val="000000"/>
+              </a:solidFill>
+              <a:latin typeface="Arial"/>
+              <a:ea typeface="Arial"/>
+              <a:cs typeface="Arial"/>
+              <a:sym typeface="Arial"/>
+            </a:endParaRPr>
+          </a:p>
+        </p:txBody>
+      </p:sp>
+    </p:spTree>
+  </p:cSld>
+  <p:clrMapOvr>
+    <a:masterClrMapping/>
+  </p:clrMapOvr>
+</p:sld>
+</file>
+
+<file path=ppt/slides/slide6.xml><?xml version="1.0" encoding="utf-8"?>
+<p:sld xmlns:a="http://schemas.openxmlformats.org/drawingml/2006/main" xmlns:r="http://schemas.openxmlformats.org/officeDocument/2006/relationships" xmlns:mc="http://schemas.openxmlformats.org/markup-compatibility/2006" xmlns:mv="urn:schemas-microsoft-com:mac:vml" xmlns:p="http://schemas.openxmlformats.org/presentationml/2006/main" xmlns:c="http://schemas.openxmlformats.org/drawingml/2006/chart" xmlns:dgm="http://schemas.openxmlformats.org/drawingml/2006/diagram" xmlns:o="urn:schemas-microsoft-com:office:office" xmlns:v="urn:schemas-microsoft-com:vml" xmlns:pvml="urn:schemas-microsoft-com:office:powerpoint" xmlns:com="http://schemas.openxmlformats.org/drawingml/2006/compatibility" xmlns:p14="http://schemas.microsoft.com/office/powerpoint/2010/main" xmlns:p15="http://schemas.microsoft.com/office/powerpoint/2012/main">
+  <p:cSld>
+    <p:spTree>
+      <p:nvGrpSpPr>
+        <p:cNvPr id="142" name="Shape 142"/>
+        <p:cNvGrpSpPr/>
+        <p:nvPr/>
+      </p:nvGrpSpPr>
+      <p:grpSpPr>
+        <a:xfrm>
+          <a:off x="0" y="0"/>
+          <a:ext cx="0" cy="0"/>
+          <a:chOff x="0" y="0"/>
+          <a:chExt cx="0" cy="0"/>
+        </a:xfrm>
+      </p:grpSpPr>
+      <p:sp>
+        <p:nvSpPr>
+          <p:cNvPr id="143" name="Google Shape;143;p18"/>
           <p:cNvSpPr/>
           <p:nvPr/>
         </p:nvSpPr>
@@ -11713,680 +13462,9 @@
           </a:p>
         </p:txBody>
       </p:sp>
-      <p:cxnSp>
-        <p:nvCxnSpPr>
-          <p:cNvPr id="104" name="Google Shape;104;p4"/>
-          <p:cNvCxnSpPr/>
-          <p:nvPr/>
-        </p:nvCxnSpPr>
-        <p:spPr>
-          <a:xfrm>
-            <a:off x="254500" y="2745075"/>
-            <a:ext cx="8733300" cy="0"/>
-          </a:xfrm>
-          <a:prstGeom prst="straightConnector1">
-            <a:avLst/>
-          </a:prstGeom>
-          <a:noFill/>
-          <a:ln cap="flat" cmpd="sng" w="19050">
-            <a:solidFill>
-              <a:srgbClr val="000000"/>
-            </a:solidFill>
-            <a:prstDash val="solid"/>
-            <a:round/>
-            <a:headEnd len="sm" w="sm" type="none"/>
-            <a:tailEnd len="sm" w="sm" type="none"/>
-          </a:ln>
-        </p:spPr>
-      </p:cxnSp>
       <p:sp>
         <p:nvSpPr>
-          <p:cNvPr id="105" name="Google Shape;105;p4"/>
-          <p:cNvSpPr txBox="1"/>
-          <p:nvPr/>
-        </p:nvSpPr>
-        <p:spPr>
-          <a:xfrm>
-            <a:off x="231875" y="1324375"/>
-            <a:ext cx="1852500" cy="334800"/>
-          </a:xfrm>
-          <a:prstGeom prst="rect">
-            <a:avLst/>
-          </a:prstGeom>
-          <a:noFill/>
-          <a:ln>
-            <a:noFill/>
-          </a:ln>
-        </p:spPr>
-        <p:txBody>
-          <a:bodyPr anchorCtr="0" anchor="t" bIns="91425" lIns="91425" spcFirstLastPara="1" rIns="91425" wrap="square" tIns="91425">
-            <a:noAutofit/>
-          </a:bodyPr>
-          <a:lstStyle/>
-          <a:p>
-            <a:pPr indent="0" lvl="0" marL="0" marR="0" rtl="0" algn="l">
-              <a:lnSpc>
-                <a:spcPct val="100000"/>
-              </a:lnSpc>
-              <a:spcBef>
-                <a:spcPts val="0"/>
-              </a:spcBef>
-              <a:spcAft>
-                <a:spcPts val="0"/>
-              </a:spcAft>
-              <a:buClr>
-                <a:srgbClr val="000000"/>
-              </a:buClr>
-              <a:buSzPts val="1400"/>
-              <a:buFont typeface="Arial"/>
-              <a:buNone/>
-            </a:pPr>
-            <a:r>
-              <a:rPr b="1" i="0" lang="pt-BR" sz="1400" u="none" cap="none" strike="noStrike">
-                <a:solidFill>
-                  <a:srgbClr val="000000"/>
-                </a:solidFill>
-                <a:latin typeface="Arial"/>
-                <a:ea typeface="Arial"/>
-                <a:cs typeface="Arial"/>
-                <a:sym typeface="Arial"/>
-              </a:rPr>
-              <a:t>Nós Operacionais</a:t>
-            </a:r>
-            <a:endParaRPr b="1" i="0" sz="1400" u="none" cap="none" strike="noStrike">
-              <a:solidFill>
-                <a:srgbClr val="000000"/>
-              </a:solidFill>
-              <a:latin typeface="Arial"/>
-              <a:ea typeface="Arial"/>
-              <a:cs typeface="Arial"/>
-              <a:sym typeface="Arial"/>
-            </a:endParaRPr>
-          </a:p>
-        </p:txBody>
-      </p:sp>
-      <p:sp>
-        <p:nvSpPr>
-          <p:cNvPr id="106" name="Google Shape;106;p4"/>
-          <p:cNvSpPr txBox="1"/>
-          <p:nvPr/>
-        </p:nvSpPr>
-        <p:spPr>
-          <a:xfrm>
-            <a:off x="218475" y="2757575"/>
-            <a:ext cx="2540700" cy="420300"/>
-          </a:xfrm>
-          <a:prstGeom prst="rect">
-            <a:avLst/>
-          </a:prstGeom>
-          <a:noFill/>
-          <a:ln>
-            <a:noFill/>
-          </a:ln>
-        </p:spPr>
-        <p:txBody>
-          <a:bodyPr anchorCtr="0" anchor="t" bIns="91425" lIns="91425" spcFirstLastPara="1" rIns="91425" wrap="square" tIns="91425">
-            <a:noAutofit/>
-          </a:bodyPr>
-          <a:lstStyle/>
-          <a:p>
-            <a:pPr indent="0" lvl="0" marL="0" marR="0" rtl="0" algn="l">
-              <a:lnSpc>
-                <a:spcPct val="100000"/>
-              </a:lnSpc>
-              <a:spcBef>
-                <a:spcPts val="0"/>
-              </a:spcBef>
-              <a:spcAft>
-                <a:spcPts val="0"/>
-              </a:spcAft>
-              <a:buClr>
-                <a:srgbClr val="000000"/>
-              </a:buClr>
-              <a:buSzPts val="1400"/>
-              <a:buFont typeface="Arial"/>
-              <a:buNone/>
-            </a:pPr>
-            <a:r>
-              <a:rPr b="1" i="0" lang="pt-BR" sz="1400" u="none" cap="none" strike="noStrike">
-                <a:solidFill>
-                  <a:srgbClr val="000000"/>
-                </a:solidFill>
-                <a:latin typeface="Arial"/>
-                <a:ea typeface="Arial"/>
-                <a:cs typeface="Arial"/>
-                <a:sym typeface="Arial"/>
-              </a:rPr>
-              <a:t>Capacidades Operacionais</a:t>
-            </a:r>
-            <a:endParaRPr b="1" i="0" sz="1400" u="none" cap="none" strike="noStrike">
-              <a:solidFill>
-                <a:srgbClr val="000000"/>
-              </a:solidFill>
-              <a:latin typeface="Arial"/>
-              <a:ea typeface="Arial"/>
-              <a:cs typeface="Arial"/>
-              <a:sym typeface="Arial"/>
-            </a:endParaRPr>
-          </a:p>
-        </p:txBody>
-      </p:sp>
-      <p:sp>
-        <p:nvSpPr>
-          <p:cNvPr id="107" name="Google Shape;107;p4"/>
-          <p:cNvSpPr/>
-          <p:nvPr/>
-        </p:nvSpPr>
-        <p:spPr>
-          <a:xfrm>
-            <a:off x="5022925" y="3085800"/>
-            <a:ext cx="88200" cy="639300"/>
-          </a:xfrm>
-          <a:prstGeom prst="leftBracket">
-            <a:avLst>
-              <a:gd fmla="val 8333" name="adj"/>
-            </a:avLst>
-          </a:prstGeom>
-          <a:noFill/>
-          <a:ln cap="flat" cmpd="sng" w="19050">
-            <a:solidFill>
-              <a:srgbClr val="000000"/>
-            </a:solidFill>
-            <a:prstDash val="solid"/>
-            <a:round/>
-            <a:headEnd len="sm" w="sm" type="none"/>
-            <a:tailEnd len="sm" w="sm" type="none"/>
-          </a:ln>
-        </p:spPr>
-        <p:txBody>
-          <a:bodyPr anchorCtr="0" anchor="ctr" bIns="91425" lIns="91425" spcFirstLastPara="1" rIns="91425" wrap="square" tIns="91425">
-            <a:noAutofit/>
-          </a:bodyPr>
-          <a:lstStyle/>
-          <a:p>
-            <a:pPr indent="0" lvl="0" marL="0" marR="0" rtl="0" algn="l">
-              <a:lnSpc>
-                <a:spcPct val="100000"/>
-              </a:lnSpc>
-              <a:spcBef>
-                <a:spcPts val="0"/>
-              </a:spcBef>
-              <a:spcAft>
-                <a:spcPts val="0"/>
-              </a:spcAft>
-              <a:buClr>
-                <a:srgbClr val="000000"/>
-              </a:buClr>
-              <a:buSzPts val="1400"/>
-              <a:buFont typeface="Arial"/>
-              <a:buNone/>
-            </a:pPr>
-            <a:r>
-              <a:t/>
-            </a:r>
-            <a:endParaRPr b="1" i="0" sz="1400" u="none" cap="none" strike="noStrike">
-              <a:solidFill>
-                <a:srgbClr val="000000"/>
-              </a:solidFill>
-              <a:latin typeface="Arial"/>
-              <a:ea typeface="Arial"/>
-              <a:cs typeface="Arial"/>
-              <a:sym typeface="Arial"/>
-            </a:endParaRPr>
-          </a:p>
-        </p:txBody>
-      </p:sp>
-      <p:sp>
-        <p:nvSpPr>
-          <p:cNvPr id="108" name="Google Shape;108;p4"/>
-          <p:cNvSpPr/>
-          <p:nvPr/>
-        </p:nvSpPr>
-        <p:spPr>
-          <a:xfrm>
-            <a:off x="7664475" y="3085800"/>
-            <a:ext cx="88200" cy="639300"/>
-          </a:xfrm>
-          <a:prstGeom prst="rightBracket">
-            <a:avLst>
-              <a:gd fmla="val 8333" name="adj"/>
-            </a:avLst>
-          </a:prstGeom>
-          <a:noFill/>
-          <a:ln cap="flat" cmpd="sng" w="19050">
-            <a:solidFill>
-              <a:srgbClr val="000000"/>
-            </a:solidFill>
-            <a:prstDash val="solid"/>
-            <a:round/>
-            <a:headEnd len="sm" w="sm" type="none"/>
-            <a:tailEnd len="sm" w="sm" type="none"/>
-          </a:ln>
-        </p:spPr>
-        <p:txBody>
-          <a:bodyPr anchorCtr="0" anchor="ctr" bIns="91425" lIns="91425" spcFirstLastPara="1" rIns="91425" wrap="square" tIns="91425">
-            <a:noAutofit/>
-          </a:bodyPr>
-          <a:lstStyle/>
-          <a:p>
-            <a:pPr indent="0" lvl="0" marL="0" marR="0" rtl="0" algn="l">
-              <a:lnSpc>
-                <a:spcPct val="100000"/>
-              </a:lnSpc>
-              <a:spcBef>
-                <a:spcPts val="0"/>
-              </a:spcBef>
-              <a:spcAft>
-                <a:spcPts val="0"/>
-              </a:spcAft>
-              <a:buClr>
-                <a:srgbClr val="000000"/>
-              </a:buClr>
-              <a:buSzPts val="1400"/>
-              <a:buFont typeface="Arial"/>
-              <a:buNone/>
-            </a:pPr>
-            <a:r>
-              <a:t/>
-            </a:r>
-            <a:endParaRPr b="1" i="0" sz="1400" u="none" cap="none" strike="noStrike">
-              <a:solidFill>
-                <a:srgbClr val="000000"/>
-              </a:solidFill>
-              <a:latin typeface="Arial"/>
-              <a:ea typeface="Arial"/>
-              <a:cs typeface="Arial"/>
-              <a:sym typeface="Arial"/>
-            </a:endParaRPr>
-          </a:p>
-        </p:txBody>
-      </p:sp>
-      <p:sp>
-        <p:nvSpPr>
-          <p:cNvPr id="109" name="Google Shape;109;p4"/>
-          <p:cNvSpPr txBox="1"/>
-          <p:nvPr/>
-        </p:nvSpPr>
-        <p:spPr>
-          <a:xfrm>
-            <a:off x="5022925" y="3154800"/>
-            <a:ext cx="2653500" cy="443100"/>
-          </a:xfrm>
-          <a:prstGeom prst="rect">
-            <a:avLst/>
-          </a:prstGeom>
-          <a:noFill/>
-          <a:ln>
-            <a:noFill/>
-          </a:ln>
-        </p:spPr>
-        <p:txBody>
-          <a:bodyPr anchorCtr="0" anchor="t" bIns="91425" lIns="91425" spcFirstLastPara="1" rIns="91425" wrap="square" tIns="91425">
-            <a:noAutofit/>
-          </a:bodyPr>
-          <a:lstStyle/>
-          <a:p>
-            <a:pPr indent="-317500" lvl="0" marL="457200" marR="0" rtl="0" algn="l">
-              <a:lnSpc>
-                <a:spcPct val="100000"/>
-              </a:lnSpc>
-              <a:spcBef>
-                <a:spcPts val="0"/>
-              </a:spcBef>
-              <a:spcAft>
-                <a:spcPts val="0"/>
-              </a:spcAft>
-              <a:buClr>
-                <a:srgbClr val="000000"/>
-              </a:buClr>
-              <a:buSzPts val="1400"/>
-              <a:buFont typeface="Arial"/>
-              <a:buChar char="●"/>
-            </a:pPr>
-            <a:r>
-              <a:rPr lang="pt-BR"/>
-              <a:t>Receber </a:t>
-            </a:r>
-            <a:r>
-              <a:rPr b="0" i="0" lang="pt-BR" sz="1400" u="none" cap="none" strike="noStrike">
-                <a:solidFill>
-                  <a:srgbClr val="000000"/>
-                </a:solidFill>
-                <a:latin typeface="Arial"/>
-                <a:ea typeface="Arial"/>
-                <a:cs typeface="Arial"/>
-                <a:sym typeface="Arial"/>
-              </a:rPr>
-              <a:t>pagamento</a:t>
-            </a:r>
-            <a:endParaRPr b="0" i="0" sz="1400" u="none" cap="none" strike="noStrike">
-              <a:solidFill>
-                <a:srgbClr val="000000"/>
-              </a:solidFill>
-              <a:latin typeface="Arial"/>
-              <a:ea typeface="Arial"/>
-              <a:cs typeface="Arial"/>
-              <a:sym typeface="Arial"/>
-            </a:endParaRPr>
-          </a:p>
-          <a:p>
-            <a:pPr indent="0" lvl="0" marL="457200" marR="0" rtl="0" algn="l">
-              <a:lnSpc>
-                <a:spcPct val="100000"/>
-              </a:lnSpc>
-              <a:spcBef>
-                <a:spcPts val="0"/>
-              </a:spcBef>
-              <a:spcAft>
-                <a:spcPts val="0"/>
-              </a:spcAft>
-              <a:buClr>
-                <a:srgbClr val="000000"/>
-              </a:buClr>
-              <a:buSzPts val="1400"/>
-              <a:buFont typeface="Arial"/>
-              <a:buNone/>
-            </a:pPr>
-            <a:r>
-              <a:t/>
-            </a:r>
-            <a:endParaRPr b="0" i="0" sz="1400" u="none" cap="none" strike="noStrike">
-              <a:solidFill>
-                <a:srgbClr val="000000"/>
-              </a:solidFill>
-              <a:latin typeface="Arial"/>
-              <a:ea typeface="Arial"/>
-              <a:cs typeface="Arial"/>
-              <a:sym typeface="Arial"/>
-            </a:endParaRPr>
-          </a:p>
-          <a:p>
-            <a:pPr indent="0" lvl="0" marL="457200" marR="0" rtl="0" algn="l">
-              <a:lnSpc>
-                <a:spcPct val="100000"/>
-              </a:lnSpc>
-              <a:spcBef>
-                <a:spcPts val="0"/>
-              </a:spcBef>
-              <a:spcAft>
-                <a:spcPts val="0"/>
-              </a:spcAft>
-              <a:buClr>
-                <a:srgbClr val="000000"/>
-              </a:buClr>
-              <a:buSzPts val="1400"/>
-              <a:buFont typeface="Arial"/>
-              <a:buNone/>
-            </a:pPr>
-            <a:r>
-              <a:t/>
-            </a:r>
-            <a:endParaRPr b="0" i="0" sz="1400" u="none" cap="none" strike="noStrike">
-              <a:solidFill>
-                <a:srgbClr val="000000"/>
-              </a:solidFill>
-              <a:latin typeface="Arial"/>
-              <a:ea typeface="Arial"/>
-              <a:cs typeface="Arial"/>
-              <a:sym typeface="Arial"/>
-            </a:endParaRPr>
-          </a:p>
-        </p:txBody>
-      </p:sp>
-      <p:pic>
-        <p:nvPicPr>
-          <p:cNvPr id="110" name="Google Shape;110;p4"/>
-          <p:cNvPicPr preferRelativeResize="0"/>
-          <p:nvPr/>
-        </p:nvPicPr>
-        <p:blipFill rotWithShape="1">
-          <a:blip r:embed="rId3">
-            <a:alphaModFix/>
-          </a:blip>
-          <a:srcRect b="12375" l="0" r="9624" t="12384"/>
-          <a:stretch/>
-        </p:blipFill>
-        <p:spPr>
-          <a:xfrm>
-            <a:off x="2745300" y="1428250"/>
-            <a:ext cx="852200" cy="1304325"/>
-          </a:xfrm>
-          <a:prstGeom prst="rect">
-            <a:avLst/>
-          </a:prstGeom>
-          <a:noFill/>
-          <a:ln>
-            <a:noFill/>
-          </a:ln>
-        </p:spPr>
-      </p:pic>
-      <p:cxnSp>
-        <p:nvCxnSpPr>
-          <p:cNvPr id="111" name="Google Shape;111;p4"/>
-          <p:cNvCxnSpPr>
-            <a:stCxn id="101" idx="2"/>
-            <a:endCxn id="110" idx="0"/>
-          </p:cNvCxnSpPr>
-          <p:nvPr/>
-        </p:nvCxnSpPr>
-        <p:spPr>
-          <a:xfrm rot="5400000">
-            <a:off x="3434938" y="525332"/>
-            <a:ext cx="639300" cy="1166400"/>
-          </a:xfrm>
-          <a:prstGeom prst="curvedConnector3">
-            <a:avLst>
-              <a:gd fmla="val 56267" name="adj1"/>
-            </a:avLst>
-          </a:prstGeom>
-          <a:noFill/>
-          <a:ln cap="flat" cmpd="sng" w="19050">
-            <a:solidFill>
-              <a:srgbClr val="000000"/>
-            </a:solidFill>
-            <a:prstDash val="solid"/>
-            <a:round/>
-            <a:headEnd len="sm" w="sm" type="none"/>
-            <a:tailEnd len="sm" w="sm" type="none"/>
-          </a:ln>
-        </p:spPr>
-      </p:cxnSp>
-      <p:cxnSp>
-        <p:nvCxnSpPr>
-          <p:cNvPr id="112" name="Google Shape;112;p4"/>
-          <p:cNvCxnSpPr>
-            <a:stCxn id="101" idx="2"/>
-            <a:endCxn id="109" idx="1"/>
-          </p:cNvCxnSpPr>
-          <p:nvPr/>
-        </p:nvCxnSpPr>
-        <p:spPr>
-          <a:xfrm flipH="1" rot="-5400000">
-            <a:off x="3386638" y="1740032"/>
-            <a:ext cx="2587500" cy="685200"/>
-          </a:xfrm>
-          <a:prstGeom prst="curvedConnector2">
-            <a:avLst/>
-          </a:prstGeom>
-          <a:noFill/>
-          <a:ln cap="flat" cmpd="sng" w="19050">
-            <a:solidFill>
-              <a:srgbClr val="000000"/>
-            </a:solidFill>
-            <a:prstDash val="solid"/>
-            <a:round/>
-            <a:headEnd len="sm" w="sm" type="none"/>
-            <a:tailEnd len="sm" w="sm" type="none"/>
-          </a:ln>
-        </p:spPr>
-      </p:cxnSp>
-      <p:sp>
-        <p:nvSpPr>
-          <p:cNvPr id="113" name="Google Shape;113;p4"/>
-          <p:cNvSpPr/>
-          <p:nvPr/>
-        </p:nvSpPr>
-        <p:spPr>
-          <a:xfrm>
-            <a:off x="3999600" y="2014725"/>
-            <a:ext cx="1014300" cy="443100"/>
-          </a:xfrm>
-          <a:prstGeom prst="rect">
-            <a:avLst/>
-          </a:prstGeom>
-          <a:solidFill>
-            <a:srgbClr val="C9DAF8"/>
-          </a:solidFill>
-          <a:ln cap="flat" cmpd="sng" w="9525">
-            <a:solidFill>
-              <a:srgbClr val="000000"/>
-            </a:solidFill>
-            <a:prstDash val="solid"/>
-            <a:round/>
-            <a:headEnd len="sm" w="sm" type="none"/>
-            <a:tailEnd len="sm" w="sm" type="none"/>
-          </a:ln>
-        </p:spPr>
-        <p:txBody>
-          <a:bodyPr anchorCtr="0" anchor="ctr" bIns="91425" lIns="91425" spcFirstLastPara="1" rIns="91425" wrap="square" tIns="91425">
-            <a:noAutofit/>
-          </a:bodyPr>
-          <a:lstStyle/>
-          <a:p>
-            <a:pPr indent="0" lvl="0" marL="0" marR="0" rtl="0" algn="ctr">
-              <a:lnSpc>
-                <a:spcPct val="100000"/>
-              </a:lnSpc>
-              <a:spcBef>
-                <a:spcPts val="0"/>
-              </a:spcBef>
-              <a:spcAft>
-                <a:spcPts val="0"/>
-              </a:spcAft>
-              <a:buClr>
-                <a:srgbClr val="000000"/>
-              </a:buClr>
-              <a:buSzPts val="1400"/>
-              <a:buFont typeface="Arial"/>
-              <a:buNone/>
-            </a:pPr>
-            <a:r>
-              <a:rPr b="0" i="0" lang="pt-BR" sz="1400" u="none" cap="none" strike="noStrike">
-                <a:solidFill>
-                  <a:srgbClr val="000000"/>
-                </a:solidFill>
-                <a:latin typeface="Arial"/>
-                <a:ea typeface="Arial"/>
-                <a:cs typeface="Arial"/>
-                <a:sym typeface="Arial"/>
-              </a:rPr>
-              <a:t>Loja </a:t>
-            </a:r>
-            <a:endParaRPr b="0" i="0" sz="1400" u="none" cap="none" strike="noStrike">
-              <a:solidFill>
-                <a:srgbClr val="000000"/>
-              </a:solidFill>
-              <a:latin typeface="Arial"/>
-              <a:ea typeface="Arial"/>
-              <a:cs typeface="Arial"/>
-              <a:sym typeface="Arial"/>
-            </a:endParaRPr>
-          </a:p>
-        </p:txBody>
-      </p:sp>
-    </p:spTree>
-  </p:cSld>
-  <p:clrMapOvr>
-    <a:masterClrMapping/>
-  </p:clrMapOvr>
-</p:sld>
-</file>
-
-<file path=ppt/slides/slide5.xml><?xml version="1.0" encoding="utf-8"?>
-<p:sld xmlns:a="http://schemas.openxmlformats.org/drawingml/2006/main" xmlns:r="http://schemas.openxmlformats.org/officeDocument/2006/relationships" xmlns:mc="http://schemas.openxmlformats.org/markup-compatibility/2006" xmlns:mv="urn:schemas-microsoft-com:mac:vml" xmlns:p="http://schemas.openxmlformats.org/presentationml/2006/main" xmlns:c="http://schemas.openxmlformats.org/drawingml/2006/chart" xmlns:dgm="http://schemas.openxmlformats.org/drawingml/2006/diagram" xmlns:o="urn:schemas-microsoft-com:office:office" xmlns:v="urn:schemas-microsoft-com:vml" xmlns:pvml="urn:schemas-microsoft-com:office:powerpoint" xmlns:com="http://schemas.openxmlformats.org/drawingml/2006/compatibility" xmlns:p14="http://schemas.microsoft.com/office/powerpoint/2010/main" xmlns:p15="http://schemas.microsoft.com/office/powerpoint/2012/main">
-  <p:cSld>
-    <p:spTree>
-      <p:nvGrpSpPr>
-        <p:cNvPr id="117" name="Shape 117"/>
-        <p:cNvGrpSpPr/>
-        <p:nvPr/>
-      </p:nvGrpSpPr>
-      <p:grpSpPr>
-        <a:xfrm>
-          <a:off x="0" y="0"/>
-          <a:ext cx="0" cy="0"/>
-          <a:chOff x="0" y="0"/>
-          <a:chExt cx="0" cy="0"/>
-        </a:xfrm>
-      </p:grpSpPr>
-      <p:sp>
-        <p:nvSpPr>
-          <p:cNvPr id="118" name="Google Shape;118;p5"/>
-          <p:cNvSpPr/>
-          <p:nvPr/>
-        </p:nvSpPr>
-        <p:spPr>
-          <a:xfrm>
-            <a:off x="241100" y="1360375"/>
-            <a:ext cx="8733300" cy="3589800"/>
-          </a:xfrm>
-          <a:prstGeom prst="rect">
-            <a:avLst/>
-          </a:prstGeom>
-          <a:solidFill>
-            <a:srgbClr val="FFFFFF"/>
-          </a:solidFill>
-          <a:ln cap="flat" cmpd="sng" w="19050">
-            <a:solidFill>
-              <a:srgbClr val="000000"/>
-            </a:solidFill>
-            <a:prstDash val="solid"/>
-            <a:round/>
-            <a:headEnd len="sm" w="sm" type="none"/>
-            <a:tailEnd len="sm" w="sm" type="none"/>
-          </a:ln>
-        </p:spPr>
-        <p:txBody>
-          <a:bodyPr anchorCtr="0" anchor="ctr" bIns="91425" lIns="91425" spcFirstLastPara="1" rIns="91425" wrap="square" tIns="91425">
-            <a:noAutofit/>
-          </a:bodyPr>
-          <a:lstStyle/>
-          <a:p>
-            <a:pPr indent="0" lvl="0" marL="0" marR="0" rtl="0" algn="l">
-              <a:lnSpc>
-                <a:spcPct val="100000"/>
-              </a:lnSpc>
-              <a:spcBef>
-                <a:spcPts val="0"/>
-              </a:spcBef>
-              <a:spcAft>
-                <a:spcPts val="0"/>
-              </a:spcAft>
-              <a:buClr>
-                <a:srgbClr val="000000"/>
-              </a:buClr>
-              <a:buSzPts val="1400"/>
-              <a:buFont typeface="Arial"/>
-              <a:buNone/>
-            </a:pPr>
-            <a:r>
-              <a:t/>
-            </a:r>
-            <a:endParaRPr b="0" i="0" sz="1400" u="none" cap="none" strike="noStrike">
-              <a:solidFill>
-                <a:srgbClr val="000000"/>
-              </a:solidFill>
-              <a:latin typeface="Arial"/>
-              <a:ea typeface="Arial"/>
-              <a:cs typeface="Arial"/>
-              <a:sym typeface="Arial"/>
-            </a:endParaRPr>
-          </a:p>
-        </p:txBody>
-      </p:sp>
-      <p:sp>
-        <p:nvSpPr>
-          <p:cNvPr id="119" name="Google Shape;119;p5"/>
+          <p:cNvPr id="144" name="Google Shape;144;p18"/>
           <p:cNvSpPr/>
           <p:nvPr/>
         </p:nvSpPr>
@@ -12451,7 +13529,7 @@
       </p:sp>
       <p:sp>
         <p:nvSpPr>
-          <p:cNvPr id="120" name="Google Shape;120;p5"/>
+          <p:cNvPr id="145" name="Google Shape;145;p18"/>
           <p:cNvSpPr txBox="1"/>
           <p:nvPr/>
         </p:nvSpPr>
@@ -12517,7 +13595,7 @@
       </p:sp>
       <p:cxnSp>
         <p:nvCxnSpPr>
-          <p:cNvPr id="121" name="Google Shape;121;p5"/>
+          <p:cNvPr id="146" name="Google Shape;146;p18"/>
           <p:cNvCxnSpPr/>
           <p:nvPr/>
         </p:nvCxnSpPr>
@@ -12543,7 +13621,7 @@
       </p:cxnSp>
       <p:sp>
         <p:nvSpPr>
-          <p:cNvPr id="122" name="Google Shape;122;p5"/>
+          <p:cNvPr id="147" name="Google Shape;147;p18"/>
           <p:cNvSpPr txBox="1"/>
           <p:nvPr/>
         </p:nvSpPr>
@@ -12649,7 +13727,7 @@
       </p:sp>
       <p:sp>
         <p:nvSpPr>
-          <p:cNvPr id="123" name="Google Shape;123;p5"/>
+          <p:cNvPr id="148" name="Google Shape;148;p18"/>
           <p:cNvSpPr txBox="1"/>
           <p:nvPr/>
         </p:nvSpPr>
@@ -12699,7 +13777,7 @@
                 <a:cs typeface="Arial"/>
                 <a:sym typeface="Arial"/>
               </a:rPr>
-              <a:t>Receber produto</a:t>
+              <a:t>Devolver compra</a:t>
             </a:r>
             <a:endParaRPr b="0" i="0" sz="1400" u="none" cap="none" strike="noStrike">
               <a:solidFill>
@@ -12715,975 +13793,7 @@
       </p:sp>
       <p:pic>
         <p:nvPicPr>
-          <p:cNvPr id="124" name="Google Shape;124;p5"/>
-          <p:cNvPicPr preferRelativeResize="0"/>
-          <p:nvPr/>
-        </p:nvPicPr>
-        <p:blipFill rotWithShape="1">
-          <a:blip r:embed="rId3">
-            <a:alphaModFix/>
-          </a:blip>
-          <a:srcRect b="12374" l="0" r="9624" t="12384"/>
-          <a:stretch/>
-        </p:blipFill>
-        <p:spPr>
-          <a:xfrm>
-            <a:off x="2538725" y="1428250"/>
-            <a:ext cx="852200" cy="1304325"/>
-          </a:xfrm>
-          <a:prstGeom prst="rect">
-            <a:avLst/>
-          </a:prstGeom>
-          <a:noFill/>
-          <a:ln>
-            <a:noFill/>
-          </a:ln>
-        </p:spPr>
-      </p:pic>
-      <p:sp>
-        <p:nvSpPr>
-          <p:cNvPr id="125" name="Google Shape;125;p5"/>
-          <p:cNvSpPr txBox="1"/>
-          <p:nvPr/>
-        </p:nvSpPr>
-        <p:spPr>
-          <a:xfrm>
-            <a:off x="4837825" y="3291875"/>
-            <a:ext cx="2377200" cy="546900"/>
-          </a:xfrm>
-          <a:prstGeom prst="rect">
-            <a:avLst/>
-          </a:prstGeom>
-          <a:noFill/>
-          <a:ln>
-            <a:noFill/>
-          </a:ln>
-        </p:spPr>
-        <p:txBody>
-          <a:bodyPr anchorCtr="0" anchor="t" bIns="91425" lIns="91425" spcFirstLastPara="1" rIns="91425" wrap="square" tIns="91425">
-            <a:noAutofit/>
-          </a:bodyPr>
-          <a:lstStyle/>
-          <a:p>
-            <a:pPr indent="-317500" lvl="0" marL="457200" marR="0" rtl="0" algn="l">
-              <a:lnSpc>
-                <a:spcPct val="100000"/>
-              </a:lnSpc>
-              <a:spcBef>
-                <a:spcPts val="0"/>
-              </a:spcBef>
-              <a:spcAft>
-                <a:spcPts val="0"/>
-              </a:spcAft>
-              <a:buClr>
-                <a:srgbClr val="000000"/>
-              </a:buClr>
-              <a:buSzPts val="1400"/>
-              <a:buFont typeface="Arial"/>
-              <a:buChar char="●"/>
-            </a:pPr>
-            <a:r>
-              <a:rPr b="0" i="0" lang="pt-BR" sz="1400" u="none" cap="none" strike="noStrike">
-                <a:solidFill>
-                  <a:srgbClr val="000000"/>
-                </a:solidFill>
-                <a:latin typeface="Arial"/>
-                <a:ea typeface="Arial"/>
-                <a:cs typeface="Arial"/>
-                <a:sym typeface="Arial"/>
-              </a:rPr>
-              <a:t>Entregar pedido</a:t>
-            </a:r>
-            <a:endParaRPr b="0" i="0" sz="1400" u="none" cap="none" strike="noStrike">
-              <a:solidFill>
-                <a:srgbClr val="000000"/>
-              </a:solidFill>
-              <a:latin typeface="Arial"/>
-              <a:ea typeface="Arial"/>
-              <a:cs typeface="Arial"/>
-              <a:sym typeface="Arial"/>
-            </a:endParaRPr>
-          </a:p>
-          <a:p>
-            <a:pPr indent="0" lvl="0" marL="457200" marR="0" rtl="0" algn="l">
-              <a:lnSpc>
-                <a:spcPct val="100000"/>
-              </a:lnSpc>
-              <a:spcBef>
-                <a:spcPts val="0"/>
-              </a:spcBef>
-              <a:spcAft>
-                <a:spcPts val="0"/>
-              </a:spcAft>
-              <a:buClr>
-                <a:srgbClr val="000000"/>
-              </a:buClr>
-              <a:buSzPts val="1400"/>
-              <a:buFont typeface="Arial"/>
-              <a:buNone/>
-            </a:pPr>
-            <a:r>
-              <a:t/>
-            </a:r>
-            <a:endParaRPr b="0" i="0" sz="1400" u="none" cap="none" strike="noStrike">
-              <a:solidFill>
-                <a:srgbClr val="000000"/>
-              </a:solidFill>
-              <a:latin typeface="Arial"/>
-              <a:ea typeface="Arial"/>
-              <a:cs typeface="Arial"/>
-              <a:sym typeface="Arial"/>
-            </a:endParaRPr>
-          </a:p>
-        </p:txBody>
-      </p:sp>
-      <p:sp>
-        <p:nvSpPr>
-          <p:cNvPr id="126" name="Google Shape;126;p5"/>
-          <p:cNvSpPr/>
-          <p:nvPr/>
-        </p:nvSpPr>
-        <p:spPr>
-          <a:xfrm>
-            <a:off x="4982725" y="3291875"/>
-            <a:ext cx="80100" cy="639300"/>
-          </a:xfrm>
-          <a:prstGeom prst="leftBracket">
-            <a:avLst>
-              <a:gd fmla="val 8333" name="adj"/>
-            </a:avLst>
-          </a:prstGeom>
-          <a:noFill/>
-          <a:ln cap="flat" cmpd="sng" w="19050">
-            <a:solidFill>
-              <a:srgbClr val="000000"/>
-            </a:solidFill>
-            <a:prstDash val="solid"/>
-            <a:round/>
-            <a:headEnd len="sm" w="sm" type="none"/>
-            <a:tailEnd len="sm" w="sm" type="none"/>
-          </a:ln>
-        </p:spPr>
-        <p:txBody>
-          <a:bodyPr anchorCtr="0" anchor="ctr" bIns="91425" lIns="91425" spcFirstLastPara="1" rIns="91425" wrap="square" tIns="91425">
-            <a:noAutofit/>
-          </a:bodyPr>
-          <a:lstStyle/>
-          <a:p>
-            <a:pPr indent="0" lvl="0" marL="0" marR="0" rtl="0" algn="l">
-              <a:lnSpc>
-                <a:spcPct val="100000"/>
-              </a:lnSpc>
-              <a:spcBef>
-                <a:spcPts val="0"/>
-              </a:spcBef>
-              <a:spcAft>
-                <a:spcPts val="0"/>
-              </a:spcAft>
-              <a:buClr>
-                <a:srgbClr val="000000"/>
-              </a:buClr>
-              <a:buSzPts val="1400"/>
-              <a:buFont typeface="Arial"/>
-              <a:buNone/>
-            </a:pPr>
-            <a:r>
-              <a:t/>
-            </a:r>
-            <a:endParaRPr b="1" i="0" sz="1400" u="none" cap="none" strike="noStrike">
-              <a:solidFill>
-                <a:srgbClr val="000000"/>
-              </a:solidFill>
-              <a:latin typeface="Arial"/>
-              <a:ea typeface="Arial"/>
-              <a:cs typeface="Arial"/>
-              <a:sym typeface="Arial"/>
-            </a:endParaRPr>
-          </a:p>
-        </p:txBody>
-      </p:sp>
-      <p:sp>
-        <p:nvSpPr>
-          <p:cNvPr id="127" name="Google Shape;127;p5"/>
-          <p:cNvSpPr/>
-          <p:nvPr/>
-        </p:nvSpPr>
-        <p:spPr>
-          <a:xfrm>
-            <a:off x="7129475" y="3293350"/>
-            <a:ext cx="80100" cy="639300"/>
-          </a:xfrm>
-          <a:prstGeom prst="rightBracket">
-            <a:avLst>
-              <a:gd fmla="val 8333" name="adj"/>
-            </a:avLst>
-          </a:prstGeom>
-          <a:noFill/>
-          <a:ln cap="flat" cmpd="sng" w="19050">
-            <a:solidFill>
-              <a:srgbClr val="000000"/>
-            </a:solidFill>
-            <a:prstDash val="solid"/>
-            <a:round/>
-            <a:headEnd len="sm" w="sm" type="none"/>
-            <a:tailEnd len="sm" w="sm" type="none"/>
-          </a:ln>
-        </p:spPr>
-        <p:txBody>
-          <a:bodyPr anchorCtr="0" anchor="ctr" bIns="91425" lIns="91425" spcFirstLastPara="1" rIns="91425" wrap="square" tIns="91425">
-            <a:noAutofit/>
-          </a:bodyPr>
-          <a:lstStyle/>
-          <a:p>
-            <a:pPr indent="0" lvl="0" marL="0" marR="0" rtl="0" algn="l">
-              <a:lnSpc>
-                <a:spcPct val="100000"/>
-              </a:lnSpc>
-              <a:spcBef>
-                <a:spcPts val="0"/>
-              </a:spcBef>
-              <a:spcAft>
-                <a:spcPts val="0"/>
-              </a:spcAft>
-              <a:buClr>
-                <a:srgbClr val="000000"/>
-              </a:buClr>
-              <a:buSzPts val="1400"/>
-              <a:buFont typeface="Arial"/>
-              <a:buNone/>
-            </a:pPr>
-            <a:r>
-              <a:t/>
-            </a:r>
-            <a:endParaRPr b="1" i="0" sz="1400" u="none" cap="none" strike="noStrike">
-              <a:solidFill>
-                <a:srgbClr val="000000"/>
-              </a:solidFill>
-              <a:latin typeface="Arial"/>
-              <a:ea typeface="Arial"/>
-              <a:cs typeface="Arial"/>
-              <a:sym typeface="Arial"/>
-            </a:endParaRPr>
-          </a:p>
-        </p:txBody>
-      </p:sp>
-      <p:cxnSp>
-        <p:nvCxnSpPr>
-          <p:cNvPr id="128" name="Google Shape;128;p5"/>
-          <p:cNvCxnSpPr>
-            <a:stCxn id="119" idx="2"/>
-            <a:endCxn id="124" idx="0"/>
-          </p:cNvCxnSpPr>
-          <p:nvPr/>
-        </p:nvCxnSpPr>
-        <p:spPr>
-          <a:xfrm rot="5400000">
-            <a:off x="3331588" y="421982"/>
-            <a:ext cx="639300" cy="1373100"/>
-          </a:xfrm>
-          <a:prstGeom prst="curvedConnector3">
-            <a:avLst>
-              <a:gd fmla="val 56267" name="adj1"/>
-            </a:avLst>
-          </a:prstGeom>
-          <a:noFill/>
-          <a:ln cap="flat" cmpd="sng" w="19050">
-            <a:solidFill>
-              <a:srgbClr val="000000"/>
-            </a:solidFill>
-            <a:prstDash val="solid"/>
-            <a:round/>
-            <a:headEnd len="sm" w="sm" type="none"/>
-            <a:tailEnd len="sm" w="sm" type="none"/>
-          </a:ln>
-        </p:spPr>
-      </p:cxnSp>
-      <p:cxnSp>
-        <p:nvCxnSpPr>
-          <p:cNvPr id="129" name="Google Shape;129;p5"/>
-          <p:cNvCxnSpPr>
-            <a:stCxn id="119" idx="2"/>
-            <a:endCxn id="126" idx="1"/>
-          </p:cNvCxnSpPr>
-          <p:nvPr/>
-        </p:nvCxnSpPr>
-        <p:spPr>
-          <a:xfrm flipH="1" rot="-5400000">
-            <a:off x="3248938" y="1877732"/>
-            <a:ext cx="2822700" cy="645000"/>
-          </a:xfrm>
-          <a:prstGeom prst="curvedConnector2">
-            <a:avLst/>
-          </a:prstGeom>
-          <a:noFill/>
-          <a:ln cap="flat" cmpd="sng" w="19050">
-            <a:solidFill>
-              <a:srgbClr val="000000"/>
-            </a:solidFill>
-            <a:prstDash val="solid"/>
-            <a:round/>
-            <a:headEnd len="sm" w="sm" type="none"/>
-            <a:tailEnd len="sm" w="sm" type="none"/>
-          </a:ln>
-        </p:spPr>
-      </p:cxnSp>
-      <p:sp>
-        <p:nvSpPr>
-          <p:cNvPr id="130" name="Google Shape;130;p5"/>
-          <p:cNvSpPr/>
-          <p:nvPr/>
-        </p:nvSpPr>
-        <p:spPr>
-          <a:xfrm>
-            <a:off x="3999600" y="2014725"/>
-            <a:ext cx="1063200" cy="546900"/>
-          </a:xfrm>
-          <a:prstGeom prst="rect">
-            <a:avLst/>
-          </a:prstGeom>
-          <a:solidFill>
-            <a:srgbClr val="C9DAF8"/>
-          </a:solidFill>
-          <a:ln cap="flat" cmpd="sng" w="9525">
-            <a:solidFill>
-              <a:srgbClr val="000000"/>
-            </a:solidFill>
-            <a:prstDash val="solid"/>
-            <a:round/>
-            <a:headEnd len="sm" w="sm" type="none"/>
-            <a:tailEnd len="sm" w="sm" type="none"/>
-          </a:ln>
-        </p:spPr>
-        <p:txBody>
-          <a:bodyPr anchorCtr="0" anchor="ctr" bIns="91425" lIns="91425" spcFirstLastPara="1" rIns="91425" wrap="square" tIns="91425">
-            <a:noAutofit/>
-          </a:bodyPr>
-          <a:lstStyle/>
-          <a:p>
-            <a:pPr indent="0" lvl="0" marL="0" marR="0" rtl="0" algn="ctr">
-              <a:lnSpc>
-                <a:spcPct val="100000"/>
-              </a:lnSpc>
-              <a:spcBef>
-                <a:spcPts val="0"/>
-              </a:spcBef>
-              <a:spcAft>
-                <a:spcPts val="0"/>
-              </a:spcAft>
-              <a:buClr>
-                <a:srgbClr val="000000"/>
-              </a:buClr>
-              <a:buSzPts val="1400"/>
-              <a:buFont typeface="Arial"/>
-              <a:buNone/>
-            </a:pPr>
-            <a:r>
-              <a:rPr b="0" i="0" lang="pt-BR" sz="1400" u="none" cap="none" strike="noStrike">
-                <a:solidFill>
-                  <a:srgbClr val="000000"/>
-                </a:solidFill>
-                <a:latin typeface="Arial"/>
-                <a:ea typeface="Arial"/>
-                <a:cs typeface="Arial"/>
-                <a:sym typeface="Arial"/>
-              </a:rPr>
-              <a:t>Setor de</a:t>
-            </a:r>
-            <a:endParaRPr b="0" i="0" sz="1400" u="none" cap="none" strike="noStrike">
-              <a:solidFill>
-                <a:srgbClr val="000000"/>
-              </a:solidFill>
-              <a:latin typeface="Arial"/>
-              <a:ea typeface="Arial"/>
-              <a:cs typeface="Arial"/>
-              <a:sym typeface="Arial"/>
-            </a:endParaRPr>
-          </a:p>
-          <a:p>
-            <a:pPr indent="0" lvl="0" marL="0" marR="0" rtl="0" algn="ctr">
-              <a:lnSpc>
-                <a:spcPct val="100000"/>
-              </a:lnSpc>
-              <a:spcBef>
-                <a:spcPts val="0"/>
-              </a:spcBef>
-              <a:spcAft>
-                <a:spcPts val="0"/>
-              </a:spcAft>
-              <a:buClr>
-                <a:srgbClr val="000000"/>
-              </a:buClr>
-              <a:buSzPts val="1400"/>
-              <a:buFont typeface="Arial"/>
-              <a:buNone/>
-            </a:pPr>
-            <a:r>
-              <a:rPr b="0" i="0" lang="pt-BR" sz="1400" u="none" cap="none" strike="noStrike">
-                <a:solidFill>
-                  <a:srgbClr val="000000"/>
-                </a:solidFill>
-                <a:latin typeface="Arial"/>
-                <a:ea typeface="Arial"/>
-                <a:cs typeface="Arial"/>
-                <a:sym typeface="Arial"/>
-              </a:rPr>
-              <a:t>entrega</a:t>
-            </a:r>
-            <a:endParaRPr b="0" i="0" sz="1400" u="none" cap="none" strike="noStrike">
-              <a:solidFill>
-                <a:srgbClr val="000000"/>
-              </a:solidFill>
-              <a:latin typeface="Arial"/>
-              <a:ea typeface="Arial"/>
-              <a:cs typeface="Arial"/>
-              <a:sym typeface="Arial"/>
-            </a:endParaRPr>
-          </a:p>
-        </p:txBody>
-      </p:sp>
-      <p:pic>
-        <p:nvPicPr>
-          <p:cNvPr id="131" name="Google Shape;131;p5"/>
-          <p:cNvPicPr preferRelativeResize="0"/>
-          <p:nvPr/>
-        </p:nvPicPr>
-        <p:blipFill rotWithShape="1">
-          <a:blip r:embed="rId4">
-            <a:alphaModFix/>
-          </a:blip>
-          <a:srcRect b="7628" l="0" r="0" t="0"/>
-          <a:stretch/>
-        </p:blipFill>
-        <p:spPr>
-          <a:xfrm>
-            <a:off x="5579900" y="1364550"/>
-            <a:ext cx="893050" cy="1204850"/>
-          </a:xfrm>
-          <a:prstGeom prst="rect">
-            <a:avLst/>
-          </a:prstGeom>
-          <a:noFill/>
-          <a:ln>
-            <a:noFill/>
-          </a:ln>
-        </p:spPr>
-      </p:pic>
-      <p:sp>
-        <p:nvSpPr>
-          <p:cNvPr id="132" name="Google Shape;132;p5"/>
-          <p:cNvSpPr txBox="1"/>
-          <p:nvPr/>
-        </p:nvSpPr>
-        <p:spPr>
-          <a:xfrm>
-            <a:off x="5595275" y="2404425"/>
-            <a:ext cx="852300" cy="157200"/>
-          </a:xfrm>
-          <a:prstGeom prst="rect">
-            <a:avLst/>
-          </a:prstGeom>
-          <a:noFill/>
-          <a:ln>
-            <a:noFill/>
-          </a:ln>
-        </p:spPr>
-        <p:txBody>
-          <a:bodyPr anchorCtr="0" anchor="t" bIns="91425" lIns="91425" spcFirstLastPara="1" rIns="91425" wrap="square" tIns="91425">
-            <a:noAutofit/>
-          </a:bodyPr>
-          <a:lstStyle/>
-          <a:p>
-            <a:pPr indent="0" lvl="0" marL="0" marR="0" rtl="0" algn="l">
-              <a:lnSpc>
-                <a:spcPct val="100000"/>
-              </a:lnSpc>
-              <a:spcBef>
-                <a:spcPts val="0"/>
-              </a:spcBef>
-              <a:spcAft>
-                <a:spcPts val="0"/>
-              </a:spcAft>
-              <a:buClr>
-                <a:srgbClr val="000000"/>
-              </a:buClr>
-              <a:buSzPts val="1000"/>
-              <a:buFont typeface="Arial"/>
-              <a:buNone/>
-            </a:pPr>
-            <a:r>
-              <a:rPr b="0" i="0" lang="pt-BR" sz="1000" u="none" cap="none" strike="noStrike">
-                <a:solidFill>
-                  <a:srgbClr val="000000"/>
-                </a:solidFill>
-                <a:latin typeface="Arial"/>
-                <a:ea typeface="Arial"/>
-                <a:cs typeface="Arial"/>
-                <a:sym typeface="Arial"/>
-              </a:rPr>
-              <a:t>Entregador</a:t>
-            </a:r>
-            <a:endParaRPr b="0" i="0" sz="1000" u="none" cap="none" strike="noStrike">
-              <a:solidFill>
-                <a:srgbClr val="000000"/>
-              </a:solidFill>
-              <a:latin typeface="Arial"/>
-              <a:ea typeface="Arial"/>
-              <a:cs typeface="Arial"/>
-              <a:sym typeface="Arial"/>
-            </a:endParaRPr>
-          </a:p>
-        </p:txBody>
-      </p:sp>
-      <p:cxnSp>
-        <p:nvCxnSpPr>
-          <p:cNvPr id="133" name="Google Shape;133;p5"/>
-          <p:cNvCxnSpPr>
-            <a:stCxn id="119" idx="2"/>
-          </p:cNvCxnSpPr>
-          <p:nvPr/>
-        </p:nvCxnSpPr>
-        <p:spPr>
-          <a:xfrm flipH="1" rot="-5400000">
-            <a:off x="4685338" y="441332"/>
-            <a:ext cx="876300" cy="1571400"/>
-          </a:xfrm>
-          <a:prstGeom prst="curvedConnector2">
-            <a:avLst/>
-          </a:prstGeom>
-          <a:noFill/>
-          <a:ln cap="flat" cmpd="sng" w="19050">
-            <a:solidFill>
-              <a:srgbClr val="000000"/>
-            </a:solidFill>
-            <a:prstDash val="solid"/>
-            <a:round/>
-            <a:headEnd len="sm" w="sm" type="none"/>
-            <a:tailEnd len="sm" w="sm" type="none"/>
-          </a:ln>
-        </p:spPr>
-      </p:cxnSp>
-    </p:spTree>
-  </p:cSld>
-  <p:clrMapOvr>
-    <a:masterClrMapping/>
-  </p:clrMapOvr>
-</p:sld>
-</file>
-
-<file path=ppt/slides/slide6.xml><?xml version="1.0" encoding="utf-8"?>
-<p:sld xmlns:a="http://schemas.openxmlformats.org/drawingml/2006/main" xmlns:r="http://schemas.openxmlformats.org/officeDocument/2006/relationships" xmlns:mc="http://schemas.openxmlformats.org/markup-compatibility/2006" xmlns:mv="urn:schemas-microsoft-com:mac:vml" xmlns:p="http://schemas.openxmlformats.org/presentationml/2006/main" xmlns:c="http://schemas.openxmlformats.org/drawingml/2006/chart" xmlns:dgm="http://schemas.openxmlformats.org/drawingml/2006/diagram" xmlns:o="urn:schemas-microsoft-com:office:office" xmlns:v="urn:schemas-microsoft-com:vml" xmlns:pvml="urn:schemas-microsoft-com:office:powerpoint" xmlns:com="http://schemas.openxmlformats.org/drawingml/2006/compatibility" xmlns:p14="http://schemas.microsoft.com/office/powerpoint/2010/main" xmlns:p15="http://schemas.microsoft.com/office/powerpoint/2012/main">
-  <p:cSld>
-    <p:spTree>
-      <p:nvGrpSpPr>
-        <p:cNvPr id="137" name="Shape 137"/>
-        <p:cNvGrpSpPr/>
-        <p:nvPr/>
-      </p:nvGrpSpPr>
-      <p:grpSpPr>
-        <a:xfrm>
-          <a:off x="0" y="0"/>
-          <a:ext cx="0" cy="0"/>
-          <a:chOff x="0" y="0"/>
-          <a:chExt cx="0" cy="0"/>
-        </a:xfrm>
-      </p:grpSpPr>
-      <p:sp>
-        <p:nvSpPr>
-          <p:cNvPr id="138" name="Google Shape;138;p6"/>
-          <p:cNvSpPr/>
-          <p:nvPr/>
-        </p:nvSpPr>
-        <p:spPr>
-          <a:xfrm>
-            <a:off x="241100" y="1360375"/>
-            <a:ext cx="8733300" cy="3589800"/>
-          </a:xfrm>
-          <a:prstGeom prst="rect">
-            <a:avLst/>
-          </a:prstGeom>
-          <a:solidFill>
-            <a:srgbClr val="FFFFFF"/>
-          </a:solidFill>
-          <a:ln cap="flat" cmpd="sng" w="19050">
-            <a:solidFill>
-              <a:srgbClr val="000000"/>
-            </a:solidFill>
-            <a:prstDash val="solid"/>
-            <a:round/>
-            <a:headEnd len="sm" w="sm" type="none"/>
-            <a:tailEnd len="sm" w="sm" type="none"/>
-          </a:ln>
-        </p:spPr>
-        <p:txBody>
-          <a:bodyPr anchorCtr="0" anchor="ctr" bIns="91425" lIns="91425" spcFirstLastPara="1" rIns="91425" wrap="square" tIns="91425">
-            <a:noAutofit/>
-          </a:bodyPr>
-          <a:lstStyle/>
-          <a:p>
-            <a:pPr indent="0" lvl="0" marL="0" marR="0" rtl="0" algn="l">
-              <a:lnSpc>
-                <a:spcPct val="100000"/>
-              </a:lnSpc>
-              <a:spcBef>
-                <a:spcPts val="0"/>
-              </a:spcBef>
-              <a:spcAft>
-                <a:spcPts val="0"/>
-              </a:spcAft>
-              <a:buClr>
-                <a:srgbClr val="000000"/>
-              </a:buClr>
-              <a:buSzPts val="1400"/>
-              <a:buFont typeface="Arial"/>
-              <a:buNone/>
-            </a:pPr>
-            <a:r>
-              <a:t/>
-            </a:r>
-            <a:endParaRPr b="0" i="0" sz="1400" u="none" cap="none" strike="noStrike">
-              <a:solidFill>
-                <a:srgbClr val="000000"/>
-              </a:solidFill>
-              <a:latin typeface="Arial"/>
-              <a:ea typeface="Arial"/>
-              <a:cs typeface="Arial"/>
-              <a:sym typeface="Arial"/>
-            </a:endParaRPr>
-          </a:p>
-        </p:txBody>
-      </p:sp>
-      <p:sp>
-        <p:nvSpPr>
-          <p:cNvPr id="139" name="Google Shape;139;p6"/>
-          <p:cNvSpPr/>
-          <p:nvPr/>
-        </p:nvSpPr>
-        <p:spPr>
-          <a:xfrm>
-            <a:off x="3411525" y="68275"/>
-            <a:ext cx="1852525" cy="800675"/>
-          </a:xfrm>
-          <a:prstGeom prst="flowChartPunchedTape">
-            <a:avLst/>
-          </a:prstGeom>
-          <a:solidFill>
-            <a:srgbClr val="EAD1DC"/>
-          </a:solidFill>
-          <a:ln cap="flat" cmpd="sng" w="9525">
-            <a:solidFill>
-              <a:srgbClr val="000000"/>
-            </a:solidFill>
-            <a:prstDash val="solid"/>
-            <a:round/>
-            <a:headEnd len="sm" w="sm" type="none"/>
-            <a:tailEnd len="sm" w="sm" type="none"/>
-          </a:ln>
-        </p:spPr>
-        <p:txBody>
-          <a:bodyPr anchorCtr="0" anchor="ctr" bIns="91425" lIns="91425" spcFirstLastPara="1" rIns="91425" wrap="square" tIns="91425">
-            <a:noAutofit/>
-          </a:bodyPr>
-          <a:lstStyle/>
-          <a:p>
-            <a:pPr indent="0" lvl="0" marL="0" marR="0" rtl="0" algn="l">
-              <a:lnSpc>
-                <a:spcPct val="100000"/>
-              </a:lnSpc>
-              <a:spcBef>
-                <a:spcPts val="0"/>
-              </a:spcBef>
-              <a:spcAft>
-                <a:spcPts val="0"/>
-              </a:spcAft>
-              <a:buClr>
-                <a:srgbClr val="000000"/>
-              </a:buClr>
-              <a:buSzPts val="1400"/>
-              <a:buFont typeface="Arial"/>
-              <a:buNone/>
-            </a:pPr>
-            <a:r>
-              <a:t/>
-            </a:r>
-            <a:endParaRPr b="0" i="0" sz="1400" u="none" cap="none" strike="noStrike">
-              <a:solidFill>
-                <a:srgbClr val="000000"/>
-              </a:solidFill>
-              <a:latin typeface="Arial"/>
-              <a:ea typeface="Arial"/>
-              <a:cs typeface="Arial"/>
-              <a:sym typeface="Arial"/>
-            </a:endParaRPr>
-          </a:p>
-        </p:txBody>
-      </p:sp>
-      <p:sp>
-        <p:nvSpPr>
-          <p:cNvPr id="140" name="Google Shape;140;p6"/>
-          <p:cNvSpPr txBox="1"/>
-          <p:nvPr/>
-        </p:nvSpPr>
-        <p:spPr>
-          <a:xfrm>
-            <a:off x="231875" y="1324375"/>
-            <a:ext cx="1852500" cy="334800"/>
-          </a:xfrm>
-          <a:prstGeom prst="rect">
-            <a:avLst/>
-          </a:prstGeom>
-          <a:noFill/>
-          <a:ln>
-            <a:noFill/>
-          </a:ln>
-        </p:spPr>
-        <p:txBody>
-          <a:bodyPr anchorCtr="0" anchor="t" bIns="91425" lIns="91425" spcFirstLastPara="1" rIns="91425" wrap="square" tIns="91425">
-            <a:noAutofit/>
-          </a:bodyPr>
-          <a:lstStyle/>
-          <a:p>
-            <a:pPr indent="0" lvl="0" marL="0" marR="0" rtl="0" algn="l">
-              <a:lnSpc>
-                <a:spcPct val="100000"/>
-              </a:lnSpc>
-              <a:spcBef>
-                <a:spcPts val="0"/>
-              </a:spcBef>
-              <a:spcAft>
-                <a:spcPts val="0"/>
-              </a:spcAft>
-              <a:buClr>
-                <a:srgbClr val="000000"/>
-              </a:buClr>
-              <a:buSzPts val="1400"/>
-              <a:buFont typeface="Arial"/>
-              <a:buNone/>
-            </a:pPr>
-            <a:r>
-              <a:rPr b="1" i="0" lang="pt-BR" sz="1400" u="none" cap="none" strike="noStrike">
-                <a:solidFill>
-                  <a:srgbClr val="000000"/>
-                </a:solidFill>
-                <a:latin typeface="Arial"/>
-                <a:ea typeface="Arial"/>
-                <a:cs typeface="Arial"/>
-                <a:sym typeface="Arial"/>
-              </a:rPr>
-              <a:t>Nós Operacionais</a:t>
-            </a:r>
-            <a:endParaRPr b="1" i="0" sz="1400" u="none" cap="none" strike="noStrike">
-              <a:solidFill>
-                <a:srgbClr val="000000"/>
-              </a:solidFill>
-              <a:latin typeface="Arial"/>
-              <a:ea typeface="Arial"/>
-              <a:cs typeface="Arial"/>
-              <a:sym typeface="Arial"/>
-            </a:endParaRPr>
-          </a:p>
-        </p:txBody>
-      </p:sp>
-      <p:cxnSp>
-        <p:nvCxnSpPr>
-          <p:cNvPr id="141" name="Google Shape;141;p6"/>
-          <p:cNvCxnSpPr/>
-          <p:nvPr/>
-        </p:nvCxnSpPr>
-        <p:spPr>
-          <a:xfrm>
-            <a:off x="254500" y="2745075"/>
-            <a:ext cx="8733300" cy="0"/>
-          </a:xfrm>
-          <a:prstGeom prst="straightConnector1">
-            <a:avLst/>
-          </a:prstGeom>
-          <a:noFill/>
-          <a:ln cap="flat" cmpd="sng" w="19050">
-            <a:solidFill>
-              <a:srgbClr val="000000"/>
-            </a:solidFill>
-            <a:prstDash val="solid"/>
-            <a:round/>
-            <a:headEnd len="sm" w="sm" type="none"/>
-            <a:tailEnd len="sm" w="sm" type="none"/>
-          </a:ln>
-        </p:spPr>
-      </p:cxnSp>
-      <p:sp>
-        <p:nvSpPr>
-          <p:cNvPr id="142" name="Google Shape;142;p6"/>
-          <p:cNvSpPr txBox="1"/>
-          <p:nvPr/>
-        </p:nvSpPr>
-        <p:spPr>
-          <a:xfrm>
-            <a:off x="218475" y="2757575"/>
-            <a:ext cx="2540700" cy="420300"/>
-          </a:xfrm>
-          <a:prstGeom prst="rect">
-            <a:avLst/>
-          </a:prstGeom>
-          <a:noFill/>
-          <a:ln>
-            <a:noFill/>
-          </a:ln>
-        </p:spPr>
-        <p:txBody>
-          <a:bodyPr anchorCtr="0" anchor="t" bIns="91425" lIns="91425" spcFirstLastPara="1" rIns="91425" wrap="square" tIns="91425">
-            <a:noAutofit/>
-          </a:bodyPr>
-          <a:lstStyle/>
-          <a:p>
-            <a:pPr indent="0" lvl="0" marL="0" marR="0" rtl="0" algn="l">
-              <a:lnSpc>
-                <a:spcPct val="100000"/>
-              </a:lnSpc>
-              <a:spcBef>
-                <a:spcPts val="0"/>
-              </a:spcBef>
-              <a:spcAft>
-                <a:spcPts val="0"/>
-              </a:spcAft>
-              <a:buClr>
-                <a:srgbClr val="000000"/>
-              </a:buClr>
-              <a:buSzPts val="1400"/>
-              <a:buFont typeface="Arial"/>
-              <a:buNone/>
-            </a:pPr>
-            <a:r>
-              <a:rPr b="1" i="0" lang="pt-BR" sz="1400" u="none" cap="none" strike="noStrike">
-                <a:solidFill>
-                  <a:srgbClr val="000000"/>
-                </a:solidFill>
-                <a:latin typeface="Arial"/>
-                <a:ea typeface="Arial"/>
-                <a:cs typeface="Arial"/>
-                <a:sym typeface="Arial"/>
-              </a:rPr>
-              <a:t>Capacidades</a:t>
-            </a:r>
-            <a:endParaRPr b="1" i="0" sz="1400" u="none" cap="none" strike="noStrike">
-              <a:solidFill>
-                <a:srgbClr val="000000"/>
-              </a:solidFill>
-              <a:latin typeface="Arial"/>
-              <a:ea typeface="Arial"/>
-              <a:cs typeface="Arial"/>
-              <a:sym typeface="Arial"/>
-            </a:endParaRPr>
-          </a:p>
-          <a:p>
-            <a:pPr indent="0" lvl="0" marL="0" marR="0" rtl="0" algn="l">
-              <a:lnSpc>
-                <a:spcPct val="100000"/>
-              </a:lnSpc>
-              <a:spcBef>
-                <a:spcPts val="0"/>
-              </a:spcBef>
-              <a:spcAft>
-                <a:spcPts val="0"/>
-              </a:spcAft>
-              <a:buClr>
-                <a:srgbClr val="000000"/>
-              </a:buClr>
-              <a:buSzPts val="1400"/>
-              <a:buFont typeface="Arial"/>
-              <a:buNone/>
-            </a:pPr>
-            <a:r>
-              <a:rPr b="1" i="0" lang="pt-BR" sz="1400" u="none" cap="none" strike="noStrike">
-                <a:solidFill>
-                  <a:srgbClr val="000000"/>
-                </a:solidFill>
-                <a:latin typeface="Arial"/>
-                <a:ea typeface="Arial"/>
-                <a:cs typeface="Arial"/>
-                <a:sym typeface="Arial"/>
-              </a:rPr>
-              <a:t>Operacionais</a:t>
-            </a:r>
-            <a:endParaRPr b="1" i="0" sz="1400" u="none" cap="none" strike="noStrike">
-              <a:solidFill>
-                <a:srgbClr val="000000"/>
-              </a:solidFill>
-              <a:latin typeface="Arial"/>
-              <a:ea typeface="Arial"/>
-              <a:cs typeface="Arial"/>
-              <a:sym typeface="Arial"/>
-            </a:endParaRPr>
-          </a:p>
-        </p:txBody>
-      </p:sp>
-      <p:sp>
-        <p:nvSpPr>
-          <p:cNvPr id="143" name="Google Shape;143;p6"/>
-          <p:cNvSpPr txBox="1"/>
-          <p:nvPr/>
-        </p:nvSpPr>
-        <p:spPr>
-          <a:xfrm>
-            <a:off x="3225988" y="267500"/>
-            <a:ext cx="2223600" cy="420300"/>
-          </a:xfrm>
-          <a:prstGeom prst="rect">
-            <a:avLst/>
-          </a:prstGeom>
-          <a:noFill/>
-          <a:ln>
-            <a:noFill/>
-          </a:ln>
-        </p:spPr>
-        <p:txBody>
-          <a:bodyPr anchorCtr="0" anchor="t" bIns="91425" lIns="91425" spcFirstLastPara="1" rIns="91425" wrap="square" tIns="91425">
-            <a:noAutofit/>
-          </a:bodyPr>
-          <a:lstStyle/>
-          <a:p>
-            <a:pPr indent="0" lvl="0" marL="0" marR="0" rtl="0" algn="ctr">
-              <a:lnSpc>
-                <a:spcPct val="100000"/>
-              </a:lnSpc>
-              <a:spcBef>
-                <a:spcPts val="0"/>
-              </a:spcBef>
-              <a:spcAft>
-                <a:spcPts val="0"/>
-              </a:spcAft>
-              <a:buClr>
-                <a:srgbClr val="000000"/>
-              </a:buClr>
-              <a:buSzPts val="1400"/>
-              <a:buFont typeface="Arial"/>
-              <a:buNone/>
-            </a:pPr>
-            <a:r>
-              <a:rPr b="0" i="0" lang="pt-BR" sz="1400" u="none" cap="none" strike="noStrike">
-                <a:solidFill>
-                  <a:srgbClr val="000000"/>
-                </a:solidFill>
-                <a:latin typeface="Arial"/>
-                <a:ea typeface="Arial"/>
-                <a:cs typeface="Arial"/>
-                <a:sym typeface="Arial"/>
-              </a:rPr>
-              <a:t>Devolver compra</a:t>
-            </a:r>
-            <a:endParaRPr b="0" i="0" sz="1400" u="none" cap="none" strike="noStrike">
-              <a:solidFill>
-                <a:srgbClr val="000000"/>
-              </a:solidFill>
-              <a:latin typeface="Arial"/>
-              <a:ea typeface="Arial"/>
-              <a:cs typeface="Arial"/>
-              <a:sym typeface="Arial"/>
-            </a:endParaRPr>
-          </a:p>
-        </p:txBody>
-      </p:sp>
-      <p:pic>
-        <p:nvPicPr>
-          <p:cNvPr id="144" name="Google Shape;144;p6"/>
+          <p:cNvPr id="149" name="Google Shape;149;p18"/>
           <p:cNvPicPr preferRelativeResize="0"/>
           <p:nvPr/>
         </p:nvPicPr>
@@ -13710,7 +13820,7 @@
       </p:pic>
       <p:sp>
         <p:nvSpPr>
-          <p:cNvPr id="145" name="Google Shape;145;p6"/>
+          <p:cNvPr id="150" name="Google Shape;150;p18"/>
           <p:cNvSpPr txBox="1"/>
           <p:nvPr/>
         </p:nvSpPr>
@@ -13807,7 +13917,7 @@
       </p:sp>
       <p:sp>
         <p:nvSpPr>
-          <p:cNvPr id="146" name="Google Shape;146;p6"/>
+          <p:cNvPr id="151" name="Google Shape;151;p18"/>
           <p:cNvSpPr/>
           <p:nvPr/>
         </p:nvSpPr>
@@ -13872,7 +13982,7 @@
       </p:sp>
       <p:sp>
         <p:nvSpPr>
-          <p:cNvPr id="147" name="Google Shape;147;p6"/>
+          <p:cNvPr id="152" name="Google Shape;152;p18"/>
           <p:cNvSpPr/>
           <p:nvPr/>
         </p:nvSpPr>
@@ -13937,10 +14047,10 @@
       </p:sp>
       <p:cxnSp>
         <p:nvCxnSpPr>
-          <p:cNvPr id="148" name="Google Shape;148;p6"/>
+          <p:cNvPr id="153" name="Google Shape;153;p18"/>
           <p:cNvCxnSpPr>
-            <a:stCxn id="139" idx="2"/>
-            <a:endCxn id="144" idx="0"/>
+            <a:stCxn id="144" idx="2"/>
+            <a:endCxn id="149" idx="0"/>
           </p:cNvCxnSpPr>
           <p:nvPr/>
         </p:nvCxnSpPr>
@@ -13968,10 +14078,10 @@
       </p:cxnSp>
       <p:cxnSp>
         <p:nvCxnSpPr>
-          <p:cNvPr id="149" name="Google Shape;149;p6"/>
+          <p:cNvPr id="154" name="Google Shape;154;p18"/>
           <p:cNvCxnSpPr>
-            <a:stCxn id="139" idx="2"/>
-            <a:endCxn id="146" idx="1"/>
+            <a:stCxn id="144" idx="2"/>
+            <a:endCxn id="151" idx="1"/>
           </p:cNvCxnSpPr>
           <p:nvPr/>
         </p:nvCxnSpPr>
@@ -13997,7 +14107,7 @@
       </p:cxnSp>
       <p:sp>
         <p:nvSpPr>
-          <p:cNvPr id="150" name="Google Shape;150;p6"/>
+          <p:cNvPr id="155" name="Google Shape;155;p18"/>
           <p:cNvSpPr/>
           <p:nvPr/>
         </p:nvSpPr>

</xml_diff>